<commit_message>
ongoing dev (slow but steady)
</commit_message>
<xml_diff>
--- a/application architecture.pptx
+++ b/application architecture.pptx
@@ -6,6 +6,8 @@
   </p:sldMasterIdLst>
   <p:sldIdLst>
     <p:sldId id="256" r:id="rId2"/>
+    <p:sldId id="257" r:id="rId3"/>
+    <p:sldId id="258" r:id="rId4"/>
   </p:sldIdLst>
   <p:sldSz cx="12192000" cy="6858000"/>
   <p:notesSz cx="6858000" cy="9144000"/>
@@ -259,7 +261,7 @@
           <a:p>
             <a:fld id="{07EF651F-741F-4CB6-9DFD-1591365E5B28}" type="datetimeFigureOut">
               <a:rPr lang="en-US" smtClean="0"/>
-              <a:t>1/18/22</a:t>
+              <a:t>2/6/22</a:t>
             </a:fld>
             <a:endParaRPr lang="en-US"/>
           </a:p>
@@ -457,7 +459,7 @@
           <a:p>
             <a:fld id="{07EF651F-741F-4CB6-9DFD-1591365E5B28}" type="datetimeFigureOut">
               <a:rPr lang="en-US" smtClean="0"/>
-              <a:t>1/18/22</a:t>
+              <a:t>2/6/22</a:t>
             </a:fld>
             <a:endParaRPr lang="en-US"/>
           </a:p>
@@ -665,7 +667,7 @@
           <a:p>
             <a:fld id="{07EF651F-741F-4CB6-9DFD-1591365E5B28}" type="datetimeFigureOut">
               <a:rPr lang="en-US" smtClean="0"/>
-              <a:t>1/18/22</a:t>
+              <a:t>2/6/22</a:t>
             </a:fld>
             <a:endParaRPr lang="en-US"/>
           </a:p>
@@ -863,7 +865,7 @@
           <a:p>
             <a:fld id="{07EF651F-741F-4CB6-9DFD-1591365E5B28}" type="datetimeFigureOut">
               <a:rPr lang="en-US" smtClean="0"/>
-              <a:t>1/18/22</a:t>
+              <a:t>2/6/22</a:t>
             </a:fld>
             <a:endParaRPr lang="en-US"/>
           </a:p>
@@ -1138,7 +1140,7 @@
           <a:p>
             <a:fld id="{07EF651F-741F-4CB6-9DFD-1591365E5B28}" type="datetimeFigureOut">
               <a:rPr lang="en-US" smtClean="0"/>
-              <a:t>1/18/22</a:t>
+              <a:t>2/6/22</a:t>
             </a:fld>
             <a:endParaRPr lang="en-US"/>
           </a:p>
@@ -1403,7 +1405,7 @@
           <a:p>
             <a:fld id="{07EF651F-741F-4CB6-9DFD-1591365E5B28}" type="datetimeFigureOut">
               <a:rPr lang="en-US" smtClean="0"/>
-              <a:t>1/18/22</a:t>
+              <a:t>2/6/22</a:t>
             </a:fld>
             <a:endParaRPr lang="en-US"/>
           </a:p>
@@ -1815,7 +1817,7 @@
           <a:p>
             <a:fld id="{07EF651F-741F-4CB6-9DFD-1591365E5B28}" type="datetimeFigureOut">
               <a:rPr lang="en-US" smtClean="0"/>
-              <a:t>1/18/22</a:t>
+              <a:t>2/6/22</a:t>
             </a:fld>
             <a:endParaRPr lang="en-US"/>
           </a:p>
@@ -1956,7 +1958,7 @@
           <a:p>
             <a:fld id="{07EF651F-741F-4CB6-9DFD-1591365E5B28}" type="datetimeFigureOut">
               <a:rPr lang="en-US" smtClean="0"/>
-              <a:t>1/18/22</a:t>
+              <a:t>2/6/22</a:t>
             </a:fld>
             <a:endParaRPr lang="en-US"/>
           </a:p>
@@ -2069,7 +2071,7 @@
           <a:p>
             <a:fld id="{07EF651F-741F-4CB6-9DFD-1591365E5B28}" type="datetimeFigureOut">
               <a:rPr lang="en-US" smtClean="0"/>
-              <a:t>1/18/22</a:t>
+              <a:t>2/6/22</a:t>
             </a:fld>
             <a:endParaRPr lang="en-US"/>
           </a:p>
@@ -2380,7 +2382,7 @@
           <a:p>
             <a:fld id="{07EF651F-741F-4CB6-9DFD-1591365E5B28}" type="datetimeFigureOut">
               <a:rPr lang="en-US" smtClean="0"/>
-              <a:t>1/18/22</a:t>
+              <a:t>2/6/22</a:t>
             </a:fld>
             <a:endParaRPr lang="en-US"/>
           </a:p>
@@ -2668,7 +2670,7 @@
           <a:p>
             <a:fld id="{07EF651F-741F-4CB6-9DFD-1591365E5B28}" type="datetimeFigureOut">
               <a:rPr lang="en-US" smtClean="0"/>
-              <a:t>1/18/22</a:t>
+              <a:t>2/6/22</a:t>
             </a:fld>
             <a:endParaRPr lang="en-US"/>
           </a:p>
@@ -2909,7 +2911,7 @@
           <a:p>
             <a:fld id="{07EF651F-741F-4CB6-9DFD-1591365E5B28}" type="datetimeFigureOut">
               <a:rPr lang="en-US" smtClean="0"/>
-              <a:t>1/18/22</a:t>
+              <a:t>2/6/22</a:t>
             </a:fld>
             <a:endParaRPr lang="en-US"/>
           </a:p>
@@ -6527,6 +6529,1163 @@
 </p:sld>
 </file>
 
+<file path=ppt/slides/slide2.xml><?xml version="1.0" encoding="utf-8"?>
+<p:sld xmlns:a="http://schemas.openxmlformats.org/drawingml/2006/main" xmlns:r="http://schemas.openxmlformats.org/officeDocument/2006/relationships" xmlns:p="http://schemas.openxmlformats.org/presentationml/2006/main">
+  <p:cSld>
+    <p:spTree>
+      <p:nvGrpSpPr>
+        <p:cNvPr id="1" name=""/>
+        <p:cNvGrpSpPr/>
+        <p:nvPr/>
+      </p:nvGrpSpPr>
+      <p:grpSpPr>
+        <a:xfrm>
+          <a:off x="0" y="0"/>
+          <a:ext cx="0" cy="0"/>
+          <a:chOff x="0" y="0"/>
+          <a:chExt cx="0" cy="0"/>
+        </a:xfrm>
+      </p:grpSpPr>
+      <p:sp>
+        <p:nvSpPr>
+          <p:cNvPr id="2" name="Title 1">
+            <a:extLst>
+              <a:ext uri="{FF2B5EF4-FFF2-40B4-BE49-F238E27FC236}">
+                <a16:creationId xmlns:a16="http://schemas.microsoft.com/office/drawing/2014/main" id="{C48EAF39-271E-DB40-9C0B-4DDA60A258C4}"/>
+              </a:ext>
+            </a:extLst>
+          </p:cNvPr>
+          <p:cNvSpPr>
+            <a:spLocks noGrp="1"/>
+          </p:cNvSpPr>
+          <p:nvPr>
+            <p:ph type="title"/>
+          </p:nvPr>
+        </p:nvSpPr>
+        <p:spPr/>
+        <p:txBody>
+          <a:bodyPr/>
+          <a:lstStyle/>
+          <a:p>
+            <a:r>
+              <a:rPr lang="en-US" dirty="0"/>
+              <a:t>Event Rules and Examples</a:t>
+            </a:r>
+          </a:p>
+        </p:txBody>
+      </p:sp>
+      <p:sp>
+        <p:nvSpPr>
+          <p:cNvPr id="3" name="Content Placeholder 2">
+            <a:extLst>
+              <a:ext uri="{FF2B5EF4-FFF2-40B4-BE49-F238E27FC236}">
+                <a16:creationId xmlns:a16="http://schemas.microsoft.com/office/drawing/2014/main" id="{A02FB106-EE34-BB41-A31A-D3769D284D57}"/>
+              </a:ext>
+            </a:extLst>
+          </p:cNvPr>
+          <p:cNvSpPr>
+            <a:spLocks noGrp="1"/>
+          </p:cNvSpPr>
+          <p:nvPr>
+            <p:ph sz="half" idx="1"/>
+          </p:nvPr>
+        </p:nvSpPr>
+        <p:spPr/>
+        <p:txBody>
+          <a:bodyPr>
+            <a:normAutofit/>
+          </a:bodyPr>
+          <a:lstStyle/>
+          <a:p>
+            <a:r>
+              <a:rPr lang="en-US" sz="2000" dirty="0"/>
+              <a:t>Org Factory</a:t>
+            </a:r>
+          </a:p>
+          <a:p>
+            <a:pPr lvl="1"/>
+            <a:r>
+              <a:rPr lang="en-US" sz="1600" dirty="0" err="1"/>
+              <a:t>org.new</a:t>
+            </a:r>
+            <a:r>
+              <a:rPr lang="en-US" sz="1600" dirty="0"/>
+              <a:t> (name)</a:t>
+            </a:r>
+          </a:p>
+          <a:p>
+            <a:pPr lvl="1"/>
+            <a:r>
+              <a:rPr lang="en-US" sz="1600" dirty="0" err="1"/>
+              <a:t>org.load</a:t>
+            </a:r>
+            <a:r>
+              <a:rPr lang="en-US" sz="1600" dirty="0"/>
+              <a:t> (name, </a:t>
+            </a:r>
+            <a:r>
+              <a:rPr lang="en-US" sz="1600" dirty="0" err="1"/>
+              <a:t>create_if_missing</a:t>
+            </a:r>
+            <a:r>
+              <a:rPr lang="en-US" sz="1600" dirty="0"/>
+              <a:t>, </a:t>
+            </a:r>
+            <a:r>
+              <a:rPr lang="en-US" sz="1600" dirty="0" err="1"/>
+              <a:t>datamgr</a:t>
+            </a:r>
+            <a:r>
+              <a:rPr lang="en-US" sz="1600" dirty="0"/>
+              <a:t>)</a:t>
+            </a:r>
+          </a:p>
+          <a:p>
+            <a:pPr lvl="1"/>
+            <a:r>
+              <a:rPr lang="en-US" sz="1600" dirty="0" err="1"/>
+              <a:t>org.load.allinfolder</a:t>
+            </a:r>
+            <a:r>
+              <a:rPr lang="en-US" sz="1600" dirty="0"/>
+              <a:t>(</a:t>
+            </a:r>
+            <a:r>
+              <a:rPr lang="en-US" sz="1600" dirty="0" err="1"/>
+              <a:t>folderpath</a:t>
+            </a:r>
+            <a:r>
+              <a:rPr lang="en-US" sz="1600" dirty="0"/>
+              <a:t>)</a:t>
+            </a:r>
+          </a:p>
+          <a:p>
+            <a:r>
+              <a:rPr lang="en-US" sz="2000" dirty="0"/>
+              <a:t>Org:</a:t>
+            </a:r>
+          </a:p>
+          <a:p>
+            <a:pPr lvl="1"/>
+            <a:r>
+              <a:rPr lang="en-US" sz="1600" dirty="0" err="1"/>
+              <a:t>Org.system.add</a:t>
+            </a:r>
+            <a:endParaRPr lang="en-US" sz="1600" dirty="0"/>
+          </a:p>
+          <a:p>
+            <a:pPr lvl="1"/>
+            <a:endParaRPr lang="en-US" sz="1600" dirty="0"/>
+          </a:p>
+          <a:p>
+            <a:pPr lvl="1"/>
+            <a:endParaRPr lang="en-US" sz="1600" dirty="0"/>
+          </a:p>
+          <a:p>
+            <a:pPr lvl="1"/>
+            <a:endParaRPr lang="en-US" sz="1600" dirty="0"/>
+          </a:p>
+          <a:p>
+            <a:pPr lvl="1"/>
+            <a:endParaRPr lang="en-US" sz="1600" dirty="0"/>
+          </a:p>
+          <a:p>
+            <a:pPr lvl="1"/>
+            <a:endParaRPr lang="en-US" sz="1600" dirty="0"/>
+          </a:p>
+          <a:p>
+            <a:pPr lvl="1"/>
+            <a:endParaRPr lang="en-US" sz="1600" dirty="0"/>
+          </a:p>
+          <a:p>
+            <a:endParaRPr lang="en-US" sz="2000" dirty="0"/>
+          </a:p>
+        </p:txBody>
+      </p:sp>
+      <p:sp>
+        <p:nvSpPr>
+          <p:cNvPr id="4" name="Content Placeholder 3">
+            <a:extLst>
+              <a:ext uri="{FF2B5EF4-FFF2-40B4-BE49-F238E27FC236}">
+                <a16:creationId xmlns:a16="http://schemas.microsoft.com/office/drawing/2014/main" id="{82FCF8DA-022A-1E48-AF54-FDCED91DFD27}"/>
+              </a:ext>
+            </a:extLst>
+          </p:cNvPr>
+          <p:cNvSpPr>
+            <a:spLocks noGrp="1"/>
+          </p:cNvSpPr>
+          <p:nvPr>
+            <p:ph sz="half" idx="2"/>
+          </p:nvPr>
+        </p:nvSpPr>
+        <p:spPr/>
+        <p:txBody>
+          <a:bodyPr>
+            <a:normAutofit/>
+          </a:bodyPr>
+          <a:lstStyle/>
+          <a:p>
+            <a:r>
+              <a:rPr lang="en-US" sz="2000" dirty="0" err="1"/>
+              <a:t>Org.datamgr</a:t>
+            </a:r>
+            <a:r>
+              <a:rPr lang="en-US" sz="2000" dirty="0"/>
+              <a:t> (object)</a:t>
+            </a:r>
+            <a:endParaRPr lang="en-US" sz="1600" dirty="0"/>
+          </a:p>
+          <a:p>
+            <a:pPr lvl="1"/>
+            <a:r>
+              <a:rPr lang="en-US" sz="1600" dirty="0" err="1"/>
+              <a:t>Org.datamgr.load.id</a:t>
+            </a:r>
+            <a:r>
+              <a:rPr lang="en-US" sz="1600" dirty="0"/>
+              <a:t> (id)</a:t>
+            </a:r>
+          </a:p>
+          <a:p>
+            <a:pPr lvl="1"/>
+            <a:r>
+              <a:rPr lang="en-US" sz="1600" dirty="0" err="1"/>
+              <a:t>Org.datamgr.load.typename</a:t>
+            </a:r>
+            <a:r>
+              <a:rPr lang="en-US" sz="1600" dirty="0"/>
+              <a:t>(</a:t>
+            </a:r>
+            <a:r>
+              <a:rPr lang="en-US" sz="1600" dirty="0" err="1"/>
+              <a:t>type,name</a:t>
+            </a:r>
+            <a:r>
+              <a:rPr lang="en-US" sz="1600" dirty="0"/>
+              <a:t>) -TBD</a:t>
+            </a:r>
+          </a:p>
+          <a:p>
+            <a:pPr lvl="1"/>
+            <a:r>
+              <a:rPr lang="en-US" sz="1600" dirty="0" err="1"/>
+              <a:t>Org.datamgr.save</a:t>
+            </a:r>
+            <a:r>
+              <a:rPr lang="en-US" sz="1600" dirty="0"/>
+              <a:t> (object)</a:t>
+            </a:r>
+          </a:p>
+          <a:p>
+            <a:pPr lvl="1"/>
+            <a:r>
+              <a:rPr lang="en-US" sz="1600" dirty="0" err="1"/>
+              <a:t>Org.datamgr.expire</a:t>
+            </a:r>
+            <a:r>
+              <a:rPr lang="en-US" sz="1600" dirty="0"/>
+              <a:t> (object)</a:t>
+            </a:r>
+          </a:p>
+          <a:p>
+            <a:pPr lvl="1"/>
+            <a:r>
+              <a:rPr lang="en-US" sz="1600" dirty="0" err="1"/>
+              <a:t>Org.datamgr.restore</a:t>
+            </a:r>
+            <a:r>
+              <a:rPr lang="en-US" sz="1600" dirty="0"/>
+              <a:t> (object)</a:t>
+            </a:r>
+          </a:p>
+          <a:p>
+            <a:r>
+              <a:rPr lang="en-US" sz="2000" dirty="0" err="1"/>
+              <a:t>Org.datamgr</a:t>
+            </a:r>
+            <a:r>
+              <a:rPr lang="en-US" sz="2000" dirty="0"/>
+              <a:t> (property)</a:t>
+            </a:r>
+          </a:p>
+          <a:p>
+            <a:pPr lvl="1"/>
+            <a:r>
+              <a:rPr lang="en-US" sz="1600" dirty="0" err="1"/>
+              <a:t>Org.datamgr.prop.load.id_name</a:t>
+            </a:r>
+            <a:r>
+              <a:rPr lang="en-US" sz="1600" dirty="0"/>
+              <a:t> (name)</a:t>
+            </a:r>
+          </a:p>
+          <a:p>
+            <a:pPr lvl="1"/>
+            <a:r>
+              <a:rPr lang="en-US" sz="1600" dirty="0" err="1"/>
+              <a:t>Org.datamgr.prop.load</a:t>
+            </a:r>
+            <a:r>
+              <a:rPr lang="en-US" sz="1600" dirty="0"/>
+              <a:t> (object)</a:t>
+            </a:r>
+          </a:p>
+          <a:p>
+            <a:pPr lvl="1"/>
+            <a:r>
+              <a:rPr lang="en-US" sz="1600" dirty="0" err="1"/>
+              <a:t>Org.datamgr.prop.save</a:t>
+            </a:r>
+            <a:r>
+              <a:rPr lang="en-US" sz="1600" dirty="0"/>
+              <a:t> (object)</a:t>
+            </a:r>
+          </a:p>
+          <a:p>
+            <a:pPr lvl="1"/>
+            <a:r>
+              <a:rPr lang="en-US" sz="1600" dirty="0" err="1"/>
+              <a:t>Org.datamgr.prop.expire</a:t>
+            </a:r>
+            <a:r>
+              <a:rPr lang="en-US" sz="1600" dirty="0"/>
+              <a:t> (object)</a:t>
+            </a:r>
+          </a:p>
+          <a:p>
+            <a:pPr lvl="1"/>
+            <a:r>
+              <a:rPr lang="en-US" sz="1600" dirty="0" err="1"/>
+              <a:t>Org.datamgr.prop.delete</a:t>
+            </a:r>
+            <a:r>
+              <a:rPr lang="en-US" sz="1600" dirty="0"/>
+              <a:t> (object)</a:t>
+            </a:r>
+          </a:p>
+          <a:p>
+            <a:pPr lvl="1"/>
+            <a:r>
+              <a:rPr lang="en-US" sz="1600" dirty="0" err="1"/>
+              <a:t>Org.datamgr.prop.restore</a:t>
+            </a:r>
+            <a:r>
+              <a:rPr lang="en-US" sz="1600" dirty="0"/>
+              <a:t> (object, time) -TBD</a:t>
+            </a:r>
+          </a:p>
+          <a:p>
+            <a:endParaRPr lang="en-US" sz="2000" dirty="0"/>
+          </a:p>
+        </p:txBody>
+      </p:sp>
+    </p:spTree>
+    <p:extLst>
+      <p:ext uri="{BB962C8B-B14F-4D97-AF65-F5344CB8AC3E}">
+        <p14:creationId xmlns:p14="http://schemas.microsoft.com/office/powerpoint/2010/main" val="2582679738"/>
+      </p:ext>
+    </p:extLst>
+  </p:cSld>
+  <p:clrMapOvr>
+    <a:masterClrMapping/>
+  </p:clrMapOvr>
+</p:sld>
+</file>
+
+<file path=ppt/slides/slide3.xml><?xml version="1.0" encoding="utf-8"?>
+<p:sld xmlns:a="http://schemas.openxmlformats.org/drawingml/2006/main" xmlns:r="http://schemas.openxmlformats.org/officeDocument/2006/relationships" xmlns:p="http://schemas.openxmlformats.org/presentationml/2006/main">
+  <p:cSld>
+    <p:spTree>
+      <p:nvGrpSpPr>
+        <p:cNvPr id="1" name=""/>
+        <p:cNvGrpSpPr/>
+        <p:nvPr/>
+      </p:nvGrpSpPr>
+      <p:grpSpPr>
+        <a:xfrm>
+          <a:off x="0" y="0"/>
+          <a:ext cx="0" cy="0"/>
+          <a:chOff x="0" y="0"/>
+          <a:chExt cx="0" cy="0"/>
+        </a:xfrm>
+      </p:grpSpPr>
+      <p:sp>
+        <p:nvSpPr>
+          <p:cNvPr id="2" name="Title 1">
+            <a:extLst>
+              <a:ext uri="{FF2B5EF4-FFF2-40B4-BE49-F238E27FC236}">
+                <a16:creationId xmlns:a16="http://schemas.microsoft.com/office/drawing/2014/main" id="{85B51381-82C8-3E4F-BD29-5A055AA5E451}"/>
+              </a:ext>
+            </a:extLst>
+          </p:cNvPr>
+          <p:cNvSpPr>
+            <a:spLocks noGrp="1"/>
+          </p:cNvSpPr>
+          <p:nvPr>
+            <p:ph type="title"/>
+          </p:nvPr>
+        </p:nvSpPr>
+        <p:spPr/>
+        <p:txBody>
+          <a:bodyPr/>
+          <a:lstStyle/>
+          <a:p>
+            <a:endParaRPr lang="en-US"/>
+          </a:p>
+        </p:txBody>
+      </p:sp>
+      <p:graphicFrame>
+        <p:nvGraphicFramePr>
+          <p:cNvPr id="9" name="Table 9">
+            <a:extLst>
+              <a:ext uri="{FF2B5EF4-FFF2-40B4-BE49-F238E27FC236}">
+                <a16:creationId xmlns:a16="http://schemas.microsoft.com/office/drawing/2014/main" id="{68D01EEF-DA22-F548-B482-15C6D057D79C}"/>
+              </a:ext>
+            </a:extLst>
+          </p:cNvPr>
+          <p:cNvGraphicFramePr>
+            <a:graphicFrameLocks noGrp="1"/>
+          </p:cNvGraphicFramePr>
+          <p:nvPr>
+            <p:ph sz="half" idx="1"/>
+            <p:extLst>
+              <p:ext uri="{D42A27DB-BD31-4B8C-83A1-F6EECF244321}">
+                <p14:modId xmlns:p14="http://schemas.microsoft.com/office/powerpoint/2010/main" val="3006330333"/>
+              </p:ext>
+            </p:extLst>
+          </p:nvPr>
+        </p:nvGraphicFramePr>
+        <p:xfrm>
+          <a:off x="838200" y="1825625"/>
+          <a:ext cx="10515600" cy="3017520"/>
+        </p:xfrm>
+        <a:graphic>
+          <a:graphicData uri="http://schemas.openxmlformats.org/drawingml/2006/table">
+            <a:tbl>
+              <a:tblPr firstRow="1" bandRow="1">
+                <a:tableStyleId>{5C22544A-7EE6-4342-B048-85BDC9FD1C3A}</a:tableStyleId>
+              </a:tblPr>
+              <a:tblGrid>
+                <a:gridCol w="2213113">
+                  <a:extLst>
+                    <a:ext uri="{9D8B030D-6E8A-4147-A177-3AD203B41FA5}">
+                      <a16:colId xmlns:a16="http://schemas.microsoft.com/office/drawing/2014/main" val="2585241971"/>
+                    </a:ext>
+                  </a:extLst>
+                </a:gridCol>
+                <a:gridCol w="2564296">
+                  <a:extLst>
+                    <a:ext uri="{9D8B030D-6E8A-4147-A177-3AD203B41FA5}">
+                      <a16:colId xmlns:a16="http://schemas.microsoft.com/office/drawing/2014/main" val="1487206026"/>
+                    </a:ext>
+                  </a:extLst>
+                </a:gridCol>
+                <a:gridCol w="2524539">
+                  <a:extLst>
+                    <a:ext uri="{9D8B030D-6E8A-4147-A177-3AD203B41FA5}">
+                      <a16:colId xmlns:a16="http://schemas.microsoft.com/office/drawing/2014/main" val="456446155"/>
+                    </a:ext>
+                  </a:extLst>
+                </a:gridCol>
+                <a:gridCol w="3213652">
+                  <a:extLst>
+                    <a:ext uri="{9D8B030D-6E8A-4147-A177-3AD203B41FA5}">
+                      <a16:colId xmlns:a16="http://schemas.microsoft.com/office/drawing/2014/main" val="678270287"/>
+                    </a:ext>
+                  </a:extLst>
+                </a:gridCol>
+              </a:tblGrid>
+              <a:tr h="164525">
+                <a:tc>
+                  <a:txBody>
+                    <a:bodyPr/>
+                    <a:lstStyle/>
+                    <a:p>
+                      <a:r>
+                        <a:rPr lang="en-US" sz="1200" dirty="0"/>
+                        <a:t>Event</a:t>
+                      </a:r>
+                    </a:p>
+                  </a:txBody>
+                  <a:tcPr/>
+                </a:tc>
+                <a:tc>
+                  <a:txBody>
+                    <a:bodyPr/>
+                    <a:lstStyle/>
+                    <a:p>
+                      <a:r>
+                        <a:rPr lang="en-US" sz="1200" dirty="0"/>
+                        <a:t>Listening </a:t>
+                      </a:r>
+                      <a:r>
+                        <a:rPr lang="en-US" sz="1200" dirty="0" err="1"/>
+                        <a:t>file.method</a:t>
+                      </a:r>
+                      <a:endParaRPr lang="en-US" sz="1200" dirty="0"/>
+                    </a:p>
+                  </a:txBody>
+                  <a:tcPr/>
+                </a:tc>
+                <a:tc>
+                  <a:txBody>
+                    <a:bodyPr/>
+                    <a:lstStyle/>
+                    <a:p>
+                      <a:r>
+                        <a:rPr lang="en-US" sz="1200" dirty="0"/>
+                        <a:t>Does</a:t>
+                      </a:r>
+                    </a:p>
+                  </a:txBody>
+                  <a:tcPr/>
+                </a:tc>
+                <a:tc>
+                  <a:txBody>
+                    <a:bodyPr/>
+                    <a:lstStyle/>
+                    <a:p>
+                      <a:r>
+                        <a:rPr lang="en-US" sz="1200" dirty="0"/>
+                        <a:t>Broadcasts when done</a:t>
+                      </a:r>
+                    </a:p>
+                  </a:txBody>
+                  <a:tcPr/>
+                </a:tc>
+                <a:extLst>
+                  <a:ext uri="{0D108BD9-81ED-4DB2-BD59-A6C34878D82A}">
+                    <a16:rowId xmlns:a16="http://schemas.microsoft.com/office/drawing/2014/main" val="1180559061"/>
+                  </a:ext>
+                </a:extLst>
+              </a:tr>
+              <a:tr h="164525">
+                <a:tc>
+                  <a:txBody>
+                    <a:bodyPr/>
+                    <a:lstStyle/>
+                    <a:p>
+                      <a:r>
+                        <a:rPr lang="en-US" sz="1200" dirty="0" err="1"/>
+                        <a:t>App.started</a:t>
+                      </a:r>
+                      <a:endParaRPr lang="en-US" sz="1200" dirty="0"/>
+                    </a:p>
+                  </a:txBody>
+                  <a:tcPr/>
+                </a:tc>
+                <a:tc>
+                  <a:txBody>
+                    <a:bodyPr/>
+                    <a:lstStyle/>
+                    <a:p>
+                      <a:r>
+                        <a:rPr lang="en-US" sz="1200" dirty="0" err="1"/>
+                        <a:t>Org_factory.load_all</a:t>
+                      </a:r>
+                      <a:endParaRPr lang="en-US" sz="1200" dirty="0"/>
+                    </a:p>
+                  </a:txBody>
+                  <a:tcPr/>
+                </a:tc>
+                <a:tc>
+                  <a:txBody>
+                    <a:bodyPr/>
+                    <a:lstStyle/>
+                    <a:p>
+                      <a:r>
+                        <a:rPr lang="en-US" sz="1200" dirty="0"/>
+                        <a:t>Loads Org1</a:t>
+                      </a:r>
+                    </a:p>
+                  </a:txBody>
+                  <a:tcPr/>
+                </a:tc>
+                <a:tc>
+                  <a:txBody>
+                    <a:bodyPr/>
+                    <a:lstStyle/>
+                    <a:p>
+                      <a:r>
+                        <a:rPr lang="en-US" sz="1200" dirty="0"/>
+                        <a:t>Org1.loaded</a:t>
+                      </a:r>
+                    </a:p>
+                  </a:txBody>
+                  <a:tcPr/>
+                </a:tc>
+                <a:extLst>
+                  <a:ext uri="{0D108BD9-81ED-4DB2-BD59-A6C34878D82A}">
+                    <a16:rowId xmlns:a16="http://schemas.microsoft.com/office/drawing/2014/main" val="1083308008"/>
+                  </a:ext>
+                </a:extLst>
+              </a:tr>
+              <a:tr h="164525">
+                <a:tc>
+                  <a:txBody>
+                    <a:bodyPr/>
+                    <a:lstStyle/>
+                    <a:p>
+                      <a:endParaRPr lang="en-US" sz="1200" dirty="0"/>
+                    </a:p>
+                  </a:txBody>
+                  <a:tcPr/>
+                </a:tc>
+                <a:tc>
+                  <a:txBody>
+                    <a:bodyPr/>
+                    <a:lstStyle/>
+                    <a:p>
+                      <a:endParaRPr lang="en-US" sz="1200" dirty="0"/>
+                    </a:p>
+                  </a:txBody>
+                  <a:tcPr/>
+                </a:tc>
+                <a:tc>
+                  <a:txBody>
+                    <a:bodyPr/>
+                    <a:lstStyle/>
+                    <a:p>
+                      <a:r>
+                        <a:rPr lang="en-US" sz="1200" dirty="0"/>
+                        <a:t>Loads Org2</a:t>
+                      </a:r>
+                    </a:p>
+                  </a:txBody>
+                  <a:tcPr/>
+                </a:tc>
+                <a:tc>
+                  <a:txBody>
+                    <a:bodyPr/>
+                    <a:lstStyle/>
+                    <a:p>
+                      <a:r>
+                        <a:rPr lang="en-US" sz="1200" dirty="0"/>
+                        <a:t>Org2.loaded</a:t>
+                      </a:r>
+                    </a:p>
+                  </a:txBody>
+                  <a:tcPr/>
+                </a:tc>
+                <a:extLst>
+                  <a:ext uri="{0D108BD9-81ED-4DB2-BD59-A6C34878D82A}">
+                    <a16:rowId xmlns:a16="http://schemas.microsoft.com/office/drawing/2014/main" val="1981370365"/>
+                  </a:ext>
+                </a:extLst>
+              </a:tr>
+              <a:tr h="164525">
+                <a:tc>
+                  <a:txBody>
+                    <a:bodyPr/>
+                    <a:lstStyle/>
+                    <a:p>
+                      <a:r>
+                        <a:rPr lang="en-US" sz="1200" dirty="0" err="1"/>
+                        <a:t>OrgN.loaded</a:t>
+                      </a:r>
+                      <a:endParaRPr lang="en-US" sz="1200" dirty="0"/>
+                    </a:p>
+                  </a:txBody>
+                  <a:tcPr/>
+                </a:tc>
+                <a:tc>
+                  <a:txBody>
+                    <a:bodyPr/>
+                    <a:lstStyle/>
+                    <a:p>
+                      <a:r>
+                        <a:rPr lang="en-US" sz="1200" dirty="0" err="1"/>
+                        <a:t>OrgN.systems.load_all</a:t>
+                      </a:r>
+                      <a:endParaRPr lang="en-US" sz="1200" dirty="0"/>
+                    </a:p>
+                  </a:txBody>
+                  <a:tcPr/>
+                </a:tc>
+                <a:tc>
+                  <a:txBody>
+                    <a:bodyPr/>
+                    <a:lstStyle/>
+                    <a:p>
+                      <a:r>
+                        <a:rPr lang="en-US" sz="1200" dirty="0"/>
+                        <a:t>Loads systems in </a:t>
+                      </a:r>
+                      <a:r>
+                        <a:rPr lang="en-US" sz="1200" dirty="0" err="1"/>
+                        <a:t>OrgN</a:t>
+                      </a:r>
+                      <a:endParaRPr lang="en-US" sz="1200" dirty="0"/>
+                    </a:p>
+                  </a:txBody>
+                  <a:tcPr/>
+                </a:tc>
+                <a:tc>
+                  <a:txBody>
+                    <a:bodyPr/>
+                    <a:lstStyle/>
+                    <a:p>
+                      <a:r>
+                        <a:rPr lang="en-US" sz="1200" dirty="0" err="1"/>
+                        <a:t>OrgN.systems.loaded</a:t>
+                      </a:r>
+                      <a:endParaRPr lang="en-US" sz="1200" dirty="0"/>
+                    </a:p>
+                  </a:txBody>
+                  <a:tcPr/>
+                </a:tc>
+                <a:extLst>
+                  <a:ext uri="{0D108BD9-81ED-4DB2-BD59-A6C34878D82A}">
+                    <a16:rowId xmlns:a16="http://schemas.microsoft.com/office/drawing/2014/main" val="807168312"/>
+                  </a:ext>
+                </a:extLst>
+              </a:tr>
+              <a:tr h="164525">
+                <a:tc>
+                  <a:txBody>
+                    <a:bodyPr/>
+                    <a:lstStyle/>
+                    <a:p>
+                      <a:r>
+                        <a:rPr lang="en-US" sz="1200" dirty="0" err="1"/>
+                        <a:t>OrgN.creds.requested</a:t>
+                      </a:r>
+                      <a:endParaRPr lang="en-US" sz="1200" dirty="0"/>
+                    </a:p>
+                  </a:txBody>
+                  <a:tcPr/>
+                </a:tc>
+                <a:tc>
+                  <a:txBody>
+                    <a:bodyPr/>
+                    <a:lstStyle/>
+                    <a:p>
+                      <a:r>
+                        <a:rPr lang="en-US" sz="1200" dirty="0" err="1"/>
+                        <a:t>OrgYYY.creds.load</a:t>
+                      </a:r>
+                      <a:endParaRPr lang="en-US" sz="1200" dirty="0"/>
+                    </a:p>
+                  </a:txBody>
+                  <a:tcPr/>
+                </a:tc>
+                <a:tc>
+                  <a:txBody>
+                    <a:bodyPr/>
+                    <a:lstStyle/>
+                    <a:p>
+                      <a:r>
+                        <a:rPr lang="en-US" sz="1200" dirty="0"/>
+                        <a:t>Loads creds from </a:t>
+                      </a:r>
+                      <a:r>
+                        <a:rPr lang="en-US" sz="1200" dirty="0" err="1"/>
+                        <a:t>OrgYYY</a:t>
+                      </a:r>
+                      <a:endParaRPr lang="en-US" sz="1200" dirty="0"/>
+                    </a:p>
+                  </a:txBody>
+                  <a:tcPr/>
+                </a:tc>
+                <a:tc>
+                  <a:txBody>
+                    <a:bodyPr/>
+                    <a:lstStyle/>
+                    <a:p>
+                      <a:r>
+                        <a:rPr lang="en-US" sz="1200" dirty="0" err="1"/>
+                        <a:t>OrgYYY.creds.supplied</a:t>
+                      </a:r>
+                      <a:endParaRPr lang="en-US" sz="1200" dirty="0"/>
+                    </a:p>
+                  </a:txBody>
+                  <a:tcPr/>
+                </a:tc>
+                <a:extLst>
+                  <a:ext uri="{0D108BD9-81ED-4DB2-BD59-A6C34878D82A}">
+                    <a16:rowId xmlns:a16="http://schemas.microsoft.com/office/drawing/2014/main" val="41039171"/>
+                  </a:ext>
+                </a:extLst>
+              </a:tr>
+              <a:tr h="164525">
+                <a:tc>
+                  <a:txBody>
+                    <a:bodyPr/>
+                    <a:lstStyle/>
+                    <a:p>
+                      <a:r>
+                        <a:rPr lang="en-US" sz="1200" dirty="0" err="1"/>
+                        <a:t>OrgN.loaded</a:t>
+                      </a:r>
+                      <a:endParaRPr lang="en-US" sz="1200" dirty="0"/>
+                    </a:p>
+                  </a:txBody>
+                  <a:tcPr/>
+                </a:tc>
+                <a:tc>
+                  <a:txBody>
+                    <a:bodyPr/>
+                    <a:lstStyle/>
+                    <a:p>
+                      <a:r>
+                        <a:rPr lang="en-US" sz="1200" dirty="0" err="1"/>
+                        <a:t>OrgN.collections.load_all</a:t>
+                      </a:r>
+                      <a:endParaRPr lang="en-US" sz="1200" dirty="0"/>
+                    </a:p>
+                  </a:txBody>
+                  <a:tcPr/>
+                </a:tc>
+                <a:tc>
+                  <a:txBody>
+                    <a:bodyPr/>
+                    <a:lstStyle/>
+                    <a:p>
+                      <a:r>
+                        <a:rPr lang="en-US" sz="1200" dirty="0"/>
+                        <a:t>Loads collections in </a:t>
+                      </a:r>
+                      <a:r>
+                        <a:rPr lang="en-US" sz="1200" dirty="0" err="1"/>
+                        <a:t>OrgN</a:t>
+                      </a:r>
+                      <a:endParaRPr lang="en-US" sz="1200" dirty="0"/>
+                    </a:p>
+                  </a:txBody>
+                  <a:tcPr/>
+                </a:tc>
+                <a:tc>
+                  <a:txBody>
+                    <a:bodyPr/>
+                    <a:lstStyle/>
+                    <a:p>
+                      <a:r>
+                        <a:rPr lang="en-US" sz="1200" dirty="0" err="1"/>
+                        <a:t>OrgN.collections.loaded</a:t>
+                      </a:r>
+                      <a:endParaRPr lang="en-US" sz="1200" dirty="0"/>
+                    </a:p>
+                  </a:txBody>
+                  <a:tcPr/>
+                </a:tc>
+                <a:extLst>
+                  <a:ext uri="{0D108BD9-81ED-4DB2-BD59-A6C34878D82A}">
+                    <a16:rowId xmlns:a16="http://schemas.microsoft.com/office/drawing/2014/main" val="528432841"/>
+                  </a:ext>
+                </a:extLst>
+              </a:tr>
+              <a:tr h="164525">
+                <a:tc>
+                  <a:txBody>
+                    <a:bodyPr/>
+                    <a:lstStyle/>
+                    <a:p>
+                      <a:r>
+                        <a:rPr lang="en-US" sz="1200" dirty="0" err="1"/>
+                        <a:t>OrgN.jobs.requested</a:t>
+                      </a:r>
+                      <a:endParaRPr lang="en-US" sz="1200" dirty="0"/>
+                    </a:p>
+                  </a:txBody>
+                  <a:tcPr/>
+                </a:tc>
+                <a:tc>
+                  <a:txBody>
+                    <a:bodyPr/>
+                    <a:lstStyle/>
+                    <a:p>
+                      <a:r>
+                        <a:rPr lang="en-US" sz="1200" dirty="0" err="1"/>
+                        <a:t>OrgN.jobs.load_all</a:t>
+                      </a:r>
+                      <a:endParaRPr lang="en-US" sz="1200" dirty="0"/>
+                    </a:p>
+                  </a:txBody>
+                  <a:tcPr/>
+                </a:tc>
+                <a:tc>
+                  <a:txBody>
+                    <a:bodyPr/>
+                    <a:lstStyle/>
+                    <a:p>
+                      <a:r>
+                        <a:rPr lang="en-US" sz="1200" dirty="0"/>
+                        <a:t>Loads all jobs in collection</a:t>
+                      </a:r>
+                    </a:p>
+                  </a:txBody>
+                  <a:tcPr/>
+                </a:tc>
+                <a:tc>
+                  <a:txBody>
+                    <a:bodyPr/>
+                    <a:lstStyle/>
+                    <a:p>
+                      <a:r>
+                        <a:rPr lang="en-US" sz="1200" dirty="0" err="1"/>
+                        <a:t>OrgN.collection.jobs.loaded</a:t>
+                      </a:r>
+                      <a:endParaRPr lang="en-US" sz="1200" dirty="0"/>
+                    </a:p>
+                  </a:txBody>
+                  <a:tcPr/>
+                </a:tc>
+                <a:extLst>
+                  <a:ext uri="{0D108BD9-81ED-4DB2-BD59-A6C34878D82A}">
+                    <a16:rowId xmlns:a16="http://schemas.microsoft.com/office/drawing/2014/main" val="2048373270"/>
+                  </a:ext>
+                </a:extLst>
+              </a:tr>
+              <a:tr h="164525">
+                <a:tc>
+                  <a:txBody>
+                    <a:bodyPr/>
+                    <a:lstStyle/>
+                    <a:p>
+                      <a:r>
+                        <a:rPr lang="en-US" sz="1200" dirty="0" err="1"/>
+                        <a:t>OrgN.steps.requested</a:t>
+                      </a:r>
+                      <a:endParaRPr lang="en-US" sz="1200" dirty="0"/>
+                    </a:p>
+                  </a:txBody>
+                  <a:tcPr/>
+                </a:tc>
+                <a:tc>
+                  <a:txBody>
+                    <a:bodyPr/>
+                    <a:lstStyle/>
+                    <a:p>
+                      <a:r>
+                        <a:rPr lang="en-US" sz="1200" dirty="0" err="1"/>
+                        <a:t>OrgN.steps.load_all</a:t>
+                      </a:r>
+                      <a:endParaRPr lang="en-US" sz="1200" dirty="0"/>
+                    </a:p>
+                  </a:txBody>
+                  <a:tcPr/>
+                </a:tc>
+                <a:tc>
+                  <a:txBody>
+                    <a:bodyPr/>
+                    <a:lstStyle/>
+                    <a:p>
+                      <a:r>
+                        <a:rPr lang="en-US" sz="1200" dirty="0"/>
+                        <a:t>Loads all steps in job</a:t>
+                      </a:r>
+                    </a:p>
+                  </a:txBody>
+                  <a:tcPr/>
+                </a:tc>
+                <a:tc>
+                  <a:txBody>
+                    <a:bodyPr/>
+                    <a:lstStyle/>
+                    <a:p>
+                      <a:r>
+                        <a:rPr lang="en-US" sz="1200" dirty="0" err="1"/>
+                        <a:t>OrgN.collection.job.steps.loaded</a:t>
+                      </a:r>
+                      <a:endParaRPr lang="en-US" sz="1200" dirty="0"/>
+                    </a:p>
+                  </a:txBody>
+                  <a:tcPr/>
+                </a:tc>
+                <a:extLst>
+                  <a:ext uri="{0D108BD9-81ED-4DB2-BD59-A6C34878D82A}">
+                    <a16:rowId xmlns:a16="http://schemas.microsoft.com/office/drawing/2014/main" val="1603864920"/>
+                  </a:ext>
+                </a:extLst>
+              </a:tr>
+              <a:tr h="164525">
+                <a:tc>
+                  <a:txBody>
+                    <a:bodyPr/>
+                    <a:lstStyle/>
+                    <a:p>
+                      <a:r>
+                        <a:rPr lang="en-US" sz="1200" dirty="0" err="1"/>
+                        <a:t>OrgYYY.step.override.requested</a:t>
+                      </a:r>
+                      <a:endParaRPr lang="en-US" sz="1200" dirty="0"/>
+                    </a:p>
+                  </a:txBody>
+                  <a:tcPr/>
+                </a:tc>
+                <a:tc>
+                  <a:txBody>
+                    <a:bodyPr/>
+                    <a:lstStyle/>
+                    <a:p>
+                      <a:r>
+                        <a:rPr lang="en-US" sz="1200" dirty="0" err="1"/>
+                        <a:t>OrgYYY.get_step</a:t>
+                      </a:r>
+                      <a:endParaRPr lang="en-US" sz="1200" dirty="0"/>
+                    </a:p>
+                  </a:txBody>
+                  <a:tcPr/>
+                </a:tc>
+                <a:tc>
+                  <a:txBody>
+                    <a:bodyPr/>
+                    <a:lstStyle/>
+                    <a:p>
+                      <a:r>
+                        <a:rPr lang="en-US" sz="1200" dirty="0"/>
+                        <a:t>Provides override step back to caller</a:t>
+                      </a:r>
+                    </a:p>
+                  </a:txBody>
+                  <a:tcPr/>
+                </a:tc>
+                <a:tc>
+                  <a:txBody>
+                    <a:bodyPr/>
+                    <a:lstStyle/>
+                    <a:p>
+                      <a:r>
+                        <a:rPr lang="en-US" sz="1200" dirty="0" err="1"/>
+                        <a:t>OrgYYY.step.override.provided</a:t>
+                      </a:r>
+                      <a:endParaRPr lang="en-US" sz="1200" dirty="0"/>
+                    </a:p>
+                  </a:txBody>
+                  <a:tcPr/>
+                </a:tc>
+                <a:extLst>
+                  <a:ext uri="{0D108BD9-81ED-4DB2-BD59-A6C34878D82A}">
+                    <a16:rowId xmlns:a16="http://schemas.microsoft.com/office/drawing/2014/main" val="2840145097"/>
+                  </a:ext>
+                </a:extLst>
+              </a:tr>
+              <a:tr h="164525">
+                <a:tc>
+                  <a:txBody>
+                    <a:bodyPr/>
+                    <a:lstStyle/>
+                    <a:p>
+                      <a:r>
+                        <a:rPr lang="en-US" sz="1200" dirty="0" err="1"/>
+                        <a:t>OrgN.step.compile.requested</a:t>
+                      </a:r>
+                      <a:endParaRPr lang="en-US" sz="1200" dirty="0"/>
+                    </a:p>
+                  </a:txBody>
+                  <a:tcPr/>
+                </a:tc>
+                <a:tc>
+                  <a:txBody>
+                    <a:bodyPr/>
+                    <a:lstStyle/>
+                    <a:p>
+                      <a:r>
+                        <a:rPr lang="en-US" sz="1200" dirty="0" err="1"/>
+                        <a:t>OrgN.col.job.step.compile</a:t>
+                      </a:r>
+                      <a:endParaRPr lang="en-US" sz="1200" dirty="0"/>
+                    </a:p>
+                  </a:txBody>
+                  <a:tcPr/>
+                </a:tc>
+                <a:tc>
+                  <a:txBody>
+                    <a:bodyPr/>
+                    <a:lstStyle/>
+                    <a:p>
+                      <a:r>
+                        <a:rPr lang="en-US" sz="1200" dirty="0"/>
+                        <a:t>Applies all templates/variables</a:t>
+                      </a:r>
+                    </a:p>
+                  </a:txBody>
+                  <a:tcPr/>
+                </a:tc>
+                <a:tc>
+                  <a:txBody>
+                    <a:bodyPr/>
+                    <a:lstStyle/>
+                    <a:p>
+                      <a:r>
+                        <a:rPr lang="en-US" sz="1200" dirty="0" err="1"/>
+                        <a:t>OrgN.step.compile.complete</a:t>
+                      </a:r>
+                      <a:endParaRPr lang="en-US" sz="1200" dirty="0"/>
+                    </a:p>
+                  </a:txBody>
+                  <a:tcPr/>
+                </a:tc>
+                <a:extLst>
+                  <a:ext uri="{0D108BD9-81ED-4DB2-BD59-A6C34878D82A}">
+                    <a16:rowId xmlns:a16="http://schemas.microsoft.com/office/drawing/2014/main" val="30178052"/>
+                  </a:ext>
+                </a:extLst>
+              </a:tr>
+              <a:tr h="164525">
+                <a:tc>
+                  <a:txBody>
+                    <a:bodyPr/>
+                    <a:lstStyle/>
+                    <a:p>
+                      <a:endParaRPr lang="en-US" sz="1200" dirty="0"/>
+                    </a:p>
+                  </a:txBody>
+                  <a:tcPr/>
+                </a:tc>
+                <a:tc>
+                  <a:txBody>
+                    <a:bodyPr/>
+                    <a:lstStyle/>
+                    <a:p>
+                      <a:endParaRPr lang="en-US" sz="1200" dirty="0"/>
+                    </a:p>
+                  </a:txBody>
+                  <a:tcPr/>
+                </a:tc>
+                <a:tc>
+                  <a:txBody>
+                    <a:bodyPr/>
+                    <a:lstStyle/>
+                    <a:p>
+                      <a:endParaRPr lang="en-US" sz="1200" dirty="0"/>
+                    </a:p>
+                  </a:txBody>
+                  <a:tcPr/>
+                </a:tc>
+                <a:tc>
+                  <a:txBody>
+                    <a:bodyPr/>
+                    <a:lstStyle/>
+                    <a:p>
+                      <a:endParaRPr lang="en-US" sz="1200" dirty="0"/>
+                    </a:p>
+                  </a:txBody>
+                  <a:tcPr/>
+                </a:tc>
+                <a:extLst>
+                  <a:ext uri="{0D108BD9-81ED-4DB2-BD59-A6C34878D82A}">
+                    <a16:rowId xmlns:a16="http://schemas.microsoft.com/office/drawing/2014/main" val="442227627"/>
+                  </a:ext>
+                </a:extLst>
+              </a:tr>
+            </a:tbl>
+          </a:graphicData>
+        </a:graphic>
+      </p:graphicFrame>
+    </p:spTree>
+    <p:extLst>
+      <p:ext uri="{BB962C8B-B14F-4D97-AF65-F5344CB8AC3E}">
+        <p14:creationId xmlns:p14="http://schemas.microsoft.com/office/powerpoint/2010/main" val="2037531449"/>
+      </p:ext>
+    </p:extLst>
+  </p:cSld>
+  <p:clrMapOvr>
+    <a:masterClrMapping/>
+  </p:clrMapOvr>
+</p:sld>
+</file>
+
 <file path=ppt/theme/theme1.xml><?xml version="1.0" encoding="utf-8"?>
 <a:theme xmlns:a="http://schemas.openxmlformats.org/drawingml/2006/main" name="Office Theme">
   <a:themeElements>

</xml_diff>

<commit_message>
adding pptx back in
</commit_message>
<xml_diff>
--- a/application architecture.pptx
+++ b/application architecture.pptx
@@ -261,7 +261,7 @@
           <a:p>
             <a:fld id="{07EF651F-741F-4CB6-9DFD-1591365E5B28}" type="datetimeFigureOut">
               <a:rPr lang="en-US" smtClean="0"/>
-              <a:t>2/6/22</a:t>
+              <a:t>2/26/22</a:t>
             </a:fld>
             <a:endParaRPr lang="en-US"/>
           </a:p>
@@ -459,7 +459,7 @@
           <a:p>
             <a:fld id="{07EF651F-741F-4CB6-9DFD-1591365E5B28}" type="datetimeFigureOut">
               <a:rPr lang="en-US" smtClean="0"/>
-              <a:t>2/6/22</a:t>
+              <a:t>2/26/22</a:t>
             </a:fld>
             <a:endParaRPr lang="en-US"/>
           </a:p>
@@ -667,7 +667,7 @@
           <a:p>
             <a:fld id="{07EF651F-741F-4CB6-9DFD-1591365E5B28}" type="datetimeFigureOut">
               <a:rPr lang="en-US" smtClean="0"/>
-              <a:t>2/6/22</a:t>
+              <a:t>2/26/22</a:t>
             </a:fld>
             <a:endParaRPr lang="en-US"/>
           </a:p>
@@ -865,7 +865,7 @@
           <a:p>
             <a:fld id="{07EF651F-741F-4CB6-9DFD-1591365E5B28}" type="datetimeFigureOut">
               <a:rPr lang="en-US" smtClean="0"/>
-              <a:t>2/6/22</a:t>
+              <a:t>2/26/22</a:t>
             </a:fld>
             <a:endParaRPr lang="en-US"/>
           </a:p>
@@ -1140,7 +1140,7 @@
           <a:p>
             <a:fld id="{07EF651F-741F-4CB6-9DFD-1591365E5B28}" type="datetimeFigureOut">
               <a:rPr lang="en-US" smtClean="0"/>
-              <a:t>2/6/22</a:t>
+              <a:t>2/26/22</a:t>
             </a:fld>
             <a:endParaRPr lang="en-US"/>
           </a:p>
@@ -1405,7 +1405,7 @@
           <a:p>
             <a:fld id="{07EF651F-741F-4CB6-9DFD-1591365E5B28}" type="datetimeFigureOut">
               <a:rPr lang="en-US" smtClean="0"/>
-              <a:t>2/6/22</a:t>
+              <a:t>2/26/22</a:t>
             </a:fld>
             <a:endParaRPr lang="en-US"/>
           </a:p>
@@ -1817,7 +1817,7 @@
           <a:p>
             <a:fld id="{07EF651F-741F-4CB6-9DFD-1591365E5B28}" type="datetimeFigureOut">
               <a:rPr lang="en-US" smtClean="0"/>
-              <a:t>2/6/22</a:t>
+              <a:t>2/26/22</a:t>
             </a:fld>
             <a:endParaRPr lang="en-US"/>
           </a:p>
@@ -1958,7 +1958,7 @@
           <a:p>
             <a:fld id="{07EF651F-741F-4CB6-9DFD-1591365E5B28}" type="datetimeFigureOut">
               <a:rPr lang="en-US" smtClean="0"/>
-              <a:t>2/6/22</a:t>
+              <a:t>2/26/22</a:t>
             </a:fld>
             <a:endParaRPr lang="en-US"/>
           </a:p>
@@ -2071,7 +2071,7 @@
           <a:p>
             <a:fld id="{07EF651F-741F-4CB6-9DFD-1591365E5B28}" type="datetimeFigureOut">
               <a:rPr lang="en-US" smtClean="0"/>
-              <a:t>2/6/22</a:t>
+              <a:t>2/26/22</a:t>
             </a:fld>
             <a:endParaRPr lang="en-US"/>
           </a:p>
@@ -2382,7 +2382,7 @@
           <a:p>
             <a:fld id="{07EF651F-741F-4CB6-9DFD-1591365E5B28}" type="datetimeFigureOut">
               <a:rPr lang="en-US" smtClean="0"/>
-              <a:t>2/6/22</a:t>
+              <a:t>2/26/22</a:t>
             </a:fld>
             <a:endParaRPr lang="en-US"/>
           </a:p>
@@ -2670,7 +2670,7 @@
           <a:p>
             <a:fld id="{07EF651F-741F-4CB6-9DFD-1591365E5B28}" type="datetimeFigureOut">
               <a:rPr lang="en-US" smtClean="0"/>
-              <a:t>2/6/22</a:t>
+              <a:t>2/26/22</a:t>
             </a:fld>
             <a:endParaRPr lang="en-US"/>
           </a:p>
@@ -2911,7 +2911,7 @@
           <a:p>
             <a:fld id="{07EF651F-741F-4CB6-9DFD-1591365E5B28}" type="datetimeFigureOut">
               <a:rPr lang="en-US" smtClean="0"/>
-              <a:t>2/6/22</a:t>
+              <a:t>2/26/22</a:t>
             </a:fld>
             <a:endParaRPr lang="en-US"/>
           </a:p>
@@ -6661,9 +6661,10 @@
           </a:p>
           <a:p>
             <a:r>
-              <a:rPr lang="en-US" sz="2000" dirty="0"/>
-              <a:t>Org:</a:t>
-            </a:r>
+              <a:rPr lang="en-US" sz="2000"/>
+              <a:t>Org: </a:t>
+            </a:r>
+            <a:endParaRPr lang="en-US" sz="2000" dirty="0"/>
           </a:p>
           <a:p>
             <a:pPr lvl="1"/>

</xml_diff>

<commit_message>
START OVER FROM SCRATCH
</commit_message>
<xml_diff>
--- a/application architecture.pptx
+++ b/application architecture.pptx
@@ -5,9 +5,12 @@
     <p:sldMasterId id="2147483648" r:id="rId1"/>
   </p:sldMasterIdLst>
   <p:sldIdLst>
-    <p:sldId id="256" r:id="rId2"/>
-    <p:sldId id="257" r:id="rId3"/>
-    <p:sldId id="258" r:id="rId4"/>
+    <p:sldId id="260" r:id="rId2"/>
+    <p:sldId id="261" r:id="rId3"/>
+    <p:sldId id="259" r:id="rId4"/>
+    <p:sldId id="256" r:id="rId5"/>
+    <p:sldId id="257" r:id="rId6"/>
+    <p:sldId id="258" r:id="rId7"/>
   </p:sldIdLst>
   <p:sldSz cx="12192000" cy="6858000"/>
   <p:notesSz cx="6858000" cy="9144000"/>
@@ -261,7 +264,7 @@
           <a:p>
             <a:fld id="{07EF651F-741F-4CB6-9DFD-1591365E5B28}" type="datetimeFigureOut">
               <a:rPr lang="en-US" smtClean="0"/>
-              <a:t>2/26/22</a:t>
+              <a:t>7/30/23</a:t>
             </a:fld>
             <a:endParaRPr lang="en-US"/>
           </a:p>
@@ -459,7 +462,7 @@
           <a:p>
             <a:fld id="{07EF651F-741F-4CB6-9DFD-1591365E5B28}" type="datetimeFigureOut">
               <a:rPr lang="en-US" smtClean="0"/>
-              <a:t>2/26/22</a:t>
+              <a:t>7/30/23</a:t>
             </a:fld>
             <a:endParaRPr lang="en-US"/>
           </a:p>
@@ -667,7 +670,7 @@
           <a:p>
             <a:fld id="{07EF651F-741F-4CB6-9DFD-1591365E5B28}" type="datetimeFigureOut">
               <a:rPr lang="en-US" smtClean="0"/>
-              <a:t>2/26/22</a:t>
+              <a:t>7/30/23</a:t>
             </a:fld>
             <a:endParaRPr lang="en-US"/>
           </a:p>
@@ -865,7 +868,7 @@
           <a:p>
             <a:fld id="{07EF651F-741F-4CB6-9DFD-1591365E5B28}" type="datetimeFigureOut">
               <a:rPr lang="en-US" smtClean="0"/>
-              <a:t>2/26/22</a:t>
+              <a:t>7/30/23</a:t>
             </a:fld>
             <a:endParaRPr lang="en-US"/>
           </a:p>
@@ -1140,7 +1143,7 @@
           <a:p>
             <a:fld id="{07EF651F-741F-4CB6-9DFD-1591365E5B28}" type="datetimeFigureOut">
               <a:rPr lang="en-US" smtClean="0"/>
-              <a:t>2/26/22</a:t>
+              <a:t>7/30/23</a:t>
             </a:fld>
             <a:endParaRPr lang="en-US"/>
           </a:p>
@@ -1405,7 +1408,7 @@
           <a:p>
             <a:fld id="{07EF651F-741F-4CB6-9DFD-1591365E5B28}" type="datetimeFigureOut">
               <a:rPr lang="en-US" smtClean="0"/>
-              <a:t>2/26/22</a:t>
+              <a:t>7/30/23</a:t>
             </a:fld>
             <a:endParaRPr lang="en-US"/>
           </a:p>
@@ -1817,7 +1820,7 @@
           <a:p>
             <a:fld id="{07EF651F-741F-4CB6-9DFD-1591365E5B28}" type="datetimeFigureOut">
               <a:rPr lang="en-US" smtClean="0"/>
-              <a:t>2/26/22</a:t>
+              <a:t>7/30/23</a:t>
             </a:fld>
             <a:endParaRPr lang="en-US"/>
           </a:p>
@@ -1958,7 +1961,7 @@
           <a:p>
             <a:fld id="{07EF651F-741F-4CB6-9DFD-1591365E5B28}" type="datetimeFigureOut">
               <a:rPr lang="en-US" smtClean="0"/>
-              <a:t>2/26/22</a:t>
+              <a:t>7/30/23</a:t>
             </a:fld>
             <a:endParaRPr lang="en-US"/>
           </a:p>
@@ -2071,7 +2074,7 @@
           <a:p>
             <a:fld id="{07EF651F-741F-4CB6-9DFD-1591365E5B28}" type="datetimeFigureOut">
               <a:rPr lang="en-US" smtClean="0"/>
-              <a:t>2/26/22</a:t>
+              <a:t>7/30/23</a:t>
             </a:fld>
             <a:endParaRPr lang="en-US"/>
           </a:p>
@@ -2382,7 +2385,7 @@
           <a:p>
             <a:fld id="{07EF651F-741F-4CB6-9DFD-1591365E5B28}" type="datetimeFigureOut">
               <a:rPr lang="en-US" smtClean="0"/>
-              <a:t>2/26/22</a:t>
+              <a:t>7/30/23</a:t>
             </a:fld>
             <a:endParaRPr lang="en-US"/>
           </a:p>
@@ -2670,7 +2673,7 @@
           <a:p>
             <a:fld id="{07EF651F-741F-4CB6-9DFD-1591365E5B28}" type="datetimeFigureOut">
               <a:rPr lang="en-US" smtClean="0"/>
-              <a:t>2/26/22</a:t>
+              <a:t>7/30/23</a:t>
             </a:fld>
             <a:endParaRPr lang="en-US"/>
           </a:p>
@@ -2911,7 +2914,7 @@
           <a:p>
             <a:fld id="{07EF651F-741F-4CB6-9DFD-1591365E5B28}" type="datetimeFigureOut">
               <a:rPr lang="en-US" smtClean="0"/>
-              <a:t>2/26/22</a:t>
+              <a:t>7/30/23</a:t>
             </a:fld>
             <a:endParaRPr lang="en-US"/>
           </a:p>
@@ -3312,6 +3315,4395 @@
 </file>
 
 <file path=ppt/slides/slide1.xml><?xml version="1.0" encoding="utf-8"?>
+<p:sld xmlns:a="http://schemas.openxmlformats.org/drawingml/2006/main" xmlns:r="http://schemas.openxmlformats.org/officeDocument/2006/relationships" xmlns:p="http://schemas.openxmlformats.org/presentationml/2006/main">
+  <p:cSld>
+    <p:spTree>
+      <p:nvGrpSpPr>
+        <p:cNvPr id="1" name=""/>
+        <p:cNvGrpSpPr/>
+        <p:nvPr/>
+      </p:nvGrpSpPr>
+      <p:grpSpPr>
+        <a:xfrm>
+          <a:off x="0" y="0"/>
+          <a:ext cx="0" cy="0"/>
+          <a:chOff x="0" y="0"/>
+          <a:chExt cx="0" cy="0"/>
+        </a:xfrm>
+      </p:grpSpPr>
+      <p:sp>
+        <p:nvSpPr>
+          <p:cNvPr id="2" name="Title 1">
+            <a:extLst>
+              <a:ext uri="{FF2B5EF4-FFF2-40B4-BE49-F238E27FC236}">
+                <a16:creationId xmlns:a16="http://schemas.microsoft.com/office/drawing/2014/main" id="{C48EAF39-271E-DB40-9C0B-4DDA60A258C4}"/>
+              </a:ext>
+            </a:extLst>
+          </p:cNvPr>
+          <p:cNvSpPr>
+            <a:spLocks noGrp="1"/>
+          </p:cNvSpPr>
+          <p:nvPr>
+            <p:ph type="title"/>
+          </p:nvPr>
+        </p:nvSpPr>
+        <p:spPr/>
+        <p:txBody>
+          <a:bodyPr/>
+          <a:lstStyle/>
+          <a:p>
+            <a:r>
+              <a:rPr lang="en-US" dirty="0"/>
+              <a:t>Script Examples</a:t>
+            </a:r>
+          </a:p>
+        </p:txBody>
+      </p:sp>
+      <p:sp>
+        <p:nvSpPr>
+          <p:cNvPr id="4" name="Content Placeholder 3">
+            <a:extLst>
+              <a:ext uri="{FF2B5EF4-FFF2-40B4-BE49-F238E27FC236}">
+                <a16:creationId xmlns:a16="http://schemas.microsoft.com/office/drawing/2014/main" id="{82FCF8DA-022A-1E48-AF54-FDCED91DFD27}"/>
+              </a:ext>
+            </a:extLst>
+          </p:cNvPr>
+          <p:cNvSpPr>
+            <a:spLocks noGrp="1"/>
+          </p:cNvSpPr>
+          <p:nvPr>
+            <p:ph sz="half" idx="2"/>
+          </p:nvPr>
+        </p:nvSpPr>
+        <p:spPr>
+          <a:xfrm>
+            <a:off x="367747" y="1490869"/>
+            <a:ext cx="4332902" cy="4666215"/>
+          </a:xfrm>
+          <a:ln>
+            <a:solidFill>
+              <a:schemeClr val="bg1">
+                <a:lumMod val="50000"/>
+              </a:schemeClr>
+            </a:solidFill>
+          </a:ln>
+        </p:spPr>
+        <p:txBody>
+          <a:bodyPr>
+            <a:normAutofit/>
+          </a:bodyPr>
+          <a:lstStyle/>
+          <a:p>
+            <a:pPr marL="0" indent="0">
+              <a:lnSpc>
+                <a:spcPct val="100000"/>
+              </a:lnSpc>
+              <a:spcBef>
+                <a:spcPts val="0"/>
+              </a:spcBef>
+              <a:buNone/>
+            </a:pPr>
+            <a:r>
+              <a:rPr lang="en-US" sz="800" dirty="0">
+                <a:latin typeface="Courier New" panose="02070309020205020404" pitchFamily="49" charset="0"/>
+                <a:cs typeface="Courier New" panose="02070309020205020404" pitchFamily="49" charset="0"/>
+              </a:rPr>
+              <a:t>/* </a:t>
+            </a:r>
+            <a:r>
+              <a:rPr lang="en-US" sz="800" dirty="0" err="1">
+                <a:latin typeface="Courier New" panose="02070309020205020404" pitchFamily="49" charset="0"/>
+                <a:cs typeface="Courier New" panose="02070309020205020404" pitchFamily="49" charset="0"/>
+              </a:rPr>
+              <a:t>load.parms.script</a:t>
+            </a:r>
+            <a:r>
+              <a:rPr lang="en-US" sz="800" dirty="0">
+                <a:latin typeface="Courier New" panose="02070309020205020404" pitchFamily="49" charset="0"/>
+                <a:cs typeface="Courier New" panose="02070309020205020404" pitchFamily="49" charset="0"/>
+              </a:rPr>
+              <a:t>-defaults (last value set wins) */</a:t>
+            </a:r>
+          </a:p>
+          <a:p>
+            <a:pPr marL="0" indent="0">
+              <a:lnSpc>
+                <a:spcPct val="100000"/>
+              </a:lnSpc>
+              <a:spcBef>
+                <a:spcPts val="0"/>
+              </a:spcBef>
+              <a:buNone/>
+            </a:pPr>
+            <a:r>
+              <a:rPr lang="en-US" sz="800" dirty="0">
+                <a:latin typeface="Courier New" panose="02070309020205020404" pitchFamily="49" charset="0"/>
+                <a:cs typeface="Courier New" panose="02070309020205020404" pitchFamily="49" charset="0"/>
+              </a:rPr>
+              <a:t>{% set </a:t>
+            </a:r>
+            <a:r>
+              <a:rPr lang="en-US" sz="800" dirty="0" err="1">
+                <a:latin typeface="Courier New" panose="02070309020205020404" pitchFamily="49" charset="0"/>
+                <a:cs typeface="Courier New" panose="02070309020205020404" pitchFamily="49" charset="0"/>
+              </a:rPr>
+              <a:t>process_name</a:t>
+            </a:r>
+            <a:r>
+              <a:rPr lang="en-US" sz="800" dirty="0">
+                <a:latin typeface="Courier New" panose="02070309020205020404" pitchFamily="49" charset="0"/>
+                <a:cs typeface="Courier New" panose="02070309020205020404" pitchFamily="49" charset="0"/>
+              </a:rPr>
+              <a:t> = ‘test process name’ %} </a:t>
+            </a:r>
+          </a:p>
+          <a:p>
+            <a:pPr marL="0" indent="0">
+              <a:lnSpc>
+                <a:spcPct val="100000"/>
+              </a:lnSpc>
+              <a:spcBef>
+                <a:spcPts val="0"/>
+              </a:spcBef>
+              <a:buNone/>
+            </a:pPr>
+            <a:r>
+              <a:rPr lang="en-US" sz="800" dirty="0">
+                <a:latin typeface="Courier New" panose="02070309020205020404" pitchFamily="49" charset="0"/>
+                <a:cs typeface="Courier New" panose="02070309020205020404" pitchFamily="49" charset="0"/>
+              </a:rPr>
+              <a:t>{% set </a:t>
+            </a:r>
+            <a:r>
+              <a:rPr lang="en-US" sz="800" dirty="0" err="1">
+                <a:latin typeface="Courier New" panose="02070309020205020404" pitchFamily="49" charset="0"/>
+                <a:cs typeface="Courier New" panose="02070309020205020404" pitchFamily="49" charset="0"/>
+              </a:rPr>
+              <a:t>file_type</a:t>
+            </a:r>
+            <a:r>
+              <a:rPr lang="en-US" sz="800" dirty="0">
+                <a:latin typeface="Courier New" panose="02070309020205020404" pitchFamily="49" charset="0"/>
+                <a:cs typeface="Courier New" panose="02070309020205020404" pitchFamily="49" charset="0"/>
+              </a:rPr>
+              <a:t> = ‘csv’ %}</a:t>
+            </a:r>
+          </a:p>
+          <a:p>
+            <a:pPr marL="0" indent="0">
+              <a:lnSpc>
+                <a:spcPct val="100000"/>
+              </a:lnSpc>
+              <a:spcBef>
+                <a:spcPts val="0"/>
+              </a:spcBef>
+              <a:buNone/>
+            </a:pPr>
+            <a:endParaRPr lang="en-US" sz="800" dirty="0">
+              <a:latin typeface="Courier New" panose="02070309020205020404" pitchFamily="49" charset="0"/>
+              <a:cs typeface="Courier New" panose="02070309020205020404" pitchFamily="49" charset="0"/>
+            </a:endParaRPr>
+          </a:p>
+          <a:p>
+            <a:pPr marL="0" indent="0">
+              <a:lnSpc>
+                <a:spcPct val="100000"/>
+              </a:lnSpc>
+              <a:spcBef>
+                <a:spcPts val="0"/>
+              </a:spcBef>
+              <a:buNone/>
+            </a:pPr>
+            <a:r>
+              <a:rPr lang="en-US" sz="800" dirty="0">
+                <a:latin typeface="Courier New" panose="02070309020205020404" pitchFamily="49" charset="0"/>
+                <a:cs typeface="Courier New" panose="02070309020205020404" pitchFamily="49" charset="0"/>
+              </a:rPr>
+              <a:t>{% </a:t>
+            </a:r>
+            <a:r>
+              <a:rPr lang="en-US" sz="800" dirty="0" err="1">
+                <a:latin typeface="Courier New" panose="02070309020205020404" pitchFamily="49" charset="0"/>
+                <a:cs typeface="Courier New" panose="02070309020205020404" pitchFamily="49" charset="0"/>
+              </a:rPr>
+              <a:t>load.parms.connection</a:t>
+            </a:r>
+            <a:r>
+              <a:rPr lang="en-US" sz="800" dirty="0">
+                <a:latin typeface="Courier New" panose="02070309020205020404" pitchFamily="49" charset="0"/>
+                <a:cs typeface="Courier New" panose="02070309020205020404" pitchFamily="49" charset="0"/>
+              </a:rPr>
+              <a:t> %}</a:t>
+            </a:r>
+          </a:p>
+          <a:p>
+            <a:pPr marL="0" indent="0">
+              <a:lnSpc>
+                <a:spcPct val="100000"/>
+              </a:lnSpc>
+              <a:spcBef>
+                <a:spcPts val="0"/>
+              </a:spcBef>
+              <a:buNone/>
+            </a:pPr>
+            <a:r>
+              <a:rPr lang="en-US" sz="800" dirty="0">
+                <a:latin typeface="Courier New" panose="02070309020205020404" pitchFamily="49" charset="0"/>
+                <a:cs typeface="Courier New" panose="02070309020205020404" pitchFamily="49" charset="0"/>
+              </a:rPr>
+              <a:t>{% </a:t>
+            </a:r>
+            <a:r>
+              <a:rPr lang="en-US" sz="800" dirty="0" err="1">
+                <a:latin typeface="Courier New" panose="02070309020205020404" pitchFamily="49" charset="0"/>
+                <a:cs typeface="Courier New" panose="02070309020205020404" pitchFamily="49" charset="0"/>
+              </a:rPr>
+              <a:t>load.parms.organization</a:t>
+            </a:r>
+            <a:r>
+              <a:rPr lang="en-US" sz="800" dirty="0">
+                <a:latin typeface="Courier New" panose="02070309020205020404" pitchFamily="49" charset="0"/>
+                <a:cs typeface="Courier New" panose="02070309020205020404" pitchFamily="49" charset="0"/>
+              </a:rPr>
+              <a:t> %}</a:t>
+            </a:r>
+          </a:p>
+          <a:p>
+            <a:pPr marL="0" indent="0">
+              <a:lnSpc>
+                <a:spcPct val="100000"/>
+              </a:lnSpc>
+              <a:spcBef>
+                <a:spcPts val="0"/>
+              </a:spcBef>
+              <a:buNone/>
+            </a:pPr>
+            <a:r>
+              <a:rPr lang="en-US" sz="800" dirty="0">
+                <a:latin typeface="Courier New" panose="02070309020205020404" pitchFamily="49" charset="0"/>
+                <a:cs typeface="Courier New" panose="02070309020205020404" pitchFamily="49" charset="0"/>
+              </a:rPr>
+              <a:t>{% </a:t>
+            </a:r>
+            <a:r>
+              <a:rPr lang="en-US" sz="800" dirty="0" err="1">
+                <a:latin typeface="Courier New" panose="02070309020205020404" pitchFamily="49" charset="0"/>
+                <a:cs typeface="Courier New" panose="02070309020205020404" pitchFamily="49" charset="0"/>
+              </a:rPr>
+              <a:t>load.parms.user</a:t>
+            </a:r>
+            <a:r>
+              <a:rPr lang="en-US" sz="800" dirty="0">
+                <a:latin typeface="Courier New" panose="02070309020205020404" pitchFamily="49" charset="0"/>
+                <a:cs typeface="Courier New" panose="02070309020205020404" pitchFamily="49" charset="0"/>
+              </a:rPr>
+              <a:t> %}</a:t>
+            </a:r>
+          </a:p>
+          <a:p>
+            <a:pPr marL="0" indent="0">
+              <a:lnSpc>
+                <a:spcPct val="100000"/>
+              </a:lnSpc>
+              <a:spcBef>
+                <a:spcPts val="0"/>
+              </a:spcBef>
+              <a:buNone/>
+            </a:pPr>
+            <a:r>
+              <a:rPr lang="en-US" sz="800" dirty="0">
+                <a:latin typeface="Courier New" panose="02070309020205020404" pitchFamily="49" charset="0"/>
+                <a:cs typeface="Courier New" panose="02070309020205020404" pitchFamily="49" charset="0"/>
+              </a:rPr>
+              <a:t>{% </a:t>
+            </a:r>
+            <a:r>
+              <a:rPr lang="en-US" sz="800" dirty="0" err="1">
+                <a:latin typeface="Courier New" panose="02070309020205020404" pitchFamily="49" charset="0"/>
+                <a:cs typeface="Courier New" panose="02070309020205020404" pitchFamily="49" charset="0"/>
+              </a:rPr>
+              <a:t>load.parms.dotenv</a:t>
+            </a:r>
+            <a:r>
+              <a:rPr lang="en-US" sz="800" dirty="0">
+                <a:latin typeface="Courier New" panose="02070309020205020404" pitchFamily="49" charset="0"/>
+                <a:cs typeface="Courier New" panose="02070309020205020404" pitchFamily="49" charset="0"/>
+              </a:rPr>
+              <a:t> %}</a:t>
+            </a:r>
+          </a:p>
+          <a:p>
+            <a:pPr marL="0" indent="0">
+              <a:lnSpc>
+                <a:spcPct val="100000"/>
+              </a:lnSpc>
+              <a:spcBef>
+                <a:spcPts val="0"/>
+              </a:spcBef>
+              <a:buNone/>
+            </a:pPr>
+            <a:endParaRPr lang="en-US" sz="800" dirty="0">
+              <a:latin typeface="Courier New" panose="02070309020205020404" pitchFamily="49" charset="0"/>
+              <a:cs typeface="Courier New" panose="02070309020205020404" pitchFamily="49" charset="0"/>
+            </a:endParaRPr>
+          </a:p>
+          <a:p>
+            <a:pPr marL="0" indent="0">
+              <a:lnSpc>
+                <a:spcPct val="100000"/>
+              </a:lnSpc>
+              <a:spcBef>
+                <a:spcPts val="0"/>
+              </a:spcBef>
+              <a:buNone/>
+            </a:pPr>
+            <a:r>
+              <a:rPr lang="en-US" sz="800" dirty="0">
+                <a:latin typeface="Courier New" panose="02070309020205020404" pitchFamily="49" charset="0"/>
+                <a:cs typeface="Courier New" panose="02070309020205020404" pitchFamily="49" charset="0"/>
+              </a:rPr>
+              <a:t>/* </a:t>
+            </a:r>
+            <a:r>
+              <a:rPr lang="en-US" sz="800" dirty="0" err="1">
+                <a:latin typeface="Courier New" panose="02070309020205020404" pitchFamily="49" charset="0"/>
+                <a:cs typeface="Courier New" panose="02070309020205020404" pitchFamily="49" charset="0"/>
+              </a:rPr>
+              <a:t>load.parms.script</a:t>
+            </a:r>
+            <a:r>
+              <a:rPr lang="en-US" sz="800" dirty="0">
+                <a:latin typeface="Courier New" panose="02070309020205020404" pitchFamily="49" charset="0"/>
+                <a:cs typeface="Courier New" panose="02070309020205020404" pitchFamily="49" charset="0"/>
+              </a:rPr>
+              <a:t>-overrides (last value set wins) */</a:t>
+            </a:r>
+          </a:p>
+          <a:p>
+            <a:pPr marL="0" indent="0">
+              <a:lnSpc>
+                <a:spcPct val="100000"/>
+              </a:lnSpc>
+              <a:spcBef>
+                <a:spcPts val="0"/>
+              </a:spcBef>
+              <a:buNone/>
+            </a:pPr>
+            <a:r>
+              <a:rPr lang="en-US" sz="800" dirty="0">
+                <a:latin typeface="Courier New" panose="02070309020205020404" pitchFamily="49" charset="0"/>
+                <a:cs typeface="Courier New" panose="02070309020205020404" pitchFamily="49" charset="0"/>
+              </a:rPr>
+              <a:t>{% set </a:t>
+            </a:r>
+            <a:r>
+              <a:rPr lang="en-US" sz="800" dirty="0" err="1">
+                <a:latin typeface="Courier New" panose="02070309020205020404" pitchFamily="49" charset="0"/>
+                <a:cs typeface="Courier New" panose="02070309020205020404" pitchFamily="49" charset="0"/>
+              </a:rPr>
+              <a:t>process_date</a:t>
+            </a:r>
+            <a:r>
+              <a:rPr lang="en-US" sz="800" dirty="0">
+                <a:latin typeface="Courier New" panose="02070309020205020404" pitchFamily="49" charset="0"/>
+                <a:cs typeface="Courier New" panose="02070309020205020404" pitchFamily="49" charset="0"/>
+              </a:rPr>
+              <a:t> = </a:t>
+            </a:r>
+            <a:r>
+              <a:rPr lang="en-US" sz="800" dirty="0" err="1">
+                <a:latin typeface="Courier New" panose="02070309020205020404" pitchFamily="49" charset="0"/>
+                <a:cs typeface="Courier New" panose="02070309020205020404" pitchFamily="49" charset="0"/>
+              </a:rPr>
+              <a:t>datetime.now</a:t>
+            </a:r>
+            <a:r>
+              <a:rPr lang="en-US" sz="800" dirty="0">
+                <a:latin typeface="Courier New" panose="02070309020205020404" pitchFamily="49" charset="0"/>
+                <a:cs typeface="Courier New" panose="02070309020205020404" pitchFamily="49" charset="0"/>
+              </a:rPr>
+              <a:t>(‘%Y-%m-%d’) %}</a:t>
+            </a:r>
+          </a:p>
+          <a:p>
+            <a:pPr marL="0" indent="0">
+              <a:lnSpc>
+                <a:spcPct val="100000"/>
+              </a:lnSpc>
+              <a:spcBef>
+                <a:spcPts val="0"/>
+              </a:spcBef>
+              <a:buNone/>
+            </a:pPr>
+            <a:r>
+              <a:rPr lang="en-US" sz="800" dirty="0">
+                <a:latin typeface="Courier New" panose="02070309020205020404" pitchFamily="49" charset="0"/>
+                <a:cs typeface="Courier New" panose="02070309020205020404" pitchFamily="49" charset="0"/>
+              </a:rPr>
+              <a:t>;</a:t>
+            </a:r>
+          </a:p>
+          <a:p>
+            <a:pPr marL="0" indent="0">
+              <a:lnSpc>
+                <a:spcPct val="100000"/>
+              </a:lnSpc>
+              <a:spcBef>
+                <a:spcPts val="0"/>
+              </a:spcBef>
+              <a:buNone/>
+            </a:pPr>
+            <a:endParaRPr lang="en-US" sz="800" dirty="0">
+              <a:latin typeface="Courier New" panose="02070309020205020404" pitchFamily="49" charset="0"/>
+              <a:cs typeface="Courier New" panose="02070309020205020404" pitchFamily="49" charset="0"/>
+            </a:endParaRPr>
+          </a:p>
+          <a:p>
+            <a:pPr marL="0" indent="0">
+              <a:lnSpc>
+                <a:spcPct val="100000"/>
+              </a:lnSpc>
+              <a:spcBef>
+                <a:spcPts val="0"/>
+              </a:spcBef>
+              <a:buNone/>
+            </a:pPr>
+            <a:endParaRPr lang="en-US" sz="800" dirty="0">
+              <a:latin typeface="Courier New" panose="02070309020205020404" pitchFamily="49" charset="0"/>
+              <a:cs typeface="Courier New" panose="02070309020205020404" pitchFamily="49" charset="0"/>
+            </a:endParaRPr>
+          </a:p>
+          <a:p>
+            <a:pPr marL="0" indent="0">
+              <a:lnSpc>
+                <a:spcPct val="100000"/>
+              </a:lnSpc>
+              <a:spcBef>
+                <a:spcPts val="0"/>
+              </a:spcBef>
+              <a:buNone/>
+            </a:pPr>
+            <a:r>
+              <a:rPr lang="en-US" sz="800" dirty="0">
+                <a:latin typeface="Courier New" panose="02070309020205020404" pitchFamily="49" charset="0"/>
+                <a:cs typeface="Courier New" panose="02070309020205020404" pitchFamily="49" charset="0"/>
+              </a:rPr>
+              <a:t>-- collect run details from control table: </a:t>
+            </a:r>
+          </a:p>
+          <a:p>
+            <a:pPr marL="0" indent="0">
+              <a:lnSpc>
+                <a:spcPct val="100000"/>
+              </a:lnSpc>
+              <a:spcBef>
+                <a:spcPts val="0"/>
+              </a:spcBef>
+              <a:buNone/>
+            </a:pPr>
+            <a:r>
+              <a:rPr lang="en-US" sz="800" dirty="0">
+                <a:latin typeface="Courier New" panose="02070309020205020404" pitchFamily="49" charset="0"/>
+                <a:cs typeface="Courier New" panose="02070309020205020404" pitchFamily="49" charset="0"/>
+              </a:rPr>
+              <a:t>{{ </a:t>
+            </a:r>
+            <a:r>
+              <a:rPr lang="en-US" sz="800" dirty="0" err="1">
+                <a:latin typeface="Courier New" panose="02070309020205020404" pitchFamily="49" charset="0"/>
+                <a:cs typeface="Courier New" panose="02070309020205020404" pitchFamily="49" charset="0"/>
+              </a:rPr>
+              <a:t>save.memory</a:t>
+            </a:r>
+            <a:r>
+              <a:rPr lang="en-US" sz="800" dirty="0">
+                <a:latin typeface="Courier New" panose="02070309020205020404" pitchFamily="49" charset="0"/>
+                <a:cs typeface="Courier New" panose="02070309020205020404" pitchFamily="49" charset="0"/>
+              </a:rPr>
+              <a:t>(</a:t>
+            </a:r>
+            <a:r>
+              <a:rPr lang="en-US" sz="800" dirty="0" err="1">
+                <a:latin typeface="Courier New" panose="02070309020205020404" pitchFamily="49" charset="0"/>
+                <a:cs typeface="Courier New" panose="02070309020205020404" pitchFamily="49" charset="0"/>
+              </a:rPr>
+              <a:t>memory_name</a:t>
+            </a:r>
+            <a:r>
+              <a:rPr lang="en-US" sz="800" dirty="0">
+                <a:latin typeface="Courier New" panose="02070309020205020404" pitchFamily="49" charset="0"/>
+                <a:cs typeface="Courier New" panose="02070309020205020404" pitchFamily="49" charset="0"/>
+              </a:rPr>
+              <a:t> = ‘</a:t>
+            </a:r>
+            <a:r>
+              <a:rPr lang="en-US" sz="800" dirty="0" err="1">
+                <a:latin typeface="Courier New" panose="02070309020205020404" pitchFamily="49" charset="0"/>
+                <a:cs typeface="Courier New" panose="02070309020205020404" pitchFamily="49" charset="0"/>
+              </a:rPr>
+              <a:t>first_table</a:t>
+            </a:r>
+            <a:r>
+              <a:rPr lang="en-US" sz="800" dirty="0">
+                <a:latin typeface="Courier New" panose="02070309020205020404" pitchFamily="49" charset="0"/>
+                <a:cs typeface="Courier New" panose="02070309020205020404" pitchFamily="49" charset="0"/>
+              </a:rPr>
+              <a:t>’) }}</a:t>
+            </a:r>
+          </a:p>
+          <a:p>
+            <a:pPr marL="0" indent="0">
+              <a:lnSpc>
+                <a:spcPct val="100000"/>
+              </a:lnSpc>
+              <a:spcBef>
+                <a:spcPts val="0"/>
+              </a:spcBef>
+              <a:buNone/>
+            </a:pPr>
+            <a:r>
+              <a:rPr lang="en-US" sz="800" dirty="0">
+                <a:latin typeface="Courier New" panose="02070309020205020404" pitchFamily="49" charset="0"/>
+                <a:cs typeface="Courier New" panose="02070309020205020404" pitchFamily="49" charset="0"/>
+              </a:rPr>
+              <a:t>SELECT </a:t>
+            </a:r>
+            <a:r>
+              <a:rPr lang="en-US" sz="800" dirty="0" err="1">
+                <a:latin typeface="Courier New" panose="02070309020205020404" pitchFamily="49" charset="0"/>
+                <a:cs typeface="Courier New" panose="02070309020205020404" pitchFamily="49" charset="0"/>
+              </a:rPr>
+              <a:t>ColA</a:t>
+            </a:r>
+            <a:r>
+              <a:rPr lang="en-US" sz="800" dirty="0">
+                <a:latin typeface="Courier New" panose="02070309020205020404" pitchFamily="49" charset="0"/>
+                <a:cs typeface="Courier New" panose="02070309020205020404" pitchFamily="49" charset="0"/>
+              </a:rPr>
+              <a:t>, </a:t>
+            </a:r>
+            <a:r>
+              <a:rPr lang="en-US" sz="800" dirty="0" err="1">
+                <a:latin typeface="Courier New" panose="02070309020205020404" pitchFamily="49" charset="0"/>
+                <a:cs typeface="Courier New" panose="02070309020205020404" pitchFamily="49" charset="0"/>
+              </a:rPr>
+              <a:t>ColB</a:t>
+            </a:r>
+            <a:r>
+              <a:rPr lang="en-US" sz="800" dirty="0">
+                <a:latin typeface="Courier New" panose="02070309020205020404" pitchFamily="49" charset="0"/>
+                <a:cs typeface="Courier New" panose="02070309020205020404" pitchFamily="49" charset="0"/>
+              </a:rPr>
+              <a:t>, COLC FROM {{ schema }}.</a:t>
+            </a:r>
+            <a:r>
+              <a:rPr lang="en-US" sz="800" dirty="0" err="1">
+                <a:latin typeface="Courier New" panose="02070309020205020404" pitchFamily="49" charset="0"/>
+                <a:cs typeface="Courier New" panose="02070309020205020404" pitchFamily="49" charset="0"/>
+              </a:rPr>
+              <a:t>TableName</a:t>
+            </a:r>
+            <a:r>
+              <a:rPr lang="en-US" sz="800" dirty="0">
+                <a:latin typeface="Courier New" panose="02070309020205020404" pitchFamily="49" charset="0"/>
+                <a:cs typeface="Courier New" panose="02070309020205020404" pitchFamily="49" charset="0"/>
+              </a:rPr>
+              <a:t> </a:t>
+            </a:r>
+          </a:p>
+          <a:p>
+            <a:pPr marL="0" indent="0">
+              <a:lnSpc>
+                <a:spcPct val="100000"/>
+              </a:lnSpc>
+              <a:spcBef>
+                <a:spcPts val="0"/>
+              </a:spcBef>
+              <a:buNone/>
+            </a:pPr>
+            <a:r>
+              <a:rPr lang="en-US" sz="800" dirty="0">
+                <a:latin typeface="Courier New" panose="02070309020205020404" pitchFamily="49" charset="0"/>
+                <a:cs typeface="Courier New" panose="02070309020205020404" pitchFamily="49" charset="0"/>
+              </a:rPr>
+              <a:t>;</a:t>
+            </a:r>
+          </a:p>
+          <a:p>
+            <a:pPr marL="0" indent="0">
+              <a:lnSpc>
+                <a:spcPct val="100000"/>
+              </a:lnSpc>
+              <a:spcBef>
+                <a:spcPts val="0"/>
+              </a:spcBef>
+              <a:buNone/>
+            </a:pPr>
+            <a:endParaRPr lang="en-US" sz="800" dirty="0">
+              <a:latin typeface="Courier New" panose="02070309020205020404" pitchFamily="49" charset="0"/>
+              <a:cs typeface="Courier New" panose="02070309020205020404" pitchFamily="49" charset="0"/>
+            </a:endParaRPr>
+          </a:p>
+          <a:p>
+            <a:pPr marL="0" indent="0">
+              <a:lnSpc>
+                <a:spcPct val="100000"/>
+              </a:lnSpc>
+              <a:spcBef>
+                <a:spcPts val="0"/>
+              </a:spcBef>
+              <a:buNone/>
+            </a:pPr>
+            <a:endParaRPr lang="en-US" sz="800" dirty="0">
+              <a:latin typeface="Courier New" panose="02070309020205020404" pitchFamily="49" charset="0"/>
+              <a:cs typeface="Courier New" panose="02070309020205020404" pitchFamily="49" charset="0"/>
+            </a:endParaRPr>
+          </a:p>
+          <a:p>
+            <a:pPr marL="0" indent="0">
+              <a:lnSpc>
+                <a:spcPct val="100000"/>
+              </a:lnSpc>
+              <a:spcBef>
+                <a:spcPts val="0"/>
+              </a:spcBef>
+              <a:buNone/>
+            </a:pPr>
+            <a:r>
+              <a:rPr lang="en-US" sz="800" dirty="0">
+                <a:latin typeface="Courier New" panose="02070309020205020404" pitchFamily="49" charset="0"/>
+                <a:cs typeface="Courier New" panose="02070309020205020404" pitchFamily="49" charset="0"/>
+              </a:rPr>
+              <a:t>-- iterate thru all records in </a:t>
+            </a:r>
+            <a:r>
+              <a:rPr lang="en-US" sz="800" dirty="0" err="1">
+                <a:latin typeface="Courier New" panose="02070309020205020404" pitchFamily="49" charset="0"/>
+                <a:cs typeface="Courier New" panose="02070309020205020404" pitchFamily="49" charset="0"/>
+              </a:rPr>
+              <a:t>first_table</a:t>
+            </a:r>
+            <a:r>
+              <a:rPr lang="en-US" sz="800" dirty="0">
+                <a:latin typeface="Courier New" panose="02070309020205020404" pitchFamily="49" charset="0"/>
+                <a:cs typeface="Courier New" panose="02070309020205020404" pitchFamily="49" charset="0"/>
+              </a:rPr>
+              <a:t>, and export from second</a:t>
+            </a:r>
+          </a:p>
+          <a:p>
+            <a:pPr marL="0" indent="0">
+              <a:lnSpc>
+                <a:spcPct val="100000"/>
+              </a:lnSpc>
+              <a:spcBef>
+                <a:spcPts val="0"/>
+              </a:spcBef>
+              <a:buNone/>
+            </a:pPr>
+            <a:r>
+              <a:rPr lang="en-US" sz="800" dirty="0">
+                <a:latin typeface="Courier New" panose="02070309020205020404" pitchFamily="49" charset="0"/>
+                <a:cs typeface="Courier New" panose="02070309020205020404" pitchFamily="49" charset="0"/>
+              </a:rPr>
+              <a:t>{% for row in </a:t>
+            </a:r>
+            <a:r>
+              <a:rPr lang="en-US" sz="800" dirty="0" err="1">
+                <a:latin typeface="Courier New" panose="02070309020205020404" pitchFamily="49" charset="0"/>
+                <a:cs typeface="Courier New" panose="02070309020205020404" pitchFamily="49" charset="0"/>
+              </a:rPr>
+              <a:t>first_table</a:t>
+            </a:r>
+            <a:r>
+              <a:rPr lang="en-US" sz="800" dirty="0">
+                <a:latin typeface="Courier New" panose="02070309020205020404" pitchFamily="49" charset="0"/>
+                <a:cs typeface="Courier New" panose="02070309020205020404" pitchFamily="49" charset="0"/>
+              </a:rPr>
+              <a:t>  %}</a:t>
+            </a:r>
+          </a:p>
+          <a:p>
+            <a:pPr marL="0" indent="0">
+              <a:lnSpc>
+                <a:spcPct val="100000"/>
+              </a:lnSpc>
+              <a:spcBef>
+                <a:spcPts val="0"/>
+              </a:spcBef>
+              <a:buNone/>
+            </a:pPr>
+            <a:r>
+              <a:rPr lang="en-US" sz="800" dirty="0">
+                <a:latin typeface="Courier New" panose="02070309020205020404" pitchFamily="49" charset="0"/>
+                <a:cs typeface="Courier New" panose="02070309020205020404" pitchFamily="49" charset="0"/>
+              </a:rPr>
+              <a:t>  {{ set filename = =‘second_’ + </a:t>
+            </a:r>
+            <a:r>
+              <a:rPr lang="en-US" sz="800" dirty="0" err="1">
+                <a:latin typeface="Courier New" panose="02070309020205020404" pitchFamily="49" charset="0"/>
+                <a:cs typeface="Courier New" panose="02070309020205020404" pitchFamily="49" charset="0"/>
+              </a:rPr>
+              <a:t>first_table</a:t>
+            </a:r>
+            <a:r>
+              <a:rPr lang="en-US" sz="800" dirty="0">
+                <a:latin typeface="Courier New" panose="02070309020205020404" pitchFamily="49" charset="0"/>
+                <a:cs typeface="Courier New" panose="02070309020205020404" pitchFamily="49" charset="0"/>
+              </a:rPr>
+              <a:t>[“</a:t>
+            </a:r>
+            <a:r>
+              <a:rPr lang="en-US" sz="800" dirty="0" err="1">
+                <a:latin typeface="Courier New" panose="02070309020205020404" pitchFamily="49" charset="0"/>
+                <a:cs typeface="Courier New" panose="02070309020205020404" pitchFamily="49" charset="0"/>
+              </a:rPr>
+              <a:t>ColB</a:t>
+            </a:r>
+            <a:r>
+              <a:rPr lang="en-US" sz="800" dirty="0">
+                <a:latin typeface="Courier New" panose="02070309020205020404" pitchFamily="49" charset="0"/>
+                <a:cs typeface="Courier New" panose="02070309020205020404" pitchFamily="49" charset="0"/>
+              </a:rPr>
+              <a:t>”] + ’.csv’</a:t>
+            </a:r>
+          </a:p>
+          <a:p>
+            <a:pPr marL="0" indent="0">
+              <a:lnSpc>
+                <a:spcPct val="100000"/>
+              </a:lnSpc>
+              <a:spcBef>
+                <a:spcPts val="0"/>
+              </a:spcBef>
+              <a:buNone/>
+            </a:pPr>
+            <a:endParaRPr lang="en-US" sz="800" dirty="0">
+              <a:latin typeface="Courier New" panose="02070309020205020404" pitchFamily="49" charset="0"/>
+              <a:cs typeface="Courier New" panose="02070309020205020404" pitchFamily="49" charset="0"/>
+            </a:endParaRPr>
+          </a:p>
+          <a:p>
+            <a:pPr marL="0" indent="0">
+              <a:lnSpc>
+                <a:spcPct val="100000"/>
+              </a:lnSpc>
+              <a:spcBef>
+                <a:spcPts val="0"/>
+              </a:spcBef>
+              <a:buNone/>
+            </a:pPr>
+            <a:r>
+              <a:rPr lang="en-US" sz="800" dirty="0">
+                <a:latin typeface="Courier New" panose="02070309020205020404" pitchFamily="49" charset="0"/>
+                <a:cs typeface="Courier New" panose="02070309020205020404" pitchFamily="49" charset="0"/>
+              </a:rPr>
+              <a:t>  {{ </a:t>
+            </a:r>
+            <a:r>
+              <a:rPr lang="en-US" sz="800" dirty="0" err="1">
+                <a:latin typeface="Courier New" panose="02070309020205020404" pitchFamily="49" charset="0"/>
+                <a:cs typeface="Courier New" panose="02070309020205020404" pitchFamily="49" charset="0"/>
+              </a:rPr>
+              <a:t>save.csv</a:t>
+            </a:r>
+            <a:r>
+              <a:rPr lang="en-US" sz="800" dirty="0">
+                <a:latin typeface="Courier New" panose="02070309020205020404" pitchFamily="49" charset="0"/>
+                <a:cs typeface="Courier New" panose="02070309020205020404" pitchFamily="49" charset="0"/>
+              </a:rPr>
+              <a:t>(</a:t>
+            </a:r>
+            <a:r>
+              <a:rPr lang="en-US" sz="800" dirty="0" err="1">
+                <a:latin typeface="Courier New" panose="02070309020205020404" pitchFamily="49" charset="0"/>
+                <a:cs typeface="Courier New" panose="02070309020205020404" pitchFamily="49" charset="0"/>
+              </a:rPr>
+              <a:t>file_name</a:t>
+            </a:r>
+            <a:r>
+              <a:rPr lang="en-US" sz="800" dirty="0">
+                <a:latin typeface="Courier New" panose="02070309020205020404" pitchFamily="49" charset="0"/>
+                <a:cs typeface="Courier New" panose="02070309020205020404" pitchFamily="49" charset="0"/>
+              </a:rPr>
+              <a:t> = filename) }}</a:t>
+            </a:r>
+          </a:p>
+          <a:p>
+            <a:pPr marL="0" indent="0">
+              <a:lnSpc>
+                <a:spcPct val="100000"/>
+              </a:lnSpc>
+              <a:spcBef>
+                <a:spcPts val="0"/>
+              </a:spcBef>
+              <a:buNone/>
+            </a:pPr>
+            <a:r>
+              <a:rPr lang="en-US" sz="800" dirty="0">
+                <a:latin typeface="Courier New" panose="02070309020205020404" pitchFamily="49" charset="0"/>
+                <a:cs typeface="Courier New" panose="02070309020205020404" pitchFamily="49" charset="0"/>
+              </a:rPr>
+              <a:t>  SELECT </a:t>
+            </a:r>
+            <a:r>
+              <a:rPr lang="en-US" sz="800" dirty="0" err="1">
+                <a:latin typeface="Courier New" panose="02070309020205020404" pitchFamily="49" charset="0"/>
+                <a:cs typeface="Courier New" panose="02070309020205020404" pitchFamily="49" charset="0"/>
+              </a:rPr>
+              <a:t>ColA</a:t>
+            </a:r>
+            <a:r>
+              <a:rPr lang="en-US" sz="800" dirty="0">
+                <a:latin typeface="Courier New" panose="02070309020205020404" pitchFamily="49" charset="0"/>
+                <a:cs typeface="Courier New" panose="02070309020205020404" pitchFamily="49" charset="0"/>
+              </a:rPr>
+              <a:t>, </a:t>
+            </a:r>
+            <a:r>
+              <a:rPr lang="en-US" sz="800" dirty="0" err="1">
+                <a:latin typeface="Courier New" panose="02070309020205020404" pitchFamily="49" charset="0"/>
+                <a:cs typeface="Courier New" panose="02070309020205020404" pitchFamily="49" charset="0"/>
+              </a:rPr>
+              <a:t>ColB</a:t>
+            </a:r>
+            <a:r>
+              <a:rPr lang="en-US" sz="800" dirty="0">
+                <a:latin typeface="Courier New" panose="02070309020205020404" pitchFamily="49" charset="0"/>
+                <a:cs typeface="Courier New" panose="02070309020205020404" pitchFamily="49" charset="0"/>
+              </a:rPr>
+              <a:t>  FROM {{ schema }}.</a:t>
+            </a:r>
+            <a:r>
+              <a:rPr lang="en-US" sz="800" dirty="0" err="1">
+                <a:latin typeface="Courier New" panose="02070309020205020404" pitchFamily="49" charset="0"/>
+                <a:cs typeface="Courier New" panose="02070309020205020404" pitchFamily="49" charset="0"/>
+              </a:rPr>
+              <a:t>second_table</a:t>
+            </a:r>
+            <a:endParaRPr lang="en-US" sz="800" dirty="0">
+              <a:latin typeface="Courier New" panose="02070309020205020404" pitchFamily="49" charset="0"/>
+              <a:cs typeface="Courier New" panose="02070309020205020404" pitchFamily="49" charset="0"/>
+            </a:endParaRPr>
+          </a:p>
+          <a:p>
+            <a:pPr marL="0" indent="0">
+              <a:lnSpc>
+                <a:spcPct val="100000"/>
+              </a:lnSpc>
+              <a:spcBef>
+                <a:spcPts val="0"/>
+              </a:spcBef>
+              <a:buNone/>
+            </a:pPr>
+            <a:r>
+              <a:rPr lang="en-US" sz="800" dirty="0">
+                <a:latin typeface="Courier New" panose="02070309020205020404" pitchFamily="49" charset="0"/>
+                <a:cs typeface="Courier New" panose="02070309020205020404" pitchFamily="49" charset="0"/>
+              </a:rPr>
+              <a:t>  WHERE COLA = {{ </a:t>
+            </a:r>
+            <a:r>
+              <a:rPr lang="en-US" sz="800" dirty="0" err="1">
+                <a:latin typeface="Courier New" panose="02070309020205020404" pitchFamily="49" charset="0"/>
+                <a:cs typeface="Courier New" panose="02070309020205020404" pitchFamily="49" charset="0"/>
+              </a:rPr>
+              <a:t>first_table</a:t>
+            </a:r>
+            <a:r>
+              <a:rPr lang="en-US" sz="800" dirty="0">
+                <a:latin typeface="Courier New" panose="02070309020205020404" pitchFamily="49" charset="0"/>
+                <a:cs typeface="Courier New" panose="02070309020205020404" pitchFamily="49" charset="0"/>
+              </a:rPr>
+              <a:t>[‘COLA’] }} </a:t>
+            </a:r>
+          </a:p>
+          <a:p>
+            <a:pPr marL="0" indent="0">
+              <a:lnSpc>
+                <a:spcPct val="100000"/>
+              </a:lnSpc>
+              <a:spcBef>
+                <a:spcPts val="0"/>
+              </a:spcBef>
+              <a:buNone/>
+            </a:pPr>
+            <a:r>
+              <a:rPr lang="en-US" sz="800" dirty="0">
+                <a:latin typeface="Courier New" panose="02070309020205020404" pitchFamily="49" charset="0"/>
+                <a:cs typeface="Courier New" panose="02070309020205020404" pitchFamily="49" charset="0"/>
+              </a:rPr>
+              <a:t>  ;</a:t>
+            </a:r>
+          </a:p>
+          <a:p>
+            <a:pPr marL="0" indent="0">
+              <a:lnSpc>
+                <a:spcPct val="100000"/>
+              </a:lnSpc>
+              <a:spcBef>
+                <a:spcPts val="0"/>
+              </a:spcBef>
+              <a:buNone/>
+            </a:pPr>
+            <a:endParaRPr lang="en-US" sz="800" dirty="0">
+              <a:latin typeface="Courier New" panose="02070309020205020404" pitchFamily="49" charset="0"/>
+              <a:cs typeface="Courier New" panose="02070309020205020404" pitchFamily="49" charset="0"/>
+            </a:endParaRPr>
+          </a:p>
+          <a:p>
+            <a:pPr marL="0" indent="0">
+              <a:lnSpc>
+                <a:spcPct val="100000"/>
+              </a:lnSpc>
+              <a:spcBef>
+                <a:spcPts val="0"/>
+              </a:spcBef>
+              <a:buNone/>
+            </a:pPr>
+            <a:r>
+              <a:rPr lang="en-US" sz="800" dirty="0">
+                <a:latin typeface="Courier New" panose="02070309020205020404" pitchFamily="49" charset="0"/>
+                <a:cs typeface="Courier New" panose="02070309020205020404" pitchFamily="49" charset="0"/>
+              </a:rPr>
+              <a:t>{% </a:t>
+            </a:r>
+            <a:r>
+              <a:rPr lang="en-US" sz="800" dirty="0" err="1">
+                <a:latin typeface="Courier New" panose="02070309020205020404" pitchFamily="49" charset="0"/>
+                <a:cs typeface="Courier New" panose="02070309020205020404" pitchFamily="49" charset="0"/>
+              </a:rPr>
+              <a:t>endfor</a:t>
+            </a:r>
+            <a:r>
+              <a:rPr lang="en-US" sz="800" dirty="0">
+                <a:latin typeface="Courier New" panose="02070309020205020404" pitchFamily="49" charset="0"/>
+                <a:cs typeface="Courier New" panose="02070309020205020404" pitchFamily="49" charset="0"/>
+              </a:rPr>
+              <a:t> %}</a:t>
+            </a:r>
+          </a:p>
+          <a:p>
+            <a:pPr marL="0" indent="0">
+              <a:lnSpc>
+                <a:spcPct val="100000"/>
+              </a:lnSpc>
+              <a:spcBef>
+                <a:spcPts val="0"/>
+              </a:spcBef>
+              <a:buNone/>
+            </a:pPr>
+            <a:endParaRPr lang="en-US" sz="800" dirty="0">
+              <a:latin typeface="Courier New" panose="02070309020205020404" pitchFamily="49" charset="0"/>
+              <a:cs typeface="Courier New" panose="02070309020205020404" pitchFamily="49" charset="0"/>
+            </a:endParaRPr>
+          </a:p>
+          <a:p>
+            <a:pPr marL="0" indent="0">
+              <a:lnSpc>
+                <a:spcPct val="100000"/>
+              </a:lnSpc>
+              <a:spcBef>
+                <a:spcPts val="0"/>
+              </a:spcBef>
+              <a:buNone/>
+            </a:pPr>
+            <a:endParaRPr lang="en-US" sz="800" dirty="0">
+              <a:latin typeface="Courier New" panose="02070309020205020404" pitchFamily="49" charset="0"/>
+              <a:cs typeface="Courier New" panose="02070309020205020404" pitchFamily="49" charset="0"/>
+            </a:endParaRPr>
+          </a:p>
+          <a:p>
+            <a:pPr marL="0" indent="0">
+              <a:lnSpc>
+                <a:spcPct val="100000"/>
+              </a:lnSpc>
+              <a:spcBef>
+                <a:spcPts val="0"/>
+              </a:spcBef>
+              <a:buNone/>
+            </a:pPr>
+            <a:r>
+              <a:rPr lang="en-US" sz="800" dirty="0">
+                <a:latin typeface="Courier New" panose="02070309020205020404" pitchFamily="49" charset="0"/>
+                <a:cs typeface="Courier New" panose="02070309020205020404" pitchFamily="49" charset="0"/>
+              </a:rPr>
+              <a:t>-- transform the last saved csv into </a:t>
+            </a:r>
+            <a:r>
+              <a:rPr lang="en-US" sz="800" dirty="0" err="1">
+                <a:latin typeface="Courier New" panose="02070309020205020404" pitchFamily="49" charset="0"/>
+                <a:cs typeface="Courier New" panose="02070309020205020404" pitchFamily="49" charset="0"/>
+              </a:rPr>
+              <a:t>json</a:t>
+            </a:r>
+            <a:r>
+              <a:rPr lang="en-US" sz="800" dirty="0">
+                <a:latin typeface="Courier New" panose="02070309020205020404" pitchFamily="49" charset="0"/>
+                <a:cs typeface="Courier New" panose="02070309020205020404" pitchFamily="49" charset="0"/>
+              </a:rPr>
+              <a:t>, and submit to API</a:t>
+            </a:r>
+          </a:p>
+          <a:p>
+            <a:pPr marL="0" indent="0">
+              <a:lnSpc>
+                <a:spcPct val="100000"/>
+              </a:lnSpc>
+              <a:spcBef>
+                <a:spcPts val="0"/>
+              </a:spcBef>
+              <a:buNone/>
+            </a:pPr>
+            <a:r>
+              <a:rPr lang="en-US" sz="800" dirty="0">
+                <a:latin typeface="Courier New" panose="02070309020205020404" pitchFamily="49" charset="0"/>
+                <a:cs typeface="Courier New" panose="02070309020205020404" pitchFamily="49" charset="0"/>
+              </a:rPr>
+              <a:t>{{ </a:t>
+            </a:r>
+            <a:r>
+              <a:rPr lang="en-US" sz="800" dirty="0" err="1">
+                <a:latin typeface="Courier New" panose="02070309020205020404" pitchFamily="49" charset="0"/>
+                <a:cs typeface="Courier New" panose="02070309020205020404" pitchFamily="49" charset="0"/>
+              </a:rPr>
+              <a:t>load.csv</a:t>
+            </a:r>
+            <a:r>
+              <a:rPr lang="en-US" sz="800" dirty="0">
+                <a:latin typeface="Courier New" panose="02070309020205020404" pitchFamily="49" charset="0"/>
+                <a:cs typeface="Courier New" panose="02070309020205020404" pitchFamily="49" charset="0"/>
+              </a:rPr>
+              <a:t>(</a:t>
+            </a:r>
+            <a:r>
+              <a:rPr lang="en-US" sz="800" dirty="0" err="1">
+                <a:latin typeface="Courier New" panose="02070309020205020404" pitchFamily="49" charset="0"/>
+                <a:cs typeface="Courier New" panose="02070309020205020404" pitchFamily="49" charset="0"/>
+              </a:rPr>
+              <a:t>file_name</a:t>
+            </a:r>
+            <a:r>
+              <a:rPr lang="en-US" sz="800" dirty="0">
+                <a:latin typeface="Courier New" panose="02070309020205020404" pitchFamily="49" charset="0"/>
+                <a:cs typeface="Courier New" panose="02070309020205020404" pitchFamily="49" charset="0"/>
+              </a:rPr>
+              <a:t>  = filename) }}</a:t>
+            </a:r>
+          </a:p>
+          <a:p>
+            <a:pPr marL="0" indent="0">
+              <a:lnSpc>
+                <a:spcPct val="100000"/>
+              </a:lnSpc>
+              <a:spcBef>
+                <a:spcPts val="0"/>
+              </a:spcBef>
+              <a:buNone/>
+            </a:pPr>
+            <a:r>
+              <a:rPr lang="en-US" sz="800" dirty="0">
+                <a:latin typeface="Courier New" panose="02070309020205020404" pitchFamily="49" charset="0"/>
+                <a:cs typeface="Courier New" panose="02070309020205020404" pitchFamily="49" charset="0"/>
+              </a:rPr>
+              <a:t>{{ </a:t>
+            </a:r>
+            <a:r>
+              <a:rPr lang="en-US" sz="800" dirty="0" err="1">
+                <a:latin typeface="Courier New" panose="02070309020205020404" pitchFamily="49" charset="0"/>
+                <a:cs typeface="Courier New" panose="02070309020205020404" pitchFamily="49" charset="0"/>
+              </a:rPr>
+              <a:t>save.json</a:t>
+            </a:r>
+            <a:r>
+              <a:rPr lang="en-US" sz="800" dirty="0">
+                <a:latin typeface="Courier New" panose="02070309020205020404" pitchFamily="49" charset="0"/>
+                <a:cs typeface="Courier New" panose="02070309020205020404" pitchFamily="49" charset="0"/>
+              </a:rPr>
+              <a:t>(</a:t>
+            </a:r>
+            <a:r>
+              <a:rPr lang="en-US" sz="800" dirty="0" err="1">
+                <a:latin typeface="Courier New" panose="02070309020205020404" pitchFamily="49" charset="0"/>
+                <a:cs typeface="Courier New" panose="02070309020205020404" pitchFamily="49" charset="0"/>
+              </a:rPr>
+              <a:t>file_name</a:t>
+            </a:r>
+            <a:r>
+              <a:rPr lang="en-US" sz="800" dirty="0">
+                <a:latin typeface="Courier New" panose="02070309020205020404" pitchFamily="49" charset="0"/>
+                <a:cs typeface="Courier New" panose="02070309020205020404" pitchFamily="49" charset="0"/>
+              </a:rPr>
+              <a:t> = filename, </a:t>
+            </a:r>
+            <a:r>
+              <a:rPr lang="en-US" sz="800" dirty="0" err="1">
+                <a:latin typeface="Courier New" panose="02070309020205020404" pitchFamily="49" charset="0"/>
+                <a:cs typeface="Courier New" panose="02070309020205020404" pitchFamily="49" charset="0"/>
+              </a:rPr>
+              <a:t>memory_name</a:t>
+            </a:r>
+            <a:r>
+              <a:rPr lang="en-US" sz="800" dirty="0">
+                <a:latin typeface="Courier New" panose="02070309020205020404" pitchFamily="49" charset="0"/>
+                <a:cs typeface="Courier New" panose="02070309020205020404" pitchFamily="49" charset="0"/>
+              </a:rPr>
+              <a:t> = ‘</a:t>
+            </a:r>
+            <a:r>
+              <a:rPr lang="en-US" sz="800" dirty="0" err="1">
+                <a:latin typeface="Courier New" panose="02070309020205020404" pitchFamily="49" charset="0"/>
+                <a:cs typeface="Courier New" panose="02070309020205020404" pitchFamily="49" charset="0"/>
+              </a:rPr>
+              <a:t>last_json</a:t>
+            </a:r>
+            <a:r>
+              <a:rPr lang="en-US" sz="800" dirty="0">
+                <a:latin typeface="Courier New" panose="02070309020205020404" pitchFamily="49" charset="0"/>
+                <a:cs typeface="Courier New" panose="02070309020205020404" pitchFamily="49" charset="0"/>
+              </a:rPr>
+              <a:t>’) }}</a:t>
+            </a:r>
+          </a:p>
+          <a:p>
+            <a:pPr marL="0" indent="0">
+              <a:lnSpc>
+                <a:spcPct val="100000"/>
+              </a:lnSpc>
+              <a:spcBef>
+                <a:spcPts val="0"/>
+              </a:spcBef>
+              <a:buNone/>
+            </a:pPr>
+            <a:r>
+              <a:rPr lang="en-US" sz="800" dirty="0">
+                <a:latin typeface="Courier New" panose="02070309020205020404" pitchFamily="49" charset="0"/>
+                <a:cs typeface="Courier New" panose="02070309020205020404" pitchFamily="49" charset="0"/>
+              </a:rPr>
+              <a:t>{{ </a:t>
+            </a:r>
+            <a:r>
+              <a:rPr lang="en-US" sz="800" dirty="0" err="1">
+                <a:latin typeface="Courier New" panose="02070309020205020404" pitchFamily="49" charset="0"/>
+                <a:cs typeface="Courier New" panose="02070309020205020404" pitchFamily="49" charset="0"/>
+              </a:rPr>
+              <a:t>exec.api</a:t>
+            </a:r>
+            <a:r>
+              <a:rPr lang="en-US" sz="800" dirty="0">
+                <a:latin typeface="Courier New" panose="02070309020205020404" pitchFamily="49" charset="0"/>
+                <a:cs typeface="Courier New" panose="02070309020205020404" pitchFamily="49" charset="0"/>
+              </a:rPr>
+              <a:t> (</a:t>
+            </a:r>
+            <a:r>
+              <a:rPr lang="en-US" sz="800" dirty="0" err="1">
+                <a:latin typeface="Courier New" panose="02070309020205020404" pitchFamily="49" charset="0"/>
+                <a:cs typeface="Courier New" panose="02070309020205020404" pitchFamily="49" charset="0"/>
+              </a:rPr>
+              <a:t>url</a:t>
+            </a:r>
+            <a:r>
+              <a:rPr lang="en-US" sz="800" dirty="0">
+                <a:latin typeface="Courier New" panose="02070309020205020404" pitchFamily="49" charset="0"/>
+                <a:cs typeface="Courier New" panose="02070309020205020404" pitchFamily="49" charset="0"/>
+              </a:rPr>
+              <a:t> = ’https://</a:t>
+            </a:r>
+            <a:r>
+              <a:rPr lang="en-US" sz="800" dirty="0" err="1">
+                <a:latin typeface="Courier New" panose="02070309020205020404" pitchFamily="49" charset="0"/>
+                <a:cs typeface="Courier New" panose="02070309020205020404" pitchFamily="49" charset="0"/>
+              </a:rPr>
+              <a:t>example.com</a:t>
+            </a:r>
+            <a:r>
+              <a:rPr lang="en-US" sz="800" dirty="0">
+                <a:latin typeface="Courier New" panose="02070309020205020404" pitchFamily="49" charset="0"/>
+                <a:cs typeface="Courier New" panose="02070309020205020404" pitchFamily="49" charset="0"/>
+              </a:rPr>
+              <a:t>’, data = </a:t>
+            </a:r>
+            <a:r>
+              <a:rPr lang="en-US" sz="800" dirty="0" err="1">
+                <a:latin typeface="Courier New" panose="02070309020205020404" pitchFamily="49" charset="0"/>
+                <a:cs typeface="Courier New" panose="02070309020205020404" pitchFamily="49" charset="0"/>
+              </a:rPr>
+              <a:t>last_json</a:t>
+            </a:r>
+            <a:r>
+              <a:rPr lang="en-US" sz="800" dirty="0">
+                <a:latin typeface="Courier New" panose="02070309020205020404" pitchFamily="49" charset="0"/>
+                <a:cs typeface="Courier New" panose="02070309020205020404" pitchFamily="49" charset="0"/>
+              </a:rPr>
+              <a:t>)</a:t>
+            </a:r>
+          </a:p>
+          <a:p>
+            <a:pPr marL="0" indent="0">
+              <a:lnSpc>
+                <a:spcPct val="100000"/>
+              </a:lnSpc>
+              <a:spcBef>
+                <a:spcPts val="0"/>
+              </a:spcBef>
+              <a:buNone/>
+            </a:pPr>
+            <a:r>
+              <a:rPr lang="en-US" sz="800" dirty="0">
+                <a:latin typeface="Courier New" panose="02070309020205020404" pitchFamily="49" charset="0"/>
+                <a:cs typeface="Courier New" panose="02070309020205020404" pitchFamily="49" charset="0"/>
+              </a:rPr>
+              <a:t>;</a:t>
+            </a:r>
+          </a:p>
+          <a:p>
+            <a:pPr marL="0" indent="0">
+              <a:lnSpc>
+                <a:spcPct val="100000"/>
+              </a:lnSpc>
+              <a:spcBef>
+                <a:spcPts val="0"/>
+              </a:spcBef>
+              <a:buNone/>
+            </a:pPr>
+            <a:endParaRPr lang="en-US" sz="800" dirty="0">
+              <a:latin typeface="Courier New" panose="02070309020205020404" pitchFamily="49" charset="0"/>
+              <a:cs typeface="Courier New" panose="02070309020205020404" pitchFamily="49" charset="0"/>
+            </a:endParaRPr>
+          </a:p>
+        </p:txBody>
+      </p:sp>
+      <p:sp>
+        <p:nvSpPr>
+          <p:cNvPr id="7" name="Content Placeholder 3">
+            <a:extLst>
+              <a:ext uri="{FF2B5EF4-FFF2-40B4-BE49-F238E27FC236}">
+                <a16:creationId xmlns:a16="http://schemas.microsoft.com/office/drawing/2014/main" id="{F9537B78-13D6-682E-8E8F-1862BECF79FD}"/>
+              </a:ext>
+            </a:extLst>
+          </p:cNvPr>
+          <p:cNvSpPr txBox="1">
+            <a:spLocks/>
+          </p:cNvSpPr>
+          <p:nvPr/>
+        </p:nvSpPr>
+        <p:spPr>
+          <a:xfrm>
+            <a:off x="4924722" y="1490869"/>
+            <a:ext cx="3891287" cy="4666215"/>
+          </a:xfrm>
+          <a:prstGeom prst="rect">
+            <a:avLst/>
+          </a:prstGeom>
+          <a:ln>
+            <a:solidFill>
+              <a:schemeClr val="bg1">
+                <a:lumMod val="50000"/>
+              </a:schemeClr>
+            </a:solidFill>
+          </a:ln>
+        </p:spPr>
+        <p:txBody>
+          <a:bodyPr vert="horz" lIns="91440" tIns="45720" rIns="91440" bIns="45720" rtlCol="0">
+            <a:normAutofit/>
+          </a:bodyPr>
+          <a:lstStyle>
+            <a:lvl1pPr marL="228600" indent="-228600" algn="l" defTabSz="914400" rtl="0" eaLnBrk="1" latinLnBrk="0" hangingPunct="1">
+              <a:lnSpc>
+                <a:spcPct val="90000"/>
+              </a:lnSpc>
+              <a:spcBef>
+                <a:spcPts val="1000"/>
+              </a:spcBef>
+              <a:buFont typeface="Arial" panose="020B0604020202020204" pitchFamily="34" charset="0"/>
+              <a:buChar char="•"/>
+              <a:defRPr sz="2800" kern="1200">
+                <a:solidFill>
+                  <a:schemeClr val="tx1"/>
+                </a:solidFill>
+                <a:latin typeface="+mn-lt"/>
+                <a:ea typeface="+mn-ea"/>
+                <a:cs typeface="+mn-cs"/>
+              </a:defRPr>
+            </a:lvl1pPr>
+            <a:lvl2pPr marL="685800" indent="-228600" algn="l" defTabSz="914400" rtl="0" eaLnBrk="1" latinLnBrk="0" hangingPunct="1">
+              <a:lnSpc>
+                <a:spcPct val="90000"/>
+              </a:lnSpc>
+              <a:spcBef>
+                <a:spcPts val="500"/>
+              </a:spcBef>
+              <a:buFont typeface="Arial" panose="020B0604020202020204" pitchFamily="34" charset="0"/>
+              <a:buChar char="•"/>
+              <a:defRPr sz="2400" kern="1200">
+                <a:solidFill>
+                  <a:schemeClr val="tx1"/>
+                </a:solidFill>
+                <a:latin typeface="+mn-lt"/>
+                <a:ea typeface="+mn-ea"/>
+                <a:cs typeface="+mn-cs"/>
+              </a:defRPr>
+            </a:lvl2pPr>
+            <a:lvl3pPr marL="1143000" indent="-228600" algn="l" defTabSz="914400" rtl="0" eaLnBrk="1" latinLnBrk="0" hangingPunct="1">
+              <a:lnSpc>
+                <a:spcPct val="90000"/>
+              </a:lnSpc>
+              <a:spcBef>
+                <a:spcPts val="500"/>
+              </a:spcBef>
+              <a:buFont typeface="Arial" panose="020B0604020202020204" pitchFamily="34" charset="0"/>
+              <a:buChar char="•"/>
+              <a:defRPr sz="2000" kern="1200">
+                <a:solidFill>
+                  <a:schemeClr val="tx1"/>
+                </a:solidFill>
+                <a:latin typeface="+mn-lt"/>
+                <a:ea typeface="+mn-ea"/>
+                <a:cs typeface="+mn-cs"/>
+              </a:defRPr>
+            </a:lvl3pPr>
+            <a:lvl4pPr marL="1600200" indent="-228600" algn="l" defTabSz="914400" rtl="0" eaLnBrk="1" latinLnBrk="0" hangingPunct="1">
+              <a:lnSpc>
+                <a:spcPct val="90000"/>
+              </a:lnSpc>
+              <a:spcBef>
+                <a:spcPts val="500"/>
+              </a:spcBef>
+              <a:buFont typeface="Arial" panose="020B0604020202020204" pitchFamily="34" charset="0"/>
+              <a:buChar char="•"/>
+              <a:defRPr sz="1800" kern="1200">
+                <a:solidFill>
+                  <a:schemeClr val="tx1"/>
+                </a:solidFill>
+                <a:latin typeface="+mn-lt"/>
+                <a:ea typeface="+mn-ea"/>
+                <a:cs typeface="+mn-cs"/>
+              </a:defRPr>
+            </a:lvl4pPr>
+            <a:lvl5pPr marL="2057400" indent="-228600" algn="l" defTabSz="914400" rtl="0" eaLnBrk="1" latinLnBrk="0" hangingPunct="1">
+              <a:lnSpc>
+                <a:spcPct val="90000"/>
+              </a:lnSpc>
+              <a:spcBef>
+                <a:spcPts val="500"/>
+              </a:spcBef>
+              <a:buFont typeface="Arial" panose="020B0604020202020204" pitchFamily="34" charset="0"/>
+              <a:buChar char="•"/>
+              <a:defRPr sz="1800" kern="1200">
+                <a:solidFill>
+                  <a:schemeClr val="tx1"/>
+                </a:solidFill>
+                <a:latin typeface="+mn-lt"/>
+                <a:ea typeface="+mn-ea"/>
+                <a:cs typeface="+mn-cs"/>
+              </a:defRPr>
+            </a:lvl5pPr>
+            <a:lvl6pPr marL="2514600" indent="-228600" algn="l" defTabSz="914400" rtl="0" eaLnBrk="1" latinLnBrk="0" hangingPunct="1">
+              <a:lnSpc>
+                <a:spcPct val="90000"/>
+              </a:lnSpc>
+              <a:spcBef>
+                <a:spcPts val="500"/>
+              </a:spcBef>
+              <a:buFont typeface="Arial" panose="020B0604020202020204" pitchFamily="34" charset="0"/>
+              <a:buChar char="•"/>
+              <a:defRPr sz="1800" kern="1200">
+                <a:solidFill>
+                  <a:schemeClr val="tx1"/>
+                </a:solidFill>
+                <a:latin typeface="+mn-lt"/>
+                <a:ea typeface="+mn-ea"/>
+                <a:cs typeface="+mn-cs"/>
+              </a:defRPr>
+            </a:lvl6pPr>
+            <a:lvl7pPr marL="2971800" indent="-228600" algn="l" defTabSz="914400" rtl="0" eaLnBrk="1" latinLnBrk="0" hangingPunct="1">
+              <a:lnSpc>
+                <a:spcPct val="90000"/>
+              </a:lnSpc>
+              <a:spcBef>
+                <a:spcPts val="500"/>
+              </a:spcBef>
+              <a:buFont typeface="Arial" panose="020B0604020202020204" pitchFamily="34" charset="0"/>
+              <a:buChar char="•"/>
+              <a:defRPr sz="1800" kern="1200">
+                <a:solidFill>
+                  <a:schemeClr val="tx1"/>
+                </a:solidFill>
+                <a:latin typeface="+mn-lt"/>
+                <a:ea typeface="+mn-ea"/>
+                <a:cs typeface="+mn-cs"/>
+              </a:defRPr>
+            </a:lvl7pPr>
+            <a:lvl8pPr marL="3429000" indent="-228600" algn="l" defTabSz="914400" rtl="0" eaLnBrk="1" latinLnBrk="0" hangingPunct="1">
+              <a:lnSpc>
+                <a:spcPct val="90000"/>
+              </a:lnSpc>
+              <a:spcBef>
+                <a:spcPts val="500"/>
+              </a:spcBef>
+              <a:buFont typeface="Arial" panose="020B0604020202020204" pitchFamily="34" charset="0"/>
+              <a:buChar char="•"/>
+              <a:defRPr sz="1800" kern="1200">
+                <a:solidFill>
+                  <a:schemeClr val="tx1"/>
+                </a:solidFill>
+                <a:latin typeface="+mn-lt"/>
+                <a:ea typeface="+mn-ea"/>
+                <a:cs typeface="+mn-cs"/>
+              </a:defRPr>
+            </a:lvl8pPr>
+            <a:lvl9pPr marL="3886200" indent="-228600" algn="l" defTabSz="914400" rtl="0" eaLnBrk="1" latinLnBrk="0" hangingPunct="1">
+              <a:lnSpc>
+                <a:spcPct val="90000"/>
+              </a:lnSpc>
+              <a:spcBef>
+                <a:spcPts val="500"/>
+              </a:spcBef>
+              <a:buFont typeface="Arial" panose="020B0604020202020204" pitchFamily="34" charset="0"/>
+              <a:buChar char="•"/>
+              <a:defRPr sz="1800" kern="1200">
+                <a:solidFill>
+                  <a:schemeClr val="tx1"/>
+                </a:solidFill>
+                <a:latin typeface="+mn-lt"/>
+                <a:ea typeface="+mn-ea"/>
+                <a:cs typeface="+mn-cs"/>
+              </a:defRPr>
+            </a:lvl9pPr>
+          </a:lstStyle>
+          <a:p>
+            <a:pPr marL="0" indent="0" defTabSz="182880">
+              <a:lnSpc>
+                <a:spcPct val="100000"/>
+              </a:lnSpc>
+              <a:spcBef>
+                <a:spcPts val="0"/>
+              </a:spcBef>
+              <a:buFont typeface="Arial" panose="020B0604020202020204" pitchFamily="34" charset="0"/>
+              <a:buNone/>
+            </a:pPr>
+            <a:r>
+              <a:rPr lang="en-US" sz="800" dirty="0">
+                <a:latin typeface="Courier New" panose="02070309020205020404" pitchFamily="49" charset="0"/>
+                <a:cs typeface="Courier New" panose="02070309020205020404" pitchFamily="49" charset="0"/>
+              </a:rPr>
+              <a:t>JINJA EXTENSIONS:</a:t>
+            </a:r>
+          </a:p>
+          <a:p>
+            <a:pPr marL="0" indent="0" defTabSz="182880">
+              <a:lnSpc>
+                <a:spcPct val="100000"/>
+              </a:lnSpc>
+              <a:spcBef>
+                <a:spcPts val="0"/>
+              </a:spcBef>
+              <a:buFont typeface="Arial" panose="020B0604020202020204" pitchFamily="34" charset="0"/>
+              <a:buNone/>
+            </a:pPr>
+            <a:endParaRPr lang="en-US" sz="800" dirty="0">
+              <a:latin typeface="Courier New" panose="02070309020205020404" pitchFamily="49" charset="0"/>
+              <a:cs typeface="Courier New" panose="02070309020205020404" pitchFamily="49" charset="0"/>
+            </a:endParaRPr>
+          </a:p>
+          <a:p>
+            <a:pPr marL="0" indent="0" defTabSz="182880">
+              <a:lnSpc>
+                <a:spcPct val="100000"/>
+              </a:lnSpc>
+              <a:spcBef>
+                <a:spcPts val="0"/>
+              </a:spcBef>
+              <a:buFont typeface="Arial" panose="020B0604020202020204" pitchFamily="34" charset="0"/>
+              <a:buNone/>
+            </a:pPr>
+            <a:r>
+              <a:rPr lang="en-US" sz="800" dirty="0">
+                <a:latin typeface="Courier New" panose="02070309020205020404" pitchFamily="49" charset="0"/>
+                <a:cs typeface="Courier New" panose="02070309020205020404" pitchFamily="49" charset="0"/>
+              </a:rPr>
+              <a:t>{% save.____( </a:t>
+            </a:r>
+            <a:r>
+              <a:rPr lang="en-US" sz="800" dirty="0" err="1">
+                <a:latin typeface="Courier New" panose="02070309020205020404" pitchFamily="49" charset="0"/>
+                <a:cs typeface="Courier New" panose="02070309020205020404" pitchFamily="49" charset="0"/>
+              </a:rPr>
+              <a:t>file_name</a:t>
+            </a:r>
+            <a:r>
+              <a:rPr lang="en-US" sz="800" dirty="0">
+                <a:latin typeface="Courier New" panose="02070309020205020404" pitchFamily="49" charset="0"/>
+                <a:cs typeface="Courier New" panose="02070309020205020404" pitchFamily="49" charset="0"/>
+              </a:rPr>
+              <a:t> = ””, </a:t>
+            </a:r>
+            <a:r>
+              <a:rPr lang="en-US" sz="800" dirty="0" err="1">
+                <a:latin typeface="Courier New" panose="02070309020205020404" pitchFamily="49" charset="0"/>
+                <a:cs typeface="Courier New" panose="02070309020205020404" pitchFamily="49" charset="0"/>
+              </a:rPr>
+              <a:t>memory_name</a:t>
+            </a:r>
+            <a:r>
+              <a:rPr lang="en-US" sz="800" dirty="0">
+                <a:latin typeface="Courier New" panose="02070309020205020404" pitchFamily="49" charset="0"/>
+                <a:cs typeface="Courier New" panose="02070309020205020404" pitchFamily="49" charset="0"/>
+              </a:rPr>
+              <a:t> = ””, rows = [:] )</a:t>
+            </a:r>
+          </a:p>
+          <a:p>
+            <a:pPr marL="0" indent="0" defTabSz="182880">
+              <a:lnSpc>
+                <a:spcPct val="100000"/>
+              </a:lnSpc>
+              <a:spcBef>
+                <a:spcPts val="0"/>
+              </a:spcBef>
+              <a:buFont typeface="Arial" panose="020B0604020202020204" pitchFamily="34" charset="0"/>
+              <a:buNone/>
+            </a:pPr>
+            <a:r>
+              <a:rPr lang="en-US" sz="800" dirty="0">
+                <a:latin typeface="Courier New" panose="02070309020205020404" pitchFamily="49" charset="0"/>
+                <a:cs typeface="Courier New" panose="02070309020205020404" pitchFamily="49" charset="0"/>
+              </a:rPr>
+              <a:t>		.csv</a:t>
+            </a:r>
+          </a:p>
+          <a:p>
+            <a:pPr marL="0" indent="0" defTabSz="182880">
+              <a:lnSpc>
+                <a:spcPct val="100000"/>
+              </a:lnSpc>
+              <a:spcBef>
+                <a:spcPts val="0"/>
+              </a:spcBef>
+              <a:buFont typeface="Arial" panose="020B0604020202020204" pitchFamily="34" charset="0"/>
+              <a:buNone/>
+            </a:pPr>
+            <a:r>
+              <a:rPr lang="en-US" sz="800" dirty="0">
+                <a:latin typeface="Courier New" panose="02070309020205020404" pitchFamily="49" charset="0"/>
+                <a:cs typeface="Courier New" panose="02070309020205020404" pitchFamily="49" charset="0"/>
+              </a:rPr>
+              <a:t>		.</a:t>
+            </a:r>
+            <a:r>
+              <a:rPr lang="en-US" sz="800" dirty="0" err="1">
+                <a:latin typeface="Courier New" panose="02070309020205020404" pitchFamily="49" charset="0"/>
+                <a:cs typeface="Courier New" panose="02070309020205020404" pitchFamily="49" charset="0"/>
+              </a:rPr>
+              <a:t>json</a:t>
+            </a:r>
+            <a:endParaRPr lang="en-US" sz="800" dirty="0">
+              <a:latin typeface="Courier New" panose="02070309020205020404" pitchFamily="49" charset="0"/>
+              <a:cs typeface="Courier New" panose="02070309020205020404" pitchFamily="49" charset="0"/>
+            </a:endParaRPr>
+          </a:p>
+          <a:p>
+            <a:pPr marL="0" indent="0" defTabSz="182880">
+              <a:lnSpc>
+                <a:spcPct val="100000"/>
+              </a:lnSpc>
+              <a:spcBef>
+                <a:spcPts val="0"/>
+              </a:spcBef>
+              <a:buFont typeface="Arial" panose="020B0604020202020204" pitchFamily="34" charset="0"/>
+              <a:buNone/>
+            </a:pPr>
+            <a:r>
+              <a:rPr lang="en-US" sz="800" dirty="0">
+                <a:latin typeface="Courier New" panose="02070309020205020404" pitchFamily="49" charset="0"/>
+                <a:cs typeface="Courier New" panose="02070309020205020404" pitchFamily="49" charset="0"/>
+              </a:rPr>
+              <a:t>		.memory</a:t>
+            </a:r>
+          </a:p>
+          <a:p>
+            <a:pPr marL="0" indent="0" defTabSz="182880">
+              <a:lnSpc>
+                <a:spcPct val="100000"/>
+              </a:lnSpc>
+              <a:spcBef>
+                <a:spcPts val="0"/>
+              </a:spcBef>
+              <a:buFont typeface="Arial" panose="020B0604020202020204" pitchFamily="34" charset="0"/>
+              <a:buNone/>
+            </a:pPr>
+            <a:r>
+              <a:rPr lang="en-US" sz="800" dirty="0">
+                <a:latin typeface="Courier New" panose="02070309020205020404" pitchFamily="49" charset="0"/>
+                <a:cs typeface="Courier New" panose="02070309020205020404" pitchFamily="49" charset="0"/>
+              </a:rPr>
+              <a:t>		.</a:t>
+            </a:r>
+            <a:r>
+              <a:rPr lang="en-US" sz="800" dirty="0" err="1">
+                <a:latin typeface="Courier New" panose="02070309020205020404" pitchFamily="49" charset="0"/>
+                <a:cs typeface="Courier New" panose="02070309020205020404" pitchFamily="49" charset="0"/>
+              </a:rPr>
+              <a:t>png</a:t>
+            </a:r>
+            <a:endParaRPr lang="en-US" sz="800" dirty="0">
+              <a:latin typeface="Courier New" panose="02070309020205020404" pitchFamily="49" charset="0"/>
+              <a:cs typeface="Courier New" panose="02070309020205020404" pitchFamily="49" charset="0"/>
+            </a:endParaRPr>
+          </a:p>
+          <a:p>
+            <a:pPr marL="0" indent="0" defTabSz="182880">
+              <a:lnSpc>
+                <a:spcPct val="100000"/>
+              </a:lnSpc>
+              <a:spcBef>
+                <a:spcPts val="0"/>
+              </a:spcBef>
+              <a:buFont typeface="Arial" panose="020B0604020202020204" pitchFamily="34" charset="0"/>
+              <a:buNone/>
+            </a:pPr>
+            <a:endParaRPr lang="en-US" sz="800" dirty="0">
+              <a:latin typeface="Courier New" panose="02070309020205020404" pitchFamily="49" charset="0"/>
+              <a:cs typeface="Courier New" panose="02070309020205020404" pitchFamily="49" charset="0"/>
+            </a:endParaRPr>
+          </a:p>
+          <a:p>
+            <a:pPr marL="0" indent="0" defTabSz="182880">
+              <a:lnSpc>
+                <a:spcPct val="100000"/>
+              </a:lnSpc>
+              <a:spcBef>
+                <a:spcPts val="0"/>
+              </a:spcBef>
+              <a:buFont typeface="Arial" panose="020B0604020202020204" pitchFamily="34" charset="0"/>
+              <a:buNone/>
+            </a:pPr>
+            <a:r>
+              <a:rPr lang="en-US" sz="800" dirty="0">
+                <a:latin typeface="Courier New" panose="02070309020205020404" pitchFamily="49" charset="0"/>
+                <a:cs typeface="Courier New" panose="02070309020205020404" pitchFamily="49" charset="0"/>
+              </a:rPr>
+              <a:t>{% load.____ ( </a:t>
+            </a:r>
+            <a:r>
+              <a:rPr lang="en-US" sz="800" dirty="0" err="1">
+                <a:latin typeface="Courier New" panose="02070309020205020404" pitchFamily="49" charset="0"/>
+                <a:cs typeface="Courier New" panose="02070309020205020404" pitchFamily="49" charset="0"/>
+              </a:rPr>
+              <a:t>file_name</a:t>
+            </a:r>
+            <a:r>
+              <a:rPr lang="en-US" sz="800" dirty="0">
+                <a:latin typeface="Courier New" panose="02070309020205020404" pitchFamily="49" charset="0"/>
+                <a:cs typeface="Courier New" panose="02070309020205020404" pitchFamily="49" charset="0"/>
+              </a:rPr>
+              <a:t> = ””, </a:t>
+            </a:r>
+            <a:r>
+              <a:rPr lang="en-US" sz="800" dirty="0" err="1">
+                <a:latin typeface="Courier New" panose="02070309020205020404" pitchFamily="49" charset="0"/>
+                <a:cs typeface="Courier New" panose="02070309020205020404" pitchFamily="49" charset="0"/>
+              </a:rPr>
+              <a:t>memory_name</a:t>
+            </a:r>
+            <a:r>
+              <a:rPr lang="en-US" sz="800" dirty="0">
+                <a:latin typeface="Courier New" panose="02070309020205020404" pitchFamily="49" charset="0"/>
+                <a:cs typeface="Courier New" panose="02070309020205020404" pitchFamily="49" charset="0"/>
+              </a:rPr>
+              <a:t> = ””, rows = [:] )</a:t>
+            </a:r>
+          </a:p>
+          <a:p>
+            <a:pPr marL="0" indent="0" defTabSz="182880">
+              <a:lnSpc>
+                <a:spcPct val="100000"/>
+              </a:lnSpc>
+              <a:spcBef>
+                <a:spcPts val="0"/>
+              </a:spcBef>
+              <a:buFont typeface="Arial" panose="020B0604020202020204" pitchFamily="34" charset="0"/>
+              <a:buNone/>
+            </a:pPr>
+            <a:r>
+              <a:rPr lang="en-US" sz="800" dirty="0">
+                <a:latin typeface="Courier New" panose="02070309020205020404" pitchFamily="49" charset="0"/>
+                <a:cs typeface="Courier New" panose="02070309020205020404" pitchFamily="49" charset="0"/>
+              </a:rPr>
+              <a:t>		.csv</a:t>
+            </a:r>
+          </a:p>
+          <a:p>
+            <a:pPr marL="0" indent="0" defTabSz="182880">
+              <a:lnSpc>
+                <a:spcPct val="100000"/>
+              </a:lnSpc>
+              <a:spcBef>
+                <a:spcPts val="0"/>
+              </a:spcBef>
+              <a:buFont typeface="Arial" panose="020B0604020202020204" pitchFamily="34" charset="0"/>
+              <a:buNone/>
+            </a:pPr>
+            <a:r>
+              <a:rPr lang="en-US" sz="800" dirty="0">
+                <a:latin typeface="Courier New" panose="02070309020205020404" pitchFamily="49" charset="0"/>
+                <a:cs typeface="Courier New" panose="02070309020205020404" pitchFamily="49" charset="0"/>
+              </a:rPr>
+              <a:t>		.</a:t>
+            </a:r>
+            <a:r>
+              <a:rPr lang="en-US" sz="800" dirty="0" err="1">
+                <a:latin typeface="Courier New" panose="02070309020205020404" pitchFamily="49" charset="0"/>
+                <a:cs typeface="Courier New" panose="02070309020205020404" pitchFamily="49" charset="0"/>
+              </a:rPr>
+              <a:t>json</a:t>
+            </a:r>
+            <a:endParaRPr lang="en-US" sz="800" dirty="0">
+              <a:latin typeface="Courier New" panose="02070309020205020404" pitchFamily="49" charset="0"/>
+              <a:cs typeface="Courier New" panose="02070309020205020404" pitchFamily="49" charset="0"/>
+            </a:endParaRPr>
+          </a:p>
+          <a:p>
+            <a:pPr marL="0" indent="0" defTabSz="182880">
+              <a:lnSpc>
+                <a:spcPct val="100000"/>
+              </a:lnSpc>
+              <a:spcBef>
+                <a:spcPts val="0"/>
+              </a:spcBef>
+              <a:buFont typeface="Arial" panose="020B0604020202020204" pitchFamily="34" charset="0"/>
+              <a:buNone/>
+            </a:pPr>
+            <a:r>
+              <a:rPr lang="en-US" sz="800" dirty="0">
+                <a:latin typeface="Courier New" panose="02070309020205020404" pitchFamily="49" charset="0"/>
+                <a:cs typeface="Courier New" panose="02070309020205020404" pitchFamily="49" charset="0"/>
+              </a:rPr>
+              <a:t>		.</a:t>
+            </a:r>
+            <a:r>
+              <a:rPr lang="en-US" sz="800" dirty="0" err="1">
+                <a:latin typeface="Courier New" panose="02070309020205020404" pitchFamily="49" charset="0"/>
+                <a:cs typeface="Courier New" panose="02070309020205020404" pitchFamily="49" charset="0"/>
+              </a:rPr>
+              <a:t>dotenv</a:t>
+            </a:r>
+            <a:endParaRPr lang="en-US" sz="800" dirty="0">
+              <a:latin typeface="Courier New" panose="02070309020205020404" pitchFamily="49" charset="0"/>
+              <a:cs typeface="Courier New" panose="02070309020205020404" pitchFamily="49" charset="0"/>
+            </a:endParaRPr>
+          </a:p>
+          <a:p>
+            <a:pPr marL="0" indent="0" defTabSz="182880">
+              <a:lnSpc>
+                <a:spcPct val="100000"/>
+              </a:lnSpc>
+              <a:spcBef>
+                <a:spcPts val="0"/>
+              </a:spcBef>
+              <a:buFont typeface="Arial" panose="020B0604020202020204" pitchFamily="34" charset="0"/>
+              <a:buNone/>
+            </a:pPr>
+            <a:endParaRPr lang="en-US" sz="800" dirty="0">
+              <a:latin typeface="Courier New" panose="02070309020205020404" pitchFamily="49" charset="0"/>
+              <a:cs typeface="Courier New" panose="02070309020205020404" pitchFamily="49" charset="0"/>
+            </a:endParaRPr>
+          </a:p>
+          <a:p>
+            <a:pPr marL="0" indent="0" defTabSz="182880">
+              <a:lnSpc>
+                <a:spcPct val="100000"/>
+              </a:lnSpc>
+              <a:spcBef>
+                <a:spcPts val="0"/>
+              </a:spcBef>
+              <a:buFont typeface="Arial" panose="020B0604020202020204" pitchFamily="34" charset="0"/>
+              <a:buNone/>
+            </a:pPr>
+            <a:r>
+              <a:rPr lang="en-US" sz="800" dirty="0">
+                <a:latin typeface="Courier New" panose="02070309020205020404" pitchFamily="49" charset="0"/>
+                <a:cs typeface="Courier New" panose="02070309020205020404" pitchFamily="49" charset="0"/>
+              </a:rPr>
+              <a:t>{% </a:t>
+            </a:r>
+            <a:r>
+              <a:rPr lang="en-US" sz="800" dirty="0" err="1">
+                <a:latin typeface="Courier New" panose="02070309020205020404" pitchFamily="49" charset="0"/>
+                <a:cs typeface="Courier New" panose="02070309020205020404" pitchFamily="49" charset="0"/>
+              </a:rPr>
+              <a:t>load.parms</a:t>
+            </a:r>
+            <a:r>
+              <a:rPr lang="en-US" sz="800" dirty="0">
+                <a:latin typeface="Courier New" panose="02070309020205020404" pitchFamily="49" charset="0"/>
+                <a:cs typeface="Courier New" panose="02070309020205020404" pitchFamily="49" charset="0"/>
+              </a:rPr>
+              <a:t>.____</a:t>
+            </a:r>
+          </a:p>
+          <a:p>
+            <a:pPr marL="0" indent="0" defTabSz="182880">
+              <a:lnSpc>
+                <a:spcPct val="100000"/>
+              </a:lnSpc>
+              <a:spcBef>
+                <a:spcPts val="0"/>
+              </a:spcBef>
+              <a:buFont typeface="Arial" panose="020B0604020202020204" pitchFamily="34" charset="0"/>
+              <a:buNone/>
+            </a:pPr>
+            <a:r>
+              <a:rPr lang="en-US" sz="800" dirty="0">
+                <a:latin typeface="Courier New" panose="02070309020205020404" pitchFamily="49" charset="0"/>
+                <a:cs typeface="Courier New" panose="02070309020205020404" pitchFamily="49" charset="0"/>
+              </a:rPr>
+              <a:t>			.connection</a:t>
+            </a:r>
+          </a:p>
+          <a:p>
+            <a:pPr marL="0" indent="0" defTabSz="182880">
+              <a:lnSpc>
+                <a:spcPct val="100000"/>
+              </a:lnSpc>
+              <a:spcBef>
+                <a:spcPts val="0"/>
+              </a:spcBef>
+              <a:buFont typeface="Arial" panose="020B0604020202020204" pitchFamily="34" charset="0"/>
+              <a:buNone/>
+            </a:pPr>
+            <a:r>
+              <a:rPr lang="en-US" sz="800" dirty="0">
+                <a:latin typeface="Courier New" panose="02070309020205020404" pitchFamily="49" charset="0"/>
+                <a:cs typeface="Courier New" panose="02070309020205020404" pitchFamily="49" charset="0"/>
+              </a:rPr>
+              <a:t>			.organization</a:t>
+            </a:r>
+          </a:p>
+          <a:p>
+            <a:pPr marL="0" indent="0" defTabSz="182880">
+              <a:lnSpc>
+                <a:spcPct val="100000"/>
+              </a:lnSpc>
+              <a:spcBef>
+                <a:spcPts val="0"/>
+              </a:spcBef>
+              <a:buFont typeface="Arial" panose="020B0604020202020204" pitchFamily="34" charset="0"/>
+              <a:buNone/>
+            </a:pPr>
+            <a:r>
+              <a:rPr lang="en-US" sz="800" dirty="0">
+                <a:latin typeface="Courier New" panose="02070309020205020404" pitchFamily="49" charset="0"/>
+                <a:cs typeface="Courier New" panose="02070309020205020404" pitchFamily="49" charset="0"/>
+              </a:rPr>
+              <a:t>			.user</a:t>
+            </a:r>
+          </a:p>
+          <a:p>
+            <a:pPr marL="0" indent="0" defTabSz="182880">
+              <a:lnSpc>
+                <a:spcPct val="100000"/>
+              </a:lnSpc>
+              <a:spcBef>
+                <a:spcPts val="0"/>
+              </a:spcBef>
+              <a:buFont typeface="Arial" panose="020B0604020202020204" pitchFamily="34" charset="0"/>
+              <a:buNone/>
+            </a:pPr>
+            <a:r>
+              <a:rPr lang="en-US" sz="800" dirty="0">
+                <a:latin typeface="Courier New" panose="02070309020205020404" pitchFamily="49" charset="0"/>
+                <a:cs typeface="Courier New" panose="02070309020205020404" pitchFamily="49" charset="0"/>
+              </a:rPr>
+              <a:t>			.</a:t>
+            </a:r>
+            <a:r>
+              <a:rPr lang="en-US" sz="800" dirty="0" err="1">
+                <a:latin typeface="Courier New" panose="02070309020205020404" pitchFamily="49" charset="0"/>
+                <a:cs typeface="Courier New" panose="02070309020205020404" pitchFamily="49" charset="0"/>
+              </a:rPr>
+              <a:t>dotenv</a:t>
+            </a:r>
+            <a:endParaRPr lang="en-US" sz="800" dirty="0">
+              <a:latin typeface="Courier New" panose="02070309020205020404" pitchFamily="49" charset="0"/>
+              <a:cs typeface="Courier New" panose="02070309020205020404" pitchFamily="49" charset="0"/>
+            </a:endParaRPr>
+          </a:p>
+          <a:p>
+            <a:pPr marL="0" indent="0" defTabSz="182880">
+              <a:lnSpc>
+                <a:spcPct val="100000"/>
+              </a:lnSpc>
+              <a:spcBef>
+                <a:spcPts val="0"/>
+              </a:spcBef>
+              <a:buFont typeface="Arial" panose="020B0604020202020204" pitchFamily="34" charset="0"/>
+              <a:buNone/>
+            </a:pPr>
+            <a:r>
+              <a:rPr lang="en-US" sz="800" dirty="0">
+                <a:latin typeface="Courier New" panose="02070309020205020404" pitchFamily="49" charset="0"/>
+                <a:cs typeface="Courier New" panose="02070309020205020404" pitchFamily="49" charset="0"/>
+              </a:rPr>
+              <a:t> </a:t>
+            </a:r>
+          </a:p>
+          <a:p>
+            <a:pPr marL="0" indent="0" defTabSz="182880">
+              <a:lnSpc>
+                <a:spcPct val="100000"/>
+              </a:lnSpc>
+              <a:spcBef>
+                <a:spcPts val="0"/>
+              </a:spcBef>
+              <a:buFont typeface="Arial" panose="020B0604020202020204" pitchFamily="34" charset="0"/>
+              <a:buNone/>
+            </a:pPr>
+            <a:r>
+              <a:rPr lang="en-US" sz="800" dirty="0">
+                <a:latin typeface="Courier New" panose="02070309020205020404" pitchFamily="49" charset="0"/>
+                <a:cs typeface="Courier New" panose="02070309020205020404" pitchFamily="49" charset="0"/>
+              </a:rPr>
+              <a:t>{% exec.____ ( </a:t>
+            </a:r>
+            <a:r>
+              <a:rPr lang="en-US" sz="800" dirty="0" err="1">
+                <a:latin typeface="Courier New" panose="02070309020205020404" pitchFamily="49" charset="0"/>
+                <a:cs typeface="Courier New" panose="02070309020205020404" pitchFamily="49" charset="0"/>
+              </a:rPr>
+              <a:t>file_name</a:t>
+            </a:r>
+            <a:r>
+              <a:rPr lang="en-US" sz="800" dirty="0">
+                <a:latin typeface="Courier New" panose="02070309020205020404" pitchFamily="49" charset="0"/>
+                <a:cs typeface="Courier New" panose="02070309020205020404" pitchFamily="49" charset="0"/>
+              </a:rPr>
+              <a:t> = ””, </a:t>
+            </a:r>
+          </a:p>
+          <a:p>
+            <a:pPr marL="0" indent="0" defTabSz="182880">
+              <a:lnSpc>
+                <a:spcPct val="100000"/>
+              </a:lnSpc>
+              <a:spcBef>
+                <a:spcPts val="0"/>
+              </a:spcBef>
+              <a:buFont typeface="Arial" panose="020B0604020202020204" pitchFamily="34" charset="0"/>
+              <a:buNone/>
+            </a:pPr>
+            <a:r>
+              <a:rPr lang="en-US" sz="800" dirty="0">
+                <a:latin typeface="Courier New" panose="02070309020205020404" pitchFamily="49" charset="0"/>
+                <a:cs typeface="Courier New" panose="02070309020205020404" pitchFamily="49" charset="0"/>
+              </a:rPr>
+              <a:t>		.python (..., </a:t>
+            </a:r>
+            <a:r>
+              <a:rPr lang="en-US" sz="800" dirty="0" err="1">
+                <a:latin typeface="Courier New" panose="02070309020205020404" pitchFamily="49" charset="0"/>
+                <a:cs typeface="Courier New" panose="02070309020205020404" pitchFamily="49" charset="0"/>
+              </a:rPr>
+              <a:t>script_text</a:t>
+            </a:r>
+            <a:r>
+              <a:rPr lang="en-US" sz="800" dirty="0">
+                <a:latin typeface="Courier New" panose="02070309020205020404" pitchFamily="49" charset="0"/>
+                <a:cs typeface="Courier New" panose="02070309020205020404" pitchFamily="49" charset="0"/>
+              </a:rPr>
+              <a:t> = ””,</a:t>
+            </a:r>
+          </a:p>
+          <a:p>
+            <a:pPr marL="0" indent="0" defTabSz="182880">
+              <a:lnSpc>
+                <a:spcPct val="100000"/>
+              </a:lnSpc>
+              <a:spcBef>
+                <a:spcPts val="0"/>
+              </a:spcBef>
+              <a:buNone/>
+            </a:pPr>
+            <a:r>
+              <a:rPr lang="en-US" sz="800" dirty="0">
+                <a:latin typeface="Courier New" panose="02070309020205020404" pitchFamily="49" charset="0"/>
+                <a:cs typeface="Courier New" panose="02070309020205020404" pitchFamily="49" charset="0"/>
+              </a:rPr>
+              <a:t>		.shell  (..., </a:t>
+            </a:r>
+            <a:r>
+              <a:rPr lang="en-US" sz="800" dirty="0" err="1">
+                <a:latin typeface="Courier New" panose="02070309020205020404" pitchFamily="49" charset="0"/>
+                <a:cs typeface="Courier New" panose="02070309020205020404" pitchFamily="49" charset="0"/>
+              </a:rPr>
+              <a:t>script_text</a:t>
+            </a:r>
+            <a:r>
+              <a:rPr lang="en-US" sz="800" dirty="0">
+                <a:latin typeface="Courier New" panose="02070309020205020404" pitchFamily="49" charset="0"/>
+                <a:cs typeface="Courier New" panose="02070309020205020404" pitchFamily="49" charset="0"/>
+              </a:rPr>
+              <a:t> = ””,</a:t>
+            </a:r>
+          </a:p>
+          <a:p>
+            <a:pPr marL="0" indent="0" defTabSz="182880">
+              <a:lnSpc>
+                <a:spcPct val="100000"/>
+              </a:lnSpc>
+              <a:spcBef>
+                <a:spcPts val="0"/>
+              </a:spcBef>
+              <a:buNone/>
+            </a:pPr>
+            <a:r>
+              <a:rPr lang="en-US" sz="800" dirty="0">
+                <a:latin typeface="Courier New" panose="02070309020205020404" pitchFamily="49" charset="0"/>
+                <a:cs typeface="Courier New" panose="02070309020205020404" pitchFamily="49" charset="0"/>
+              </a:rPr>
+              <a:t>		.</a:t>
+            </a:r>
+            <a:r>
+              <a:rPr lang="en-US" sz="800" dirty="0" err="1">
+                <a:latin typeface="Courier New" panose="02070309020205020404" pitchFamily="49" charset="0"/>
+                <a:cs typeface="Courier New" panose="02070309020205020404" pitchFamily="49" charset="0"/>
+              </a:rPr>
+              <a:t>api</a:t>
+            </a:r>
+            <a:r>
+              <a:rPr lang="en-US" sz="800" dirty="0">
+                <a:latin typeface="Courier New" panose="02070309020205020404" pitchFamily="49" charset="0"/>
+                <a:cs typeface="Courier New" panose="02070309020205020404" pitchFamily="49" charset="0"/>
+              </a:rPr>
+              <a:t>    (..., </a:t>
+            </a:r>
+            <a:r>
+              <a:rPr lang="en-US" sz="800" dirty="0" err="1">
+                <a:latin typeface="Courier New" panose="02070309020205020404" pitchFamily="49" charset="0"/>
+                <a:cs typeface="Courier New" panose="02070309020205020404" pitchFamily="49" charset="0"/>
+              </a:rPr>
+              <a:t>url</a:t>
+            </a:r>
+            <a:r>
+              <a:rPr lang="en-US" sz="800" dirty="0">
+                <a:latin typeface="Courier New" panose="02070309020205020404" pitchFamily="49" charset="0"/>
+                <a:cs typeface="Courier New" panose="02070309020205020404" pitchFamily="49" charset="0"/>
+              </a:rPr>
+              <a:t> = ””, headers = ””, data = ””, </a:t>
+            </a:r>
+          </a:p>
+          <a:p>
+            <a:pPr marL="0" indent="0" defTabSz="182880">
+              <a:lnSpc>
+                <a:spcPct val="100000"/>
+              </a:lnSpc>
+              <a:spcBef>
+                <a:spcPts val="0"/>
+              </a:spcBef>
+              <a:buNone/>
+            </a:pPr>
+            <a:r>
+              <a:rPr lang="en-US" sz="800" dirty="0">
+                <a:latin typeface="Courier New" panose="02070309020205020404" pitchFamily="49" charset="0"/>
+                <a:cs typeface="Courier New" panose="02070309020205020404" pitchFamily="49" charset="0"/>
+              </a:rPr>
+              <a:t>		.</a:t>
+            </a:r>
+            <a:r>
+              <a:rPr lang="en-US" sz="800" dirty="0" err="1">
+                <a:latin typeface="Courier New" panose="02070309020205020404" pitchFamily="49" charset="0"/>
+                <a:cs typeface="Courier New" panose="02070309020205020404" pitchFamily="49" charset="0"/>
+              </a:rPr>
+              <a:t>smartcontract</a:t>
+            </a:r>
+            <a:r>
+              <a:rPr lang="en-US" sz="800" dirty="0">
+                <a:latin typeface="Courier New" panose="02070309020205020404" pitchFamily="49" charset="0"/>
+                <a:cs typeface="Courier New" panose="02070309020205020404" pitchFamily="49" charset="0"/>
+              </a:rPr>
+              <a:t> (..., address = ””, parameters = ””,</a:t>
+            </a:r>
+          </a:p>
+          <a:p>
+            <a:pPr marL="0" indent="0" defTabSz="182880">
+              <a:lnSpc>
+                <a:spcPct val="100000"/>
+              </a:lnSpc>
+              <a:spcBef>
+                <a:spcPts val="0"/>
+              </a:spcBef>
+              <a:buFont typeface="Arial" panose="020B0604020202020204" pitchFamily="34" charset="0"/>
+              <a:buNone/>
+            </a:pPr>
+            <a:endParaRPr lang="en-US" sz="800" dirty="0">
+              <a:latin typeface="Courier New" panose="02070309020205020404" pitchFamily="49" charset="0"/>
+              <a:cs typeface="Courier New" panose="02070309020205020404" pitchFamily="49" charset="0"/>
+            </a:endParaRPr>
+          </a:p>
+          <a:p>
+            <a:pPr marL="0" indent="0" defTabSz="182880">
+              <a:lnSpc>
+                <a:spcPct val="100000"/>
+              </a:lnSpc>
+              <a:spcBef>
+                <a:spcPts val="0"/>
+              </a:spcBef>
+              <a:buFont typeface="Arial" panose="020B0604020202020204" pitchFamily="34" charset="0"/>
+              <a:buNone/>
+            </a:pPr>
+            <a:r>
+              <a:rPr lang="en-US" sz="800" dirty="0">
+                <a:latin typeface="Courier New" panose="02070309020205020404" pitchFamily="49" charset="0"/>
+                <a:cs typeface="Courier New" panose="02070309020205020404" pitchFamily="49" charset="0"/>
+              </a:rPr>
+              <a:t>{% mint.____</a:t>
+            </a:r>
+          </a:p>
+          <a:p>
+            <a:pPr marL="0" indent="0" defTabSz="182880">
+              <a:lnSpc>
+                <a:spcPct val="100000"/>
+              </a:lnSpc>
+              <a:spcBef>
+                <a:spcPts val="0"/>
+              </a:spcBef>
+              <a:buFont typeface="Arial" panose="020B0604020202020204" pitchFamily="34" charset="0"/>
+              <a:buNone/>
+            </a:pPr>
+            <a:endParaRPr lang="en-US" sz="800" dirty="0">
+              <a:latin typeface="Courier New" panose="02070309020205020404" pitchFamily="49" charset="0"/>
+              <a:cs typeface="Courier New" panose="02070309020205020404" pitchFamily="49" charset="0"/>
+            </a:endParaRPr>
+          </a:p>
+          <a:p>
+            <a:pPr marL="0" indent="0" defTabSz="182880">
+              <a:lnSpc>
+                <a:spcPct val="100000"/>
+              </a:lnSpc>
+              <a:spcBef>
+                <a:spcPts val="0"/>
+              </a:spcBef>
+              <a:buFont typeface="Arial" panose="020B0604020202020204" pitchFamily="34" charset="0"/>
+              <a:buNone/>
+            </a:pPr>
+            <a:r>
+              <a:rPr lang="en-US" sz="800" dirty="0">
+                <a:latin typeface="Courier New" panose="02070309020205020404" pitchFamily="49" charset="0"/>
+                <a:cs typeface="Courier New" panose="02070309020205020404" pitchFamily="49" charset="0"/>
+              </a:rPr>
+              <a:t>{% chart.____ </a:t>
+            </a:r>
+          </a:p>
+          <a:p>
+            <a:pPr marL="0" indent="0" defTabSz="182880">
+              <a:lnSpc>
+                <a:spcPct val="100000"/>
+              </a:lnSpc>
+              <a:spcBef>
+                <a:spcPts val="0"/>
+              </a:spcBef>
+              <a:buFont typeface="Arial" panose="020B0604020202020204" pitchFamily="34" charset="0"/>
+              <a:buNone/>
+            </a:pPr>
+            <a:endParaRPr lang="en-US" sz="800" dirty="0">
+              <a:latin typeface="Courier New" panose="02070309020205020404" pitchFamily="49" charset="0"/>
+              <a:cs typeface="Courier New" panose="02070309020205020404" pitchFamily="49" charset="0"/>
+            </a:endParaRPr>
+          </a:p>
+          <a:p>
+            <a:pPr marL="0" indent="0" defTabSz="182880">
+              <a:lnSpc>
+                <a:spcPct val="100000"/>
+              </a:lnSpc>
+              <a:spcBef>
+                <a:spcPts val="0"/>
+              </a:spcBef>
+              <a:buFont typeface="Arial" panose="020B0604020202020204" pitchFamily="34" charset="0"/>
+              <a:buNone/>
+            </a:pPr>
+            <a:r>
+              <a:rPr lang="en-US" sz="800" dirty="0">
+                <a:latin typeface="Courier New" panose="02070309020205020404" pitchFamily="49" charset="0"/>
+                <a:cs typeface="Courier New" panose="02070309020205020404" pitchFamily="49" charset="0"/>
+              </a:rPr>
+              <a:t>{% pptx.____</a:t>
+            </a:r>
+          </a:p>
+          <a:p>
+            <a:pPr marL="0" indent="0" defTabSz="182880">
+              <a:lnSpc>
+                <a:spcPct val="100000"/>
+              </a:lnSpc>
+              <a:spcBef>
+                <a:spcPts val="0"/>
+              </a:spcBef>
+              <a:buFont typeface="Arial" panose="020B0604020202020204" pitchFamily="34" charset="0"/>
+              <a:buNone/>
+            </a:pPr>
+            <a:endParaRPr lang="en-US" sz="800" dirty="0">
+              <a:latin typeface="Courier New" panose="02070309020205020404" pitchFamily="49" charset="0"/>
+              <a:cs typeface="Courier New" panose="02070309020205020404" pitchFamily="49" charset="0"/>
+            </a:endParaRPr>
+          </a:p>
+          <a:p>
+            <a:pPr marL="0" indent="0" defTabSz="182880">
+              <a:lnSpc>
+                <a:spcPct val="100000"/>
+              </a:lnSpc>
+              <a:spcBef>
+                <a:spcPts val="0"/>
+              </a:spcBef>
+              <a:buFont typeface="Arial" panose="020B0604020202020204" pitchFamily="34" charset="0"/>
+              <a:buNone/>
+            </a:pPr>
+            <a:r>
+              <a:rPr lang="en-US" sz="800" dirty="0">
+                <a:latin typeface="Courier New" panose="02070309020205020404" pitchFamily="49" charset="0"/>
+                <a:cs typeface="Courier New" panose="02070309020205020404" pitchFamily="49" charset="0"/>
+              </a:rPr>
+              <a:t>{% config.____</a:t>
+            </a:r>
+          </a:p>
+          <a:p>
+            <a:pPr marL="0" indent="0" defTabSz="182880">
+              <a:lnSpc>
+                <a:spcPct val="100000"/>
+              </a:lnSpc>
+              <a:spcBef>
+                <a:spcPts val="0"/>
+              </a:spcBef>
+              <a:buFont typeface="Arial" panose="020B0604020202020204" pitchFamily="34" charset="0"/>
+              <a:buNone/>
+            </a:pPr>
+            <a:r>
+              <a:rPr lang="en-US" sz="800" dirty="0">
+                <a:latin typeface="Courier New" panose="02070309020205020404" pitchFamily="49" charset="0"/>
+                <a:cs typeface="Courier New" panose="02070309020205020404" pitchFamily="49" charset="0"/>
+              </a:rPr>
+              <a:t>		.</a:t>
+            </a:r>
+            <a:r>
+              <a:rPr lang="en-US" sz="800" dirty="0" err="1">
+                <a:latin typeface="Courier New" panose="02070309020205020404" pitchFamily="49" charset="0"/>
+                <a:cs typeface="Courier New" panose="02070309020205020404" pitchFamily="49" charset="0"/>
+              </a:rPr>
+              <a:t>error_handler</a:t>
+            </a:r>
+            <a:r>
+              <a:rPr lang="en-US" sz="800" dirty="0">
+                <a:latin typeface="Courier New" panose="02070309020205020404" pitchFamily="49" charset="0"/>
+                <a:cs typeface="Courier New" panose="02070309020205020404" pitchFamily="49" charset="0"/>
+              </a:rPr>
+              <a:t> ( </a:t>
+            </a:r>
+            <a:r>
+              <a:rPr lang="en-US" sz="800" dirty="0" err="1">
+                <a:latin typeface="Courier New" panose="02070309020205020404" pitchFamily="49" charset="0"/>
+                <a:cs typeface="Courier New" panose="02070309020205020404" pitchFamily="49" charset="0"/>
+              </a:rPr>
+              <a:t>file_name</a:t>
+            </a:r>
+            <a:r>
+              <a:rPr lang="en-US" sz="800" dirty="0">
+                <a:latin typeface="Courier New" panose="02070309020205020404" pitchFamily="49" charset="0"/>
+                <a:cs typeface="Courier New" panose="02070309020205020404" pitchFamily="49" charset="0"/>
+              </a:rPr>
+              <a:t> = ”./</a:t>
+            </a:r>
+            <a:r>
+              <a:rPr lang="en-US" sz="800" dirty="0" err="1">
+                <a:latin typeface="Courier New" panose="02070309020205020404" pitchFamily="49" charset="0"/>
+                <a:cs typeface="Courier New" panose="02070309020205020404" pitchFamily="49" charset="0"/>
+              </a:rPr>
+              <a:t>appcode</a:t>
+            </a:r>
+            <a:r>
+              <a:rPr lang="en-US" sz="800" dirty="0">
+                <a:latin typeface="Courier New" panose="02070309020205020404" pitchFamily="49" charset="0"/>
+                <a:cs typeface="Courier New" panose="02070309020205020404" pitchFamily="49" charset="0"/>
+              </a:rPr>
+              <a:t>/</a:t>
+            </a:r>
+            <a:r>
+              <a:rPr lang="en-US" sz="800" dirty="0" err="1">
+                <a:latin typeface="Courier New" panose="02070309020205020404" pitchFamily="49" charset="0"/>
+                <a:cs typeface="Courier New" panose="02070309020205020404" pitchFamily="49" charset="0"/>
+              </a:rPr>
+              <a:t>on_error.py</a:t>
+            </a:r>
+            <a:r>
+              <a:rPr lang="en-US" sz="800" dirty="0">
+                <a:latin typeface="Courier New" panose="02070309020205020404" pitchFamily="49" charset="0"/>
+                <a:cs typeface="Courier New" panose="02070309020205020404" pitchFamily="49" charset="0"/>
+              </a:rPr>
+              <a:t>”</a:t>
+            </a:r>
+          </a:p>
+          <a:p>
+            <a:pPr marL="0" indent="0" defTabSz="182880">
+              <a:lnSpc>
+                <a:spcPct val="100000"/>
+              </a:lnSpc>
+              <a:spcBef>
+                <a:spcPts val="0"/>
+              </a:spcBef>
+              <a:buFont typeface="Arial" panose="020B0604020202020204" pitchFamily="34" charset="0"/>
+              <a:buNone/>
+            </a:pPr>
+            <a:r>
+              <a:rPr lang="en-US" sz="800" dirty="0">
+                <a:latin typeface="Courier New" panose="02070309020205020404" pitchFamily="49" charset="0"/>
+                <a:cs typeface="Courier New" panose="02070309020205020404" pitchFamily="49" charset="0"/>
+              </a:rPr>
+              <a:t>		.</a:t>
+            </a:r>
+            <a:r>
+              <a:rPr lang="en-US" sz="800" dirty="0" err="1">
+                <a:latin typeface="Courier New" panose="02070309020205020404" pitchFamily="49" charset="0"/>
+                <a:cs typeface="Courier New" panose="02070309020205020404" pitchFamily="49" charset="0"/>
+              </a:rPr>
+              <a:t>error_behavior</a:t>
+            </a:r>
+            <a:r>
+              <a:rPr lang="en-US" sz="800" dirty="0">
+                <a:latin typeface="Courier New" panose="02070309020205020404" pitchFamily="49" charset="0"/>
+                <a:cs typeface="Courier New" panose="02070309020205020404" pitchFamily="49" charset="0"/>
+              </a:rPr>
+              <a:t> ( [continue | stop | checkpoint | etc.]</a:t>
+            </a:r>
+          </a:p>
+          <a:p>
+            <a:pPr marL="0" indent="0" defTabSz="182880">
+              <a:lnSpc>
+                <a:spcPct val="100000"/>
+              </a:lnSpc>
+              <a:spcBef>
+                <a:spcPts val="0"/>
+              </a:spcBef>
+              <a:buFont typeface="Arial" panose="020B0604020202020204" pitchFamily="34" charset="0"/>
+              <a:buNone/>
+            </a:pPr>
+            <a:r>
+              <a:rPr lang="en-US" sz="800" dirty="0">
+                <a:latin typeface="Courier New" panose="02070309020205020404" pitchFamily="49" charset="0"/>
+                <a:cs typeface="Courier New" panose="02070309020205020404" pitchFamily="49" charset="0"/>
+              </a:rPr>
+              <a:t>		.logger ( name = ”</a:t>
+            </a:r>
+            <a:r>
+              <a:rPr lang="en-US" sz="800" dirty="0" err="1">
+                <a:latin typeface="Courier New" panose="02070309020205020404" pitchFamily="49" charset="0"/>
+                <a:cs typeface="Courier New" panose="02070309020205020404" pitchFamily="49" charset="0"/>
+              </a:rPr>
+              <a:t>logger.py</a:t>
+            </a:r>
+            <a:r>
+              <a:rPr lang="en-US" sz="800" dirty="0">
+                <a:latin typeface="Courier New" panose="02070309020205020404" pitchFamily="49" charset="0"/>
+                <a:cs typeface="Courier New" panose="02070309020205020404" pitchFamily="49" charset="0"/>
+              </a:rPr>
+              <a:t>” , level = ”debug”, </a:t>
+            </a:r>
+          </a:p>
+          <a:p>
+            <a:pPr marL="0" indent="0" defTabSz="182880">
+              <a:lnSpc>
+                <a:spcPct val="100000"/>
+              </a:lnSpc>
+              <a:spcBef>
+                <a:spcPts val="0"/>
+              </a:spcBef>
+              <a:buFont typeface="Arial" panose="020B0604020202020204" pitchFamily="34" charset="0"/>
+              <a:buNone/>
+            </a:pPr>
+            <a:r>
+              <a:rPr lang="en-US" sz="800" dirty="0">
+                <a:latin typeface="Courier New" panose="02070309020205020404" pitchFamily="49" charset="0"/>
+                <a:cs typeface="Courier New" panose="02070309020205020404" pitchFamily="49" charset="0"/>
+              </a:rPr>
+              <a:t>		.exec ( engine = ”</a:t>
+            </a:r>
+            <a:r>
+              <a:rPr lang="en-US" sz="800" dirty="0" err="1">
+                <a:latin typeface="Courier New" panose="02070309020205020404" pitchFamily="49" charset="0"/>
+                <a:cs typeface="Courier New" panose="02070309020205020404" pitchFamily="49" charset="0"/>
+              </a:rPr>
+              <a:t>connection_exec_engine.py</a:t>
+            </a:r>
+            <a:r>
+              <a:rPr lang="en-US" sz="800" dirty="0">
+                <a:latin typeface="Courier New" panose="02070309020205020404" pitchFamily="49" charset="0"/>
+                <a:cs typeface="Courier New" panose="02070309020205020404" pitchFamily="49" charset="0"/>
+              </a:rPr>
+              <a:t>” ,</a:t>
+            </a:r>
+          </a:p>
+        </p:txBody>
+      </p:sp>
+      <p:sp>
+        <p:nvSpPr>
+          <p:cNvPr id="8" name="Content Placeholder 3">
+            <a:extLst>
+              <a:ext uri="{FF2B5EF4-FFF2-40B4-BE49-F238E27FC236}">
+                <a16:creationId xmlns:a16="http://schemas.microsoft.com/office/drawing/2014/main" id="{8915E1C7-7FFC-BCDD-98B7-8E4D00F59380}"/>
+              </a:ext>
+            </a:extLst>
+          </p:cNvPr>
+          <p:cNvSpPr txBox="1">
+            <a:spLocks/>
+          </p:cNvSpPr>
+          <p:nvPr/>
+        </p:nvSpPr>
+        <p:spPr>
+          <a:xfrm>
+            <a:off x="9033456" y="1490868"/>
+            <a:ext cx="2790797" cy="4666215"/>
+          </a:xfrm>
+          <a:prstGeom prst="rect">
+            <a:avLst/>
+          </a:prstGeom>
+          <a:ln>
+            <a:solidFill>
+              <a:schemeClr val="bg1">
+                <a:lumMod val="50000"/>
+              </a:schemeClr>
+            </a:solidFill>
+          </a:ln>
+        </p:spPr>
+        <p:txBody>
+          <a:bodyPr vert="horz" lIns="91440" tIns="45720" rIns="91440" bIns="45720" rtlCol="0">
+            <a:normAutofit/>
+          </a:bodyPr>
+          <a:lstStyle>
+            <a:lvl1pPr marL="228600" indent="-228600" algn="l" defTabSz="914400" rtl="0" eaLnBrk="1" latinLnBrk="0" hangingPunct="1">
+              <a:lnSpc>
+                <a:spcPct val="90000"/>
+              </a:lnSpc>
+              <a:spcBef>
+                <a:spcPts val="1000"/>
+              </a:spcBef>
+              <a:buFont typeface="Arial" panose="020B0604020202020204" pitchFamily="34" charset="0"/>
+              <a:buChar char="•"/>
+              <a:defRPr sz="2800" kern="1200">
+                <a:solidFill>
+                  <a:schemeClr val="tx1"/>
+                </a:solidFill>
+                <a:latin typeface="+mn-lt"/>
+                <a:ea typeface="+mn-ea"/>
+                <a:cs typeface="+mn-cs"/>
+              </a:defRPr>
+            </a:lvl1pPr>
+            <a:lvl2pPr marL="685800" indent="-228600" algn="l" defTabSz="914400" rtl="0" eaLnBrk="1" latinLnBrk="0" hangingPunct="1">
+              <a:lnSpc>
+                <a:spcPct val="90000"/>
+              </a:lnSpc>
+              <a:spcBef>
+                <a:spcPts val="500"/>
+              </a:spcBef>
+              <a:buFont typeface="Arial" panose="020B0604020202020204" pitchFamily="34" charset="0"/>
+              <a:buChar char="•"/>
+              <a:defRPr sz="2400" kern="1200">
+                <a:solidFill>
+                  <a:schemeClr val="tx1"/>
+                </a:solidFill>
+                <a:latin typeface="+mn-lt"/>
+                <a:ea typeface="+mn-ea"/>
+                <a:cs typeface="+mn-cs"/>
+              </a:defRPr>
+            </a:lvl2pPr>
+            <a:lvl3pPr marL="1143000" indent="-228600" algn="l" defTabSz="914400" rtl="0" eaLnBrk="1" latinLnBrk="0" hangingPunct="1">
+              <a:lnSpc>
+                <a:spcPct val="90000"/>
+              </a:lnSpc>
+              <a:spcBef>
+                <a:spcPts val="500"/>
+              </a:spcBef>
+              <a:buFont typeface="Arial" panose="020B0604020202020204" pitchFamily="34" charset="0"/>
+              <a:buChar char="•"/>
+              <a:defRPr sz="2000" kern="1200">
+                <a:solidFill>
+                  <a:schemeClr val="tx1"/>
+                </a:solidFill>
+                <a:latin typeface="+mn-lt"/>
+                <a:ea typeface="+mn-ea"/>
+                <a:cs typeface="+mn-cs"/>
+              </a:defRPr>
+            </a:lvl3pPr>
+            <a:lvl4pPr marL="1600200" indent="-228600" algn="l" defTabSz="914400" rtl="0" eaLnBrk="1" latinLnBrk="0" hangingPunct="1">
+              <a:lnSpc>
+                <a:spcPct val="90000"/>
+              </a:lnSpc>
+              <a:spcBef>
+                <a:spcPts val="500"/>
+              </a:spcBef>
+              <a:buFont typeface="Arial" panose="020B0604020202020204" pitchFamily="34" charset="0"/>
+              <a:buChar char="•"/>
+              <a:defRPr sz="1800" kern="1200">
+                <a:solidFill>
+                  <a:schemeClr val="tx1"/>
+                </a:solidFill>
+                <a:latin typeface="+mn-lt"/>
+                <a:ea typeface="+mn-ea"/>
+                <a:cs typeface="+mn-cs"/>
+              </a:defRPr>
+            </a:lvl4pPr>
+            <a:lvl5pPr marL="2057400" indent="-228600" algn="l" defTabSz="914400" rtl="0" eaLnBrk="1" latinLnBrk="0" hangingPunct="1">
+              <a:lnSpc>
+                <a:spcPct val="90000"/>
+              </a:lnSpc>
+              <a:spcBef>
+                <a:spcPts val="500"/>
+              </a:spcBef>
+              <a:buFont typeface="Arial" panose="020B0604020202020204" pitchFamily="34" charset="0"/>
+              <a:buChar char="•"/>
+              <a:defRPr sz="1800" kern="1200">
+                <a:solidFill>
+                  <a:schemeClr val="tx1"/>
+                </a:solidFill>
+                <a:latin typeface="+mn-lt"/>
+                <a:ea typeface="+mn-ea"/>
+                <a:cs typeface="+mn-cs"/>
+              </a:defRPr>
+            </a:lvl5pPr>
+            <a:lvl6pPr marL="2514600" indent="-228600" algn="l" defTabSz="914400" rtl="0" eaLnBrk="1" latinLnBrk="0" hangingPunct="1">
+              <a:lnSpc>
+                <a:spcPct val="90000"/>
+              </a:lnSpc>
+              <a:spcBef>
+                <a:spcPts val="500"/>
+              </a:spcBef>
+              <a:buFont typeface="Arial" panose="020B0604020202020204" pitchFamily="34" charset="0"/>
+              <a:buChar char="•"/>
+              <a:defRPr sz="1800" kern="1200">
+                <a:solidFill>
+                  <a:schemeClr val="tx1"/>
+                </a:solidFill>
+                <a:latin typeface="+mn-lt"/>
+                <a:ea typeface="+mn-ea"/>
+                <a:cs typeface="+mn-cs"/>
+              </a:defRPr>
+            </a:lvl6pPr>
+            <a:lvl7pPr marL="2971800" indent="-228600" algn="l" defTabSz="914400" rtl="0" eaLnBrk="1" latinLnBrk="0" hangingPunct="1">
+              <a:lnSpc>
+                <a:spcPct val="90000"/>
+              </a:lnSpc>
+              <a:spcBef>
+                <a:spcPts val="500"/>
+              </a:spcBef>
+              <a:buFont typeface="Arial" panose="020B0604020202020204" pitchFamily="34" charset="0"/>
+              <a:buChar char="•"/>
+              <a:defRPr sz="1800" kern="1200">
+                <a:solidFill>
+                  <a:schemeClr val="tx1"/>
+                </a:solidFill>
+                <a:latin typeface="+mn-lt"/>
+                <a:ea typeface="+mn-ea"/>
+                <a:cs typeface="+mn-cs"/>
+              </a:defRPr>
+            </a:lvl7pPr>
+            <a:lvl8pPr marL="3429000" indent="-228600" algn="l" defTabSz="914400" rtl="0" eaLnBrk="1" latinLnBrk="0" hangingPunct="1">
+              <a:lnSpc>
+                <a:spcPct val="90000"/>
+              </a:lnSpc>
+              <a:spcBef>
+                <a:spcPts val="500"/>
+              </a:spcBef>
+              <a:buFont typeface="Arial" panose="020B0604020202020204" pitchFamily="34" charset="0"/>
+              <a:buChar char="•"/>
+              <a:defRPr sz="1800" kern="1200">
+                <a:solidFill>
+                  <a:schemeClr val="tx1"/>
+                </a:solidFill>
+                <a:latin typeface="+mn-lt"/>
+                <a:ea typeface="+mn-ea"/>
+                <a:cs typeface="+mn-cs"/>
+              </a:defRPr>
+            </a:lvl8pPr>
+            <a:lvl9pPr marL="3886200" indent="-228600" algn="l" defTabSz="914400" rtl="0" eaLnBrk="1" latinLnBrk="0" hangingPunct="1">
+              <a:lnSpc>
+                <a:spcPct val="90000"/>
+              </a:lnSpc>
+              <a:spcBef>
+                <a:spcPts val="500"/>
+              </a:spcBef>
+              <a:buFont typeface="Arial" panose="020B0604020202020204" pitchFamily="34" charset="0"/>
+              <a:buChar char="•"/>
+              <a:defRPr sz="1800" kern="1200">
+                <a:solidFill>
+                  <a:schemeClr val="tx1"/>
+                </a:solidFill>
+                <a:latin typeface="+mn-lt"/>
+                <a:ea typeface="+mn-ea"/>
+                <a:cs typeface="+mn-cs"/>
+              </a:defRPr>
+            </a:lvl9pPr>
+          </a:lstStyle>
+          <a:p>
+            <a:pPr marL="0" indent="0" defTabSz="182880">
+              <a:lnSpc>
+                <a:spcPct val="100000"/>
+              </a:lnSpc>
+              <a:spcBef>
+                <a:spcPts val="0"/>
+              </a:spcBef>
+              <a:buFont typeface="Arial" panose="020B0604020202020204" pitchFamily="34" charset="0"/>
+              <a:buNone/>
+            </a:pPr>
+            <a:r>
+              <a:rPr lang="en-US" sz="800" dirty="0">
+                <a:latin typeface="Courier New" panose="02070309020205020404" pitchFamily="49" charset="0"/>
+                <a:cs typeface="Courier New" panose="02070309020205020404" pitchFamily="49" charset="0"/>
+              </a:rPr>
+              <a:t>COMMON PARAMS</a:t>
+            </a:r>
+          </a:p>
+          <a:p>
+            <a:pPr marL="0" indent="0" defTabSz="182880">
+              <a:lnSpc>
+                <a:spcPct val="100000"/>
+              </a:lnSpc>
+              <a:spcBef>
+                <a:spcPts val="0"/>
+              </a:spcBef>
+              <a:buFont typeface="Arial" panose="020B0604020202020204" pitchFamily="34" charset="0"/>
+              <a:buNone/>
+            </a:pPr>
+            <a:endParaRPr lang="en-US" sz="800" dirty="0">
+              <a:latin typeface="Courier New" panose="02070309020205020404" pitchFamily="49" charset="0"/>
+              <a:cs typeface="Courier New" panose="02070309020205020404" pitchFamily="49" charset="0"/>
+            </a:endParaRPr>
+          </a:p>
+          <a:p>
+            <a:pPr marL="0" indent="0" defTabSz="182880">
+              <a:lnSpc>
+                <a:spcPct val="100000"/>
+              </a:lnSpc>
+              <a:spcBef>
+                <a:spcPts val="0"/>
+              </a:spcBef>
+              <a:buFont typeface="Arial" panose="020B0604020202020204" pitchFamily="34" charset="0"/>
+              <a:buNone/>
+            </a:pPr>
+            <a:r>
+              <a:rPr lang="en-US" sz="800" dirty="0">
+                <a:latin typeface="Courier New" panose="02070309020205020404" pitchFamily="49" charset="0"/>
+                <a:cs typeface="Courier New" panose="02070309020205020404" pitchFamily="49" charset="0"/>
+              </a:rPr>
+              <a:t>TBD</a:t>
+            </a:r>
+          </a:p>
+          <a:p>
+            <a:pPr marL="0" indent="0" defTabSz="182880">
+              <a:lnSpc>
+                <a:spcPct val="100000"/>
+              </a:lnSpc>
+              <a:spcBef>
+                <a:spcPts val="0"/>
+              </a:spcBef>
+              <a:buFont typeface="Arial" panose="020B0604020202020204" pitchFamily="34" charset="0"/>
+              <a:buNone/>
+            </a:pPr>
+            <a:endParaRPr lang="en-US" sz="800" dirty="0">
+              <a:latin typeface="Courier New" panose="02070309020205020404" pitchFamily="49" charset="0"/>
+              <a:cs typeface="Courier New" panose="02070309020205020404" pitchFamily="49" charset="0"/>
+            </a:endParaRPr>
+          </a:p>
+        </p:txBody>
+      </p:sp>
+    </p:spTree>
+    <p:extLst>
+      <p:ext uri="{BB962C8B-B14F-4D97-AF65-F5344CB8AC3E}">
+        <p14:creationId xmlns:p14="http://schemas.microsoft.com/office/powerpoint/2010/main" val="519896166"/>
+      </p:ext>
+    </p:extLst>
+  </p:cSld>
+  <p:clrMapOvr>
+    <a:masterClrMapping/>
+  </p:clrMapOvr>
+</p:sld>
+</file>
+
+<file path=ppt/slides/slide2.xml><?xml version="1.0" encoding="utf-8"?>
+<p:sld xmlns:a="http://schemas.openxmlformats.org/drawingml/2006/main" xmlns:r="http://schemas.openxmlformats.org/officeDocument/2006/relationships" xmlns:p="http://schemas.openxmlformats.org/presentationml/2006/main">
+  <p:cSld>
+    <p:spTree>
+      <p:nvGrpSpPr>
+        <p:cNvPr id="1" name=""/>
+        <p:cNvGrpSpPr/>
+        <p:nvPr/>
+      </p:nvGrpSpPr>
+      <p:grpSpPr>
+        <a:xfrm>
+          <a:off x="0" y="0"/>
+          <a:ext cx="0" cy="0"/>
+          <a:chOff x="0" y="0"/>
+          <a:chExt cx="0" cy="0"/>
+        </a:xfrm>
+      </p:grpSpPr>
+      <p:sp>
+        <p:nvSpPr>
+          <p:cNvPr id="2" name="Title 1">
+            <a:extLst>
+              <a:ext uri="{FF2B5EF4-FFF2-40B4-BE49-F238E27FC236}">
+                <a16:creationId xmlns:a16="http://schemas.microsoft.com/office/drawing/2014/main" id="{C48EAF39-271E-DB40-9C0B-4DDA60A258C4}"/>
+              </a:ext>
+            </a:extLst>
+          </p:cNvPr>
+          <p:cNvSpPr>
+            <a:spLocks noGrp="1"/>
+          </p:cNvSpPr>
+          <p:nvPr>
+            <p:ph type="title"/>
+          </p:nvPr>
+        </p:nvSpPr>
+        <p:spPr/>
+        <p:txBody>
+          <a:bodyPr/>
+          <a:lstStyle/>
+          <a:p>
+            <a:r>
+              <a:rPr lang="en-US" dirty="0"/>
+              <a:t>Logic Flow</a:t>
+            </a:r>
+          </a:p>
+        </p:txBody>
+      </p:sp>
+      <p:sp>
+        <p:nvSpPr>
+          <p:cNvPr id="6" name="Rectangle 5">
+            <a:extLst>
+              <a:ext uri="{FF2B5EF4-FFF2-40B4-BE49-F238E27FC236}">
+                <a16:creationId xmlns:a16="http://schemas.microsoft.com/office/drawing/2014/main" id="{97C842F6-23BD-403D-DF94-C83B0DFFC31D}"/>
+              </a:ext>
+            </a:extLst>
+          </p:cNvPr>
+          <p:cNvSpPr/>
+          <p:nvPr/>
+        </p:nvSpPr>
+        <p:spPr>
+          <a:xfrm>
+            <a:off x="5488273" y="3471095"/>
+            <a:ext cx="3663221" cy="2637397"/>
+          </a:xfrm>
+          <a:prstGeom prst="rect">
+            <a:avLst/>
+          </a:prstGeom>
+          <a:solidFill>
+            <a:schemeClr val="accent2">
+              <a:lumMod val="40000"/>
+              <a:lumOff val="60000"/>
+            </a:schemeClr>
+          </a:solidFill>
+          <a:ln>
+            <a:noFill/>
+          </a:ln>
+        </p:spPr>
+        <p:style>
+          <a:lnRef idx="2">
+            <a:schemeClr val="accent2"/>
+          </a:lnRef>
+          <a:fillRef idx="1">
+            <a:schemeClr val="lt1"/>
+          </a:fillRef>
+          <a:effectRef idx="0">
+            <a:schemeClr val="accent2"/>
+          </a:effectRef>
+          <a:fontRef idx="minor">
+            <a:schemeClr val="dk1"/>
+          </a:fontRef>
+        </p:style>
+        <p:txBody>
+          <a:bodyPr rtlCol="0" anchor="t"/>
+          <a:lstStyle/>
+          <a:p>
+            <a:r>
+              <a:rPr lang="en-US" sz="1100" dirty="0"/>
+              <a:t>Main</a:t>
+            </a:r>
+          </a:p>
+        </p:txBody>
+      </p:sp>
+      <p:sp>
+        <p:nvSpPr>
+          <p:cNvPr id="9" name="Rectangle 8">
+            <a:extLst>
+              <a:ext uri="{FF2B5EF4-FFF2-40B4-BE49-F238E27FC236}">
+                <a16:creationId xmlns:a16="http://schemas.microsoft.com/office/drawing/2014/main" id="{EF83636A-27AB-589E-AB50-AFAA647B50F7}"/>
+              </a:ext>
+            </a:extLst>
+          </p:cNvPr>
+          <p:cNvSpPr/>
+          <p:nvPr/>
+        </p:nvSpPr>
+        <p:spPr>
+          <a:xfrm>
+            <a:off x="5488274" y="2232118"/>
+            <a:ext cx="1215452" cy="332965"/>
+          </a:xfrm>
+          <a:prstGeom prst="rect">
+            <a:avLst/>
+          </a:prstGeom>
+          <a:solidFill>
+            <a:schemeClr val="accent2">
+              <a:lumMod val="40000"/>
+              <a:lumOff val="60000"/>
+            </a:schemeClr>
+          </a:solidFill>
+          <a:ln>
+            <a:noFill/>
+          </a:ln>
+        </p:spPr>
+        <p:style>
+          <a:lnRef idx="2">
+            <a:schemeClr val="accent2"/>
+          </a:lnRef>
+          <a:fillRef idx="1">
+            <a:schemeClr val="lt1"/>
+          </a:fillRef>
+          <a:effectRef idx="0">
+            <a:schemeClr val="accent2"/>
+          </a:effectRef>
+          <a:fontRef idx="minor">
+            <a:schemeClr val="dk1"/>
+          </a:fontRef>
+        </p:style>
+        <p:txBody>
+          <a:bodyPr rtlCol="0" anchor="ctr"/>
+          <a:lstStyle/>
+          <a:p>
+            <a:pPr algn="ctr"/>
+            <a:r>
+              <a:rPr lang="en-US" sz="1100" dirty="0"/>
+              <a:t>Launcher</a:t>
+            </a:r>
+          </a:p>
+        </p:txBody>
+      </p:sp>
+      <p:sp>
+        <p:nvSpPr>
+          <p:cNvPr id="10" name="Vertical Scroll 9">
+            <a:extLst>
+              <a:ext uri="{FF2B5EF4-FFF2-40B4-BE49-F238E27FC236}">
+                <a16:creationId xmlns:a16="http://schemas.microsoft.com/office/drawing/2014/main" id="{4FC0310D-D197-AA3E-2ACE-5B5984EB3602}"/>
+              </a:ext>
+            </a:extLst>
+          </p:cNvPr>
+          <p:cNvSpPr/>
+          <p:nvPr/>
+        </p:nvSpPr>
+        <p:spPr>
+          <a:xfrm>
+            <a:off x="3477718" y="2799948"/>
+            <a:ext cx="1271264" cy="300895"/>
+          </a:xfrm>
+          <a:prstGeom prst="verticalScroll">
+            <a:avLst>
+              <a:gd name="adj" fmla="val 25000"/>
+            </a:avLst>
+          </a:prstGeom>
+          <a:solidFill>
+            <a:schemeClr val="bg1"/>
+          </a:solidFill>
+        </p:spPr>
+        <p:style>
+          <a:lnRef idx="2">
+            <a:schemeClr val="accent1">
+              <a:shade val="15000"/>
+            </a:schemeClr>
+          </a:lnRef>
+          <a:fillRef idx="1">
+            <a:schemeClr val="accent1"/>
+          </a:fillRef>
+          <a:effectRef idx="0">
+            <a:schemeClr val="accent1"/>
+          </a:effectRef>
+          <a:fontRef idx="minor">
+            <a:schemeClr val="lt1"/>
+          </a:fontRef>
+        </p:style>
+        <p:txBody>
+          <a:bodyPr rtlCol="0" anchor="ctr"/>
+          <a:lstStyle/>
+          <a:p>
+            <a:pPr algn="ctr"/>
+            <a:r>
+              <a:rPr lang="en-US" sz="1000" dirty="0" err="1">
+                <a:solidFill>
+                  <a:schemeClr val="tx1">
+                    <a:lumMod val="50000"/>
+                    <a:lumOff val="50000"/>
+                  </a:schemeClr>
+                </a:solidFill>
+              </a:rPr>
+              <a:t>app_parms.json</a:t>
+            </a:r>
+            <a:endParaRPr lang="en-US" sz="1000" dirty="0">
+              <a:solidFill>
+                <a:schemeClr val="tx1">
+                  <a:lumMod val="50000"/>
+                  <a:lumOff val="50000"/>
+                </a:schemeClr>
+              </a:solidFill>
+            </a:endParaRPr>
+          </a:p>
+        </p:txBody>
+      </p:sp>
+      <p:cxnSp>
+        <p:nvCxnSpPr>
+          <p:cNvPr id="12" name="Straight Arrow Connector 11">
+            <a:extLst>
+              <a:ext uri="{FF2B5EF4-FFF2-40B4-BE49-F238E27FC236}">
+                <a16:creationId xmlns:a16="http://schemas.microsoft.com/office/drawing/2014/main" id="{794D86DA-762A-E528-10F9-39FBD361DBE1}"/>
+              </a:ext>
+            </a:extLst>
+          </p:cNvPr>
+          <p:cNvCxnSpPr>
+            <a:cxnSpLocks/>
+            <a:stCxn id="10" idx="0"/>
+            <a:endCxn id="9" idx="1"/>
+          </p:cNvCxnSpPr>
+          <p:nvPr/>
+        </p:nvCxnSpPr>
+        <p:spPr>
+          <a:xfrm rot="5400000" flipH="1" flipV="1">
+            <a:off x="4600139" y="1911813"/>
+            <a:ext cx="401347" cy="1374924"/>
+          </a:xfrm>
+          <a:prstGeom prst="bentConnector2">
+            <a:avLst/>
+          </a:prstGeom>
+          <a:ln>
+            <a:solidFill>
+              <a:schemeClr val="bg1">
+                <a:lumMod val="50000"/>
+              </a:schemeClr>
+            </a:solidFill>
+            <a:tailEnd type="triangle"/>
+          </a:ln>
+        </p:spPr>
+        <p:style>
+          <a:lnRef idx="1">
+            <a:schemeClr val="accent1"/>
+          </a:lnRef>
+          <a:fillRef idx="0">
+            <a:schemeClr val="accent1"/>
+          </a:fillRef>
+          <a:effectRef idx="0">
+            <a:schemeClr val="accent1"/>
+          </a:effectRef>
+          <a:fontRef idx="minor">
+            <a:schemeClr val="tx1"/>
+          </a:fontRef>
+        </p:style>
+      </p:cxnSp>
+      <p:sp>
+        <p:nvSpPr>
+          <p:cNvPr id="16" name="Rectangle 15">
+            <a:extLst>
+              <a:ext uri="{FF2B5EF4-FFF2-40B4-BE49-F238E27FC236}">
+                <a16:creationId xmlns:a16="http://schemas.microsoft.com/office/drawing/2014/main" id="{7D7582FF-2EEE-64B1-127E-FCA4D5ECD336}"/>
+              </a:ext>
+            </a:extLst>
+          </p:cNvPr>
+          <p:cNvSpPr/>
+          <p:nvPr/>
+        </p:nvSpPr>
+        <p:spPr>
+          <a:xfrm>
+            <a:off x="7355621" y="2232117"/>
+            <a:ext cx="1215452" cy="332965"/>
+          </a:xfrm>
+          <a:prstGeom prst="rect">
+            <a:avLst/>
+          </a:prstGeom>
+          <a:solidFill>
+            <a:schemeClr val="accent2">
+              <a:lumMod val="40000"/>
+              <a:lumOff val="60000"/>
+            </a:schemeClr>
+          </a:solidFill>
+          <a:ln>
+            <a:noFill/>
+          </a:ln>
+        </p:spPr>
+        <p:style>
+          <a:lnRef idx="2">
+            <a:schemeClr val="accent2"/>
+          </a:lnRef>
+          <a:fillRef idx="1">
+            <a:schemeClr val="lt1"/>
+          </a:fillRef>
+          <a:effectRef idx="0">
+            <a:schemeClr val="accent2"/>
+          </a:effectRef>
+          <a:fontRef idx="minor">
+            <a:schemeClr val="dk1"/>
+          </a:fontRef>
+        </p:style>
+        <p:txBody>
+          <a:bodyPr rtlCol="0" anchor="ctr"/>
+          <a:lstStyle/>
+          <a:p>
+            <a:pPr algn="ctr"/>
+            <a:r>
+              <a:rPr lang="en-US" sz="1100" dirty="0"/>
+              <a:t>Updater</a:t>
+            </a:r>
+          </a:p>
+        </p:txBody>
+      </p:sp>
+      <p:cxnSp>
+        <p:nvCxnSpPr>
+          <p:cNvPr id="20" name="Straight Arrow Connector 19">
+            <a:extLst>
+              <a:ext uri="{FF2B5EF4-FFF2-40B4-BE49-F238E27FC236}">
+                <a16:creationId xmlns:a16="http://schemas.microsoft.com/office/drawing/2014/main" id="{17CD22E3-A7B2-3DBE-73FD-22C23FAD490E}"/>
+              </a:ext>
+            </a:extLst>
+          </p:cNvPr>
+          <p:cNvCxnSpPr>
+            <a:cxnSpLocks/>
+            <a:stCxn id="9" idx="3"/>
+            <a:endCxn id="16" idx="1"/>
+          </p:cNvCxnSpPr>
+          <p:nvPr/>
+        </p:nvCxnSpPr>
+        <p:spPr>
+          <a:xfrm flipV="1">
+            <a:off x="6703726" y="2398600"/>
+            <a:ext cx="651895" cy="1"/>
+          </a:xfrm>
+          <a:prstGeom prst="bentConnector3">
+            <a:avLst>
+              <a:gd name="adj1" fmla="val 50000"/>
+            </a:avLst>
+          </a:prstGeom>
+          <a:ln>
+            <a:solidFill>
+              <a:schemeClr val="bg1">
+                <a:lumMod val="50000"/>
+              </a:schemeClr>
+            </a:solidFill>
+            <a:tailEnd type="triangle"/>
+          </a:ln>
+        </p:spPr>
+        <p:style>
+          <a:lnRef idx="1">
+            <a:schemeClr val="accent1"/>
+          </a:lnRef>
+          <a:fillRef idx="0">
+            <a:schemeClr val="accent1"/>
+          </a:fillRef>
+          <a:effectRef idx="0">
+            <a:schemeClr val="accent1"/>
+          </a:effectRef>
+          <a:fontRef idx="minor">
+            <a:schemeClr val="tx1"/>
+          </a:fontRef>
+        </p:style>
+      </p:cxnSp>
+      <p:sp>
+        <p:nvSpPr>
+          <p:cNvPr id="43" name="Rectangle 42">
+            <a:extLst>
+              <a:ext uri="{FF2B5EF4-FFF2-40B4-BE49-F238E27FC236}">
+                <a16:creationId xmlns:a16="http://schemas.microsoft.com/office/drawing/2014/main" id="{66B225E4-A3BE-30EA-2B97-975861A16A29}"/>
+              </a:ext>
+            </a:extLst>
+          </p:cNvPr>
+          <p:cNvSpPr/>
+          <p:nvPr/>
+        </p:nvSpPr>
+        <p:spPr>
+          <a:xfrm>
+            <a:off x="1001041" y="1690688"/>
+            <a:ext cx="3998179" cy="4690026"/>
+          </a:xfrm>
+          <a:prstGeom prst="rect">
+            <a:avLst/>
+          </a:prstGeom>
+          <a:noFill/>
+          <a:ln w="28575">
+            <a:solidFill>
+              <a:schemeClr val="accent1"/>
+            </a:solidFill>
+          </a:ln>
+        </p:spPr>
+        <p:style>
+          <a:lnRef idx="2">
+            <a:schemeClr val="accent1">
+              <a:shade val="15000"/>
+            </a:schemeClr>
+          </a:lnRef>
+          <a:fillRef idx="1">
+            <a:schemeClr val="accent1"/>
+          </a:fillRef>
+          <a:effectRef idx="0">
+            <a:schemeClr val="accent1"/>
+          </a:effectRef>
+          <a:fontRef idx="minor">
+            <a:schemeClr val="lt1"/>
+          </a:fontRef>
+        </p:style>
+        <p:txBody>
+          <a:bodyPr rtlCol="0" anchor="t"/>
+          <a:lstStyle/>
+          <a:p>
+            <a:r>
+              <a:rPr lang="en-US" dirty="0">
+                <a:solidFill>
+                  <a:schemeClr val="accent1"/>
+                </a:solidFill>
+              </a:rPr>
+              <a:t>Files</a:t>
+            </a:r>
+          </a:p>
+        </p:txBody>
+      </p:sp>
+      <p:sp>
+        <p:nvSpPr>
+          <p:cNvPr id="44" name="Rectangle 43">
+            <a:extLst>
+              <a:ext uri="{FF2B5EF4-FFF2-40B4-BE49-F238E27FC236}">
+                <a16:creationId xmlns:a16="http://schemas.microsoft.com/office/drawing/2014/main" id="{982611AE-0B2F-0EA7-37A9-14C5EDD945E9}"/>
+              </a:ext>
+            </a:extLst>
+          </p:cNvPr>
+          <p:cNvSpPr/>
+          <p:nvPr/>
+        </p:nvSpPr>
+        <p:spPr>
+          <a:xfrm>
+            <a:off x="5356532" y="1690688"/>
+            <a:ext cx="3998179" cy="4690026"/>
+          </a:xfrm>
+          <a:prstGeom prst="rect">
+            <a:avLst/>
+          </a:prstGeom>
+          <a:noFill/>
+          <a:ln w="28575">
+            <a:solidFill>
+              <a:schemeClr val="accent1"/>
+            </a:solidFill>
+          </a:ln>
+        </p:spPr>
+        <p:style>
+          <a:lnRef idx="2">
+            <a:schemeClr val="accent1">
+              <a:shade val="15000"/>
+            </a:schemeClr>
+          </a:lnRef>
+          <a:fillRef idx="1">
+            <a:schemeClr val="accent1"/>
+          </a:fillRef>
+          <a:effectRef idx="0">
+            <a:schemeClr val="accent1"/>
+          </a:effectRef>
+          <a:fontRef idx="minor">
+            <a:schemeClr val="lt1"/>
+          </a:fontRef>
+        </p:style>
+        <p:txBody>
+          <a:bodyPr rtlCol="0" anchor="t"/>
+          <a:lstStyle/>
+          <a:p>
+            <a:r>
+              <a:rPr lang="en-US" dirty="0">
+                <a:solidFill>
+                  <a:schemeClr val="accent1"/>
+                </a:solidFill>
+              </a:rPr>
+              <a:t>Processes</a:t>
+            </a:r>
+          </a:p>
+        </p:txBody>
+      </p:sp>
+      <p:sp>
+        <p:nvSpPr>
+          <p:cNvPr id="50" name="Rectangle 49">
+            <a:extLst>
+              <a:ext uri="{FF2B5EF4-FFF2-40B4-BE49-F238E27FC236}">
+                <a16:creationId xmlns:a16="http://schemas.microsoft.com/office/drawing/2014/main" id="{0A7D050D-561E-FF27-A072-D326A0E32ED8}"/>
+              </a:ext>
+            </a:extLst>
+          </p:cNvPr>
+          <p:cNvSpPr/>
+          <p:nvPr/>
+        </p:nvSpPr>
+        <p:spPr>
+          <a:xfrm>
+            <a:off x="5300742" y="353726"/>
+            <a:ext cx="6563973" cy="837992"/>
+          </a:xfrm>
+          <a:prstGeom prst="rect">
+            <a:avLst/>
+          </a:prstGeom>
+          <a:noFill/>
+          <a:ln w="28575">
+            <a:solidFill>
+              <a:schemeClr val="accent1"/>
+            </a:solidFill>
+          </a:ln>
+        </p:spPr>
+        <p:style>
+          <a:lnRef idx="2">
+            <a:schemeClr val="accent1">
+              <a:shade val="15000"/>
+            </a:schemeClr>
+          </a:lnRef>
+          <a:fillRef idx="1">
+            <a:schemeClr val="accent1"/>
+          </a:fillRef>
+          <a:effectRef idx="0">
+            <a:schemeClr val="accent1"/>
+          </a:effectRef>
+          <a:fontRef idx="minor">
+            <a:schemeClr val="lt1"/>
+          </a:fontRef>
+        </p:style>
+        <p:txBody>
+          <a:bodyPr rtlCol="0" anchor="t"/>
+          <a:lstStyle/>
+          <a:p>
+            <a:r>
+              <a:rPr lang="en-US" dirty="0">
+                <a:solidFill>
+                  <a:schemeClr val="accent1"/>
+                </a:solidFill>
+              </a:rPr>
+              <a:t>Centralized</a:t>
+            </a:r>
+          </a:p>
+        </p:txBody>
+      </p:sp>
+      <p:cxnSp>
+        <p:nvCxnSpPr>
+          <p:cNvPr id="51" name="Straight Arrow Connector 19">
+            <a:extLst>
+              <a:ext uri="{FF2B5EF4-FFF2-40B4-BE49-F238E27FC236}">
+                <a16:creationId xmlns:a16="http://schemas.microsoft.com/office/drawing/2014/main" id="{512B8467-2D7D-A602-1226-BD044180AFA7}"/>
+              </a:ext>
+            </a:extLst>
+          </p:cNvPr>
+          <p:cNvCxnSpPr>
+            <a:cxnSpLocks/>
+            <a:stCxn id="16" idx="0"/>
+          </p:cNvCxnSpPr>
+          <p:nvPr/>
+        </p:nvCxnSpPr>
+        <p:spPr>
+          <a:xfrm rot="5400000" flipH="1" flipV="1">
+            <a:off x="7308238" y="1577008"/>
+            <a:ext cx="1310219" cy="1"/>
+          </a:xfrm>
+          <a:prstGeom prst="bentConnector3">
+            <a:avLst>
+              <a:gd name="adj1" fmla="val 50000"/>
+            </a:avLst>
+          </a:prstGeom>
+          <a:ln>
+            <a:solidFill>
+              <a:schemeClr val="bg1">
+                <a:lumMod val="50000"/>
+              </a:schemeClr>
+            </a:solidFill>
+            <a:tailEnd type="triangle"/>
+          </a:ln>
+        </p:spPr>
+        <p:style>
+          <a:lnRef idx="1">
+            <a:schemeClr val="accent1"/>
+          </a:lnRef>
+          <a:fillRef idx="0">
+            <a:schemeClr val="accent1"/>
+          </a:fillRef>
+          <a:effectRef idx="0">
+            <a:schemeClr val="accent1"/>
+          </a:effectRef>
+          <a:fontRef idx="minor">
+            <a:schemeClr val="tx1"/>
+          </a:fontRef>
+        </p:style>
+      </p:cxnSp>
+      <p:sp>
+        <p:nvSpPr>
+          <p:cNvPr id="55" name="Rectangle 54">
+            <a:extLst>
+              <a:ext uri="{FF2B5EF4-FFF2-40B4-BE49-F238E27FC236}">
+                <a16:creationId xmlns:a16="http://schemas.microsoft.com/office/drawing/2014/main" id="{E3E2BCCE-7A71-42EE-9B65-6824933AA80B}"/>
+              </a:ext>
+            </a:extLst>
+          </p:cNvPr>
+          <p:cNvSpPr/>
+          <p:nvPr/>
+        </p:nvSpPr>
+        <p:spPr>
+          <a:xfrm>
+            <a:off x="2229563" y="2230700"/>
+            <a:ext cx="1215452" cy="332965"/>
+          </a:xfrm>
+          <a:prstGeom prst="rect">
+            <a:avLst/>
+          </a:prstGeom>
+          <a:solidFill>
+            <a:schemeClr val="accent2">
+              <a:lumMod val="40000"/>
+              <a:lumOff val="60000"/>
+            </a:schemeClr>
+          </a:solidFill>
+          <a:ln>
+            <a:noFill/>
+          </a:ln>
+        </p:spPr>
+        <p:style>
+          <a:lnRef idx="2">
+            <a:schemeClr val="accent2"/>
+          </a:lnRef>
+          <a:fillRef idx="1">
+            <a:schemeClr val="lt1"/>
+          </a:fillRef>
+          <a:effectRef idx="0">
+            <a:schemeClr val="accent2"/>
+          </a:effectRef>
+          <a:fontRef idx="minor">
+            <a:schemeClr val="dk1"/>
+          </a:fontRef>
+        </p:style>
+        <p:txBody>
+          <a:bodyPr rtlCol="0" anchor="ctr"/>
+          <a:lstStyle/>
+          <a:p>
+            <a:pPr algn="ctr"/>
+            <a:r>
+              <a:rPr lang="en-US" sz="1100" dirty="0"/>
+              <a:t>Launcher</a:t>
+            </a:r>
+          </a:p>
+        </p:txBody>
+      </p:sp>
+      <p:cxnSp>
+        <p:nvCxnSpPr>
+          <p:cNvPr id="58" name="Straight Arrow Connector 11">
+            <a:extLst>
+              <a:ext uri="{FF2B5EF4-FFF2-40B4-BE49-F238E27FC236}">
+                <a16:creationId xmlns:a16="http://schemas.microsoft.com/office/drawing/2014/main" id="{B27ED24C-C00C-6D64-2977-7F81E79EB801}"/>
+              </a:ext>
+            </a:extLst>
+          </p:cNvPr>
+          <p:cNvCxnSpPr>
+            <a:cxnSpLocks/>
+            <a:stCxn id="55" idx="3"/>
+            <a:endCxn id="9" idx="1"/>
+          </p:cNvCxnSpPr>
+          <p:nvPr/>
+        </p:nvCxnSpPr>
+        <p:spPr>
+          <a:xfrm>
+            <a:off x="3445015" y="2397183"/>
+            <a:ext cx="2043259" cy="1418"/>
+          </a:xfrm>
+          <a:prstGeom prst="bentConnector3">
+            <a:avLst>
+              <a:gd name="adj1" fmla="val 50000"/>
+            </a:avLst>
+          </a:prstGeom>
+          <a:ln>
+            <a:solidFill>
+              <a:schemeClr val="bg1">
+                <a:lumMod val="50000"/>
+              </a:schemeClr>
+            </a:solidFill>
+            <a:tailEnd type="triangle"/>
+          </a:ln>
+        </p:spPr>
+        <p:style>
+          <a:lnRef idx="1">
+            <a:schemeClr val="accent1"/>
+          </a:lnRef>
+          <a:fillRef idx="0">
+            <a:schemeClr val="accent1"/>
+          </a:fillRef>
+          <a:effectRef idx="0">
+            <a:schemeClr val="accent1"/>
+          </a:effectRef>
+          <a:fontRef idx="minor">
+            <a:schemeClr val="tx1"/>
+          </a:fontRef>
+        </p:style>
+      </p:cxnSp>
+      <p:cxnSp>
+        <p:nvCxnSpPr>
+          <p:cNvPr id="61" name="Straight Arrow Connector 19">
+            <a:extLst>
+              <a:ext uri="{FF2B5EF4-FFF2-40B4-BE49-F238E27FC236}">
+                <a16:creationId xmlns:a16="http://schemas.microsoft.com/office/drawing/2014/main" id="{6E97BA4F-4FFD-832F-F726-50EEE59FEAF5}"/>
+              </a:ext>
+            </a:extLst>
+          </p:cNvPr>
+          <p:cNvCxnSpPr>
+            <a:cxnSpLocks/>
+            <a:stCxn id="16" idx="2"/>
+          </p:cNvCxnSpPr>
+          <p:nvPr/>
+        </p:nvCxnSpPr>
+        <p:spPr>
+          <a:xfrm rot="5400000">
+            <a:off x="6277763" y="1286540"/>
+            <a:ext cx="407042" cy="2964127"/>
+          </a:xfrm>
+          <a:prstGeom prst="bentConnector2">
+            <a:avLst/>
+          </a:prstGeom>
+          <a:ln>
+            <a:solidFill>
+              <a:schemeClr val="bg1">
+                <a:lumMod val="50000"/>
+              </a:schemeClr>
+            </a:solidFill>
+            <a:tailEnd type="triangle"/>
+          </a:ln>
+        </p:spPr>
+        <p:style>
+          <a:lnRef idx="1">
+            <a:schemeClr val="accent1"/>
+          </a:lnRef>
+          <a:fillRef idx="0">
+            <a:schemeClr val="accent1"/>
+          </a:fillRef>
+          <a:effectRef idx="0">
+            <a:schemeClr val="accent1"/>
+          </a:effectRef>
+          <a:fontRef idx="minor">
+            <a:schemeClr val="tx1"/>
+          </a:fontRef>
+        </p:style>
+      </p:cxnSp>
+      <p:sp>
+        <p:nvSpPr>
+          <p:cNvPr id="64" name="Vertical Scroll 63">
+            <a:extLst>
+              <a:ext uri="{FF2B5EF4-FFF2-40B4-BE49-F238E27FC236}">
+                <a16:creationId xmlns:a16="http://schemas.microsoft.com/office/drawing/2014/main" id="{0715214E-2DF7-2A34-327C-B08EF15C0102}"/>
+              </a:ext>
+            </a:extLst>
+          </p:cNvPr>
+          <p:cNvSpPr/>
+          <p:nvPr/>
+        </p:nvSpPr>
+        <p:spPr>
+          <a:xfrm>
+            <a:off x="3445015" y="3297362"/>
+            <a:ext cx="1271264" cy="300895"/>
+          </a:xfrm>
+          <a:prstGeom prst="verticalScroll">
+            <a:avLst>
+              <a:gd name="adj" fmla="val 25000"/>
+            </a:avLst>
+          </a:prstGeom>
+          <a:solidFill>
+            <a:schemeClr val="bg1"/>
+          </a:solidFill>
+        </p:spPr>
+        <p:style>
+          <a:lnRef idx="2">
+            <a:schemeClr val="accent1">
+              <a:shade val="15000"/>
+            </a:schemeClr>
+          </a:lnRef>
+          <a:fillRef idx="1">
+            <a:schemeClr val="accent1"/>
+          </a:fillRef>
+          <a:effectRef idx="0">
+            <a:schemeClr val="accent1"/>
+          </a:effectRef>
+          <a:fontRef idx="minor">
+            <a:schemeClr val="lt1"/>
+          </a:fontRef>
+        </p:style>
+        <p:txBody>
+          <a:bodyPr rtlCol="0" anchor="ctr"/>
+          <a:lstStyle/>
+          <a:p>
+            <a:pPr algn="ctr"/>
+            <a:r>
+              <a:rPr lang="en-US" sz="1000" dirty="0" err="1">
+                <a:solidFill>
+                  <a:schemeClr val="tx1">
+                    <a:lumMod val="50000"/>
+                    <a:lumOff val="50000"/>
+                  </a:schemeClr>
+                </a:solidFill>
+              </a:rPr>
+              <a:t>connections.json</a:t>
+            </a:r>
+            <a:endParaRPr lang="en-US" sz="1000" dirty="0">
+              <a:solidFill>
+                <a:schemeClr val="tx1">
+                  <a:lumMod val="50000"/>
+                  <a:lumOff val="50000"/>
+                </a:schemeClr>
+              </a:solidFill>
+            </a:endParaRPr>
+          </a:p>
+        </p:txBody>
+      </p:sp>
+      <p:sp>
+        <p:nvSpPr>
+          <p:cNvPr id="66" name="Vertical Scroll 65">
+            <a:extLst>
+              <a:ext uri="{FF2B5EF4-FFF2-40B4-BE49-F238E27FC236}">
+                <a16:creationId xmlns:a16="http://schemas.microsoft.com/office/drawing/2014/main" id="{7A334B4F-3E3C-D582-35E2-4EB62C7EC1E8}"/>
+              </a:ext>
+            </a:extLst>
+          </p:cNvPr>
+          <p:cNvSpPr/>
+          <p:nvPr/>
+        </p:nvSpPr>
+        <p:spPr>
+          <a:xfrm>
+            <a:off x="2081335" y="3278552"/>
+            <a:ext cx="1271264" cy="300895"/>
+          </a:xfrm>
+          <a:prstGeom prst="verticalScroll">
+            <a:avLst>
+              <a:gd name="adj" fmla="val 25000"/>
+            </a:avLst>
+          </a:prstGeom>
+          <a:solidFill>
+            <a:schemeClr val="bg1"/>
+          </a:solidFill>
+        </p:spPr>
+        <p:style>
+          <a:lnRef idx="2">
+            <a:schemeClr val="accent1">
+              <a:shade val="15000"/>
+            </a:schemeClr>
+          </a:lnRef>
+          <a:fillRef idx="1">
+            <a:schemeClr val="accent1"/>
+          </a:fillRef>
+          <a:effectRef idx="0">
+            <a:schemeClr val="accent1"/>
+          </a:effectRef>
+          <a:fontRef idx="minor">
+            <a:schemeClr val="lt1"/>
+          </a:fontRef>
+        </p:style>
+        <p:txBody>
+          <a:bodyPr rtlCol="0" anchor="ctr"/>
+          <a:lstStyle/>
+          <a:p>
+            <a:pPr algn="ctr"/>
+            <a:r>
+              <a:rPr lang="en-US" sz="1000" dirty="0" err="1">
+                <a:solidFill>
+                  <a:schemeClr val="tx1">
+                    <a:lumMod val="50000"/>
+                    <a:lumOff val="50000"/>
+                  </a:schemeClr>
+                </a:solidFill>
+              </a:rPr>
+              <a:t>organizations.json</a:t>
+            </a:r>
+            <a:endParaRPr lang="en-US" sz="1000" dirty="0">
+              <a:solidFill>
+                <a:schemeClr val="tx1">
+                  <a:lumMod val="50000"/>
+                  <a:lumOff val="50000"/>
+                </a:schemeClr>
+              </a:solidFill>
+            </a:endParaRPr>
+          </a:p>
+        </p:txBody>
+      </p:sp>
+      <p:sp>
+        <p:nvSpPr>
+          <p:cNvPr id="67" name="Vertical Scroll 66">
+            <a:extLst>
+              <a:ext uri="{FF2B5EF4-FFF2-40B4-BE49-F238E27FC236}">
+                <a16:creationId xmlns:a16="http://schemas.microsoft.com/office/drawing/2014/main" id="{0C150318-75EE-F699-DD04-82A7A5F762C0}"/>
+              </a:ext>
+            </a:extLst>
+          </p:cNvPr>
+          <p:cNvSpPr/>
+          <p:nvPr/>
+        </p:nvSpPr>
+        <p:spPr>
+          <a:xfrm>
+            <a:off x="2081335" y="2815756"/>
+            <a:ext cx="1271264" cy="300895"/>
+          </a:xfrm>
+          <a:prstGeom prst="verticalScroll">
+            <a:avLst>
+              <a:gd name="adj" fmla="val 25000"/>
+            </a:avLst>
+          </a:prstGeom>
+          <a:solidFill>
+            <a:schemeClr val="bg1"/>
+          </a:solidFill>
+        </p:spPr>
+        <p:style>
+          <a:lnRef idx="2">
+            <a:schemeClr val="accent1">
+              <a:shade val="15000"/>
+            </a:schemeClr>
+          </a:lnRef>
+          <a:fillRef idx="1">
+            <a:schemeClr val="accent1"/>
+          </a:fillRef>
+          <a:effectRef idx="0">
+            <a:schemeClr val="accent1"/>
+          </a:effectRef>
+          <a:fontRef idx="minor">
+            <a:schemeClr val="lt1"/>
+          </a:fontRef>
+        </p:style>
+        <p:txBody>
+          <a:bodyPr rtlCol="0" anchor="ctr"/>
+          <a:lstStyle/>
+          <a:p>
+            <a:pPr algn="ctr"/>
+            <a:r>
+              <a:rPr lang="en-US" sz="1000" dirty="0" err="1">
+                <a:solidFill>
+                  <a:schemeClr val="tx1">
+                    <a:lumMod val="50000"/>
+                    <a:lumOff val="50000"/>
+                  </a:schemeClr>
+                </a:solidFill>
+              </a:rPr>
+              <a:t>users.json</a:t>
+            </a:r>
+            <a:endParaRPr lang="en-US" sz="1000" dirty="0">
+              <a:solidFill>
+                <a:schemeClr val="tx1">
+                  <a:lumMod val="50000"/>
+                  <a:lumOff val="50000"/>
+                </a:schemeClr>
+              </a:solidFill>
+            </a:endParaRPr>
+          </a:p>
+        </p:txBody>
+      </p:sp>
+      <p:sp>
+        <p:nvSpPr>
+          <p:cNvPr id="68" name="Vertical Scroll 67">
+            <a:extLst>
+              <a:ext uri="{FF2B5EF4-FFF2-40B4-BE49-F238E27FC236}">
+                <a16:creationId xmlns:a16="http://schemas.microsoft.com/office/drawing/2014/main" id="{5500C38F-510D-1289-5764-E38C36FCE749}"/>
+              </a:ext>
+            </a:extLst>
+          </p:cNvPr>
+          <p:cNvSpPr/>
+          <p:nvPr/>
+        </p:nvSpPr>
+        <p:spPr>
+          <a:xfrm>
+            <a:off x="3341315" y="4085008"/>
+            <a:ext cx="1271264" cy="300895"/>
+          </a:xfrm>
+          <a:prstGeom prst="verticalScroll">
+            <a:avLst>
+              <a:gd name="adj" fmla="val 25000"/>
+            </a:avLst>
+          </a:prstGeom>
+          <a:solidFill>
+            <a:schemeClr val="bg1"/>
+          </a:solidFill>
+        </p:spPr>
+        <p:style>
+          <a:lnRef idx="2">
+            <a:schemeClr val="accent1">
+              <a:shade val="15000"/>
+            </a:schemeClr>
+          </a:lnRef>
+          <a:fillRef idx="1">
+            <a:schemeClr val="accent1"/>
+          </a:fillRef>
+          <a:effectRef idx="0">
+            <a:schemeClr val="accent1"/>
+          </a:effectRef>
+          <a:fontRef idx="minor">
+            <a:schemeClr val="lt1"/>
+          </a:fontRef>
+        </p:style>
+        <p:txBody>
+          <a:bodyPr rtlCol="0" anchor="ctr"/>
+          <a:lstStyle/>
+          <a:p>
+            <a:pPr algn="ctr"/>
+            <a:r>
+              <a:rPr lang="en-US" sz="1000" dirty="0" err="1">
+                <a:solidFill>
+                  <a:schemeClr val="tx1">
+                    <a:lumMod val="50000"/>
+                    <a:lumOff val="50000"/>
+                  </a:schemeClr>
+                </a:solidFill>
+              </a:rPr>
+              <a:t>scripts.sqljin</a:t>
+            </a:r>
+            <a:endParaRPr lang="en-US" sz="1000" dirty="0">
+              <a:solidFill>
+                <a:schemeClr val="tx1">
+                  <a:lumMod val="50000"/>
+                  <a:lumOff val="50000"/>
+                </a:schemeClr>
+              </a:solidFill>
+            </a:endParaRPr>
+          </a:p>
+        </p:txBody>
+      </p:sp>
+      <p:sp>
+        <p:nvSpPr>
+          <p:cNvPr id="69" name="Left Brace 68">
+            <a:extLst>
+              <a:ext uri="{FF2B5EF4-FFF2-40B4-BE49-F238E27FC236}">
+                <a16:creationId xmlns:a16="http://schemas.microsoft.com/office/drawing/2014/main" id="{253456D3-6823-37E6-3A38-1C442B801D15}"/>
+              </a:ext>
+            </a:extLst>
+          </p:cNvPr>
+          <p:cNvSpPr/>
+          <p:nvPr/>
+        </p:nvSpPr>
+        <p:spPr>
+          <a:xfrm rot="16200000">
+            <a:off x="3300209" y="2463596"/>
+            <a:ext cx="184669" cy="2634944"/>
+          </a:xfrm>
+          <a:prstGeom prst="leftBrace">
+            <a:avLst>
+              <a:gd name="adj1" fmla="val 8333"/>
+              <a:gd name="adj2" fmla="val 14822"/>
+            </a:avLst>
+          </a:prstGeom>
+        </p:spPr>
+        <p:style>
+          <a:lnRef idx="1">
+            <a:schemeClr val="accent1"/>
+          </a:lnRef>
+          <a:fillRef idx="0">
+            <a:schemeClr val="accent1"/>
+          </a:fillRef>
+          <a:effectRef idx="0">
+            <a:schemeClr val="accent1"/>
+          </a:effectRef>
+          <a:fontRef idx="minor">
+            <a:schemeClr val="tx1"/>
+          </a:fontRef>
+        </p:style>
+        <p:txBody>
+          <a:bodyPr rtlCol="0" anchor="ctr"/>
+          <a:lstStyle/>
+          <a:p>
+            <a:pPr algn="ctr"/>
+            <a:endParaRPr lang="en-US"/>
+          </a:p>
+        </p:txBody>
+      </p:sp>
+      <p:cxnSp>
+        <p:nvCxnSpPr>
+          <p:cNvPr id="70" name="Straight Arrow Connector 19">
+            <a:extLst>
+              <a:ext uri="{FF2B5EF4-FFF2-40B4-BE49-F238E27FC236}">
+                <a16:creationId xmlns:a16="http://schemas.microsoft.com/office/drawing/2014/main" id="{3B7ACBED-67AF-483C-87AA-345F1B5B86FB}"/>
+              </a:ext>
+            </a:extLst>
+          </p:cNvPr>
+          <p:cNvCxnSpPr>
+            <a:cxnSpLocks/>
+            <a:stCxn id="69" idx="1"/>
+          </p:cNvCxnSpPr>
+          <p:nvPr/>
+        </p:nvCxnSpPr>
+        <p:spPr>
+          <a:xfrm rot="16200000" flipH="1">
+            <a:off x="3832811" y="2506214"/>
+            <a:ext cx="630867" cy="3365243"/>
+          </a:xfrm>
+          <a:prstGeom prst="bentConnector4">
+            <a:avLst>
+              <a:gd name="adj1" fmla="val 36236"/>
+              <a:gd name="adj2" fmla="val 192"/>
+            </a:avLst>
+          </a:prstGeom>
+          <a:ln>
+            <a:solidFill>
+              <a:schemeClr val="bg1">
+                <a:lumMod val="50000"/>
+              </a:schemeClr>
+            </a:solidFill>
+            <a:tailEnd type="triangle"/>
+          </a:ln>
+        </p:spPr>
+        <p:style>
+          <a:lnRef idx="1">
+            <a:schemeClr val="accent1"/>
+          </a:lnRef>
+          <a:fillRef idx="0">
+            <a:schemeClr val="accent1"/>
+          </a:fillRef>
+          <a:effectRef idx="0">
+            <a:schemeClr val="accent1"/>
+          </a:effectRef>
+          <a:fontRef idx="minor">
+            <a:schemeClr val="tx1"/>
+          </a:fontRef>
+        </p:style>
+      </p:cxnSp>
+      <p:sp>
+        <p:nvSpPr>
+          <p:cNvPr id="78" name="Rectangle 77">
+            <a:extLst>
+              <a:ext uri="{FF2B5EF4-FFF2-40B4-BE49-F238E27FC236}">
+                <a16:creationId xmlns:a16="http://schemas.microsoft.com/office/drawing/2014/main" id="{9AF4C2A1-739A-1565-822B-9DA3EB92D091}"/>
+              </a:ext>
+            </a:extLst>
+          </p:cNvPr>
+          <p:cNvSpPr/>
+          <p:nvPr/>
+        </p:nvSpPr>
+        <p:spPr>
+          <a:xfrm>
+            <a:off x="5878823" y="3873403"/>
+            <a:ext cx="659763" cy="1876044"/>
+          </a:xfrm>
+          <a:prstGeom prst="rect">
+            <a:avLst/>
+          </a:prstGeom>
+          <a:solidFill>
+            <a:schemeClr val="accent2">
+              <a:lumMod val="40000"/>
+              <a:lumOff val="60000"/>
+            </a:schemeClr>
+          </a:solidFill>
+          <a:ln>
+            <a:solidFill>
+              <a:schemeClr val="bg1">
+                <a:lumMod val="75000"/>
+              </a:schemeClr>
+            </a:solidFill>
+          </a:ln>
+        </p:spPr>
+        <p:style>
+          <a:lnRef idx="2">
+            <a:schemeClr val="accent2"/>
+          </a:lnRef>
+          <a:fillRef idx="1">
+            <a:schemeClr val="lt1"/>
+          </a:fillRef>
+          <a:effectRef idx="0">
+            <a:schemeClr val="accent2"/>
+          </a:effectRef>
+          <a:fontRef idx="minor">
+            <a:schemeClr val="dk1"/>
+          </a:fontRef>
+        </p:style>
+        <p:txBody>
+          <a:bodyPr rtlCol="0" anchor="ctr"/>
+          <a:lstStyle/>
+          <a:p>
+            <a:pPr algn="ctr"/>
+            <a:r>
+              <a:rPr lang="en-US" sz="1100" dirty="0"/>
+              <a:t>Runner</a:t>
+            </a:r>
+          </a:p>
+        </p:txBody>
+      </p:sp>
+      <p:cxnSp>
+        <p:nvCxnSpPr>
+          <p:cNvPr id="94" name="Straight Arrow Connector 19">
+            <a:extLst>
+              <a:ext uri="{FF2B5EF4-FFF2-40B4-BE49-F238E27FC236}">
+                <a16:creationId xmlns:a16="http://schemas.microsoft.com/office/drawing/2014/main" id="{333D8A97-76F6-98A3-9E34-6088F488B8A8}"/>
+              </a:ext>
+            </a:extLst>
+          </p:cNvPr>
+          <p:cNvCxnSpPr>
+            <a:cxnSpLocks/>
+            <a:stCxn id="68" idx="3"/>
+          </p:cNvCxnSpPr>
+          <p:nvPr/>
+        </p:nvCxnSpPr>
+        <p:spPr>
+          <a:xfrm>
+            <a:off x="4537355" y="4235456"/>
+            <a:ext cx="1341468" cy="0"/>
+          </a:xfrm>
+          <a:prstGeom prst="straightConnector1">
+            <a:avLst/>
+          </a:prstGeom>
+          <a:ln>
+            <a:solidFill>
+              <a:schemeClr val="bg1">
+                <a:lumMod val="50000"/>
+              </a:schemeClr>
+            </a:solidFill>
+            <a:tailEnd type="triangle"/>
+          </a:ln>
+        </p:spPr>
+        <p:style>
+          <a:lnRef idx="1">
+            <a:schemeClr val="accent1"/>
+          </a:lnRef>
+          <a:fillRef idx="0">
+            <a:schemeClr val="accent1"/>
+          </a:fillRef>
+          <a:effectRef idx="0">
+            <a:schemeClr val="accent1"/>
+          </a:effectRef>
+          <a:fontRef idx="minor">
+            <a:schemeClr val="tx1"/>
+          </a:fontRef>
+        </p:style>
+      </p:cxnSp>
+      <p:cxnSp>
+        <p:nvCxnSpPr>
+          <p:cNvPr id="105" name="Straight Arrow Connector 19">
+            <a:extLst>
+              <a:ext uri="{FF2B5EF4-FFF2-40B4-BE49-F238E27FC236}">
+                <a16:creationId xmlns:a16="http://schemas.microsoft.com/office/drawing/2014/main" id="{BBC7735E-59A2-D461-E1CA-3FE474BAA1CE}"/>
+              </a:ext>
+            </a:extLst>
+          </p:cNvPr>
+          <p:cNvCxnSpPr>
+            <a:cxnSpLocks/>
+          </p:cNvCxnSpPr>
+          <p:nvPr/>
+        </p:nvCxnSpPr>
+        <p:spPr>
+          <a:xfrm rot="5400000" flipH="1" flipV="1">
+            <a:off x="6286749" y="2810776"/>
+            <a:ext cx="2132060" cy="1628382"/>
+          </a:xfrm>
+          <a:prstGeom prst="bentConnector3">
+            <a:avLst>
+              <a:gd name="adj1" fmla="val 62"/>
+            </a:avLst>
+          </a:prstGeom>
+          <a:ln>
+            <a:solidFill>
+              <a:schemeClr val="bg1">
+                <a:lumMod val="50000"/>
+              </a:schemeClr>
+            </a:solidFill>
+            <a:tailEnd type="triangle"/>
+          </a:ln>
+        </p:spPr>
+        <p:style>
+          <a:lnRef idx="1">
+            <a:schemeClr val="accent1"/>
+          </a:lnRef>
+          <a:fillRef idx="0">
+            <a:schemeClr val="accent1"/>
+          </a:fillRef>
+          <a:effectRef idx="0">
+            <a:schemeClr val="accent1"/>
+          </a:effectRef>
+          <a:fontRef idx="minor">
+            <a:schemeClr val="tx1"/>
+          </a:fontRef>
+        </p:style>
+      </p:cxnSp>
+      <p:sp>
+        <p:nvSpPr>
+          <p:cNvPr id="113" name="Rectangle 112">
+            <a:extLst>
+              <a:ext uri="{FF2B5EF4-FFF2-40B4-BE49-F238E27FC236}">
+                <a16:creationId xmlns:a16="http://schemas.microsoft.com/office/drawing/2014/main" id="{154517CE-800E-11E0-FA2C-65D73744DE62}"/>
+              </a:ext>
+            </a:extLst>
+          </p:cNvPr>
+          <p:cNvSpPr/>
+          <p:nvPr/>
+        </p:nvSpPr>
+        <p:spPr>
+          <a:xfrm>
+            <a:off x="7071293" y="4999353"/>
+            <a:ext cx="1014258" cy="199280"/>
+          </a:xfrm>
+          <a:prstGeom prst="rect">
+            <a:avLst/>
+          </a:prstGeom>
+          <a:solidFill>
+            <a:schemeClr val="accent2">
+              <a:lumMod val="40000"/>
+              <a:lumOff val="60000"/>
+            </a:schemeClr>
+          </a:solidFill>
+          <a:ln>
+            <a:solidFill>
+              <a:schemeClr val="bg1">
+                <a:lumMod val="75000"/>
+              </a:schemeClr>
+            </a:solidFill>
+          </a:ln>
+        </p:spPr>
+        <p:style>
+          <a:lnRef idx="2">
+            <a:schemeClr val="accent2"/>
+          </a:lnRef>
+          <a:fillRef idx="1">
+            <a:schemeClr val="lt1"/>
+          </a:fillRef>
+          <a:effectRef idx="0">
+            <a:schemeClr val="accent2"/>
+          </a:effectRef>
+          <a:fontRef idx="minor">
+            <a:schemeClr val="dk1"/>
+          </a:fontRef>
+        </p:style>
+        <p:txBody>
+          <a:bodyPr rtlCol="0" anchor="ctr"/>
+          <a:lstStyle/>
+          <a:p>
+            <a:pPr algn="ctr"/>
+            <a:r>
+              <a:rPr lang="en-US" sz="1100" dirty="0"/>
+              <a:t>Log handler</a:t>
+            </a:r>
+          </a:p>
+        </p:txBody>
+      </p:sp>
+      <p:sp>
+        <p:nvSpPr>
+          <p:cNvPr id="114" name="Rectangle 113">
+            <a:extLst>
+              <a:ext uri="{FF2B5EF4-FFF2-40B4-BE49-F238E27FC236}">
+                <a16:creationId xmlns:a16="http://schemas.microsoft.com/office/drawing/2014/main" id="{B0F2BBF7-0D31-14C9-DFF5-2F0AF25C8CCD}"/>
+              </a:ext>
+            </a:extLst>
+          </p:cNvPr>
+          <p:cNvSpPr/>
+          <p:nvPr/>
+        </p:nvSpPr>
+        <p:spPr>
+          <a:xfrm>
+            <a:off x="7071293" y="5264120"/>
+            <a:ext cx="1014258" cy="199280"/>
+          </a:xfrm>
+          <a:prstGeom prst="rect">
+            <a:avLst/>
+          </a:prstGeom>
+          <a:solidFill>
+            <a:schemeClr val="accent2">
+              <a:lumMod val="40000"/>
+              <a:lumOff val="60000"/>
+            </a:schemeClr>
+          </a:solidFill>
+          <a:ln>
+            <a:solidFill>
+              <a:schemeClr val="bg1">
+                <a:lumMod val="75000"/>
+              </a:schemeClr>
+            </a:solidFill>
+          </a:ln>
+        </p:spPr>
+        <p:style>
+          <a:lnRef idx="2">
+            <a:schemeClr val="accent2"/>
+          </a:lnRef>
+          <a:fillRef idx="1">
+            <a:schemeClr val="lt1"/>
+          </a:fillRef>
+          <a:effectRef idx="0">
+            <a:schemeClr val="accent2"/>
+          </a:effectRef>
+          <a:fontRef idx="minor">
+            <a:schemeClr val="dk1"/>
+          </a:fontRef>
+        </p:style>
+        <p:txBody>
+          <a:bodyPr rtlCol="0" anchor="ctr"/>
+          <a:lstStyle/>
+          <a:p>
+            <a:pPr algn="ctr"/>
+            <a:r>
+              <a:rPr lang="en-US" sz="1100" dirty="0"/>
+              <a:t>Error handler</a:t>
+            </a:r>
+          </a:p>
+        </p:txBody>
+      </p:sp>
+      <p:cxnSp>
+        <p:nvCxnSpPr>
+          <p:cNvPr id="115" name="Straight Arrow Connector 19">
+            <a:extLst>
+              <a:ext uri="{FF2B5EF4-FFF2-40B4-BE49-F238E27FC236}">
+                <a16:creationId xmlns:a16="http://schemas.microsoft.com/office/drawing/2014/main" id="{070F0CEA-145B-7D8D-CF93-1D944B010740}"/>
+              </a:ext>
+            </a:extLst>
+          </p:cNvPr>
+          <p:cNvCxnSpPr>
+            <a:cxnSpLocks/>
+            <a:endCxn id="113" idx="1"/>
+          </p:cNvCxnSpPr>
+          <p:nvPr/>
+        </p:nvCxnSpPr>
+        <p:spPr>
+          <a:xfrm>
+            <a:off x="6538586" y="5098993"/>
+            <a:ext cx="532707" cy="0"/>
+          </a:xfrm>
+          <a:prstGeom prst="straightConnector1">
+            <a:avLst/>
+          </a:prstGeom>
+          <a:ln>
+            <a:solidFill>
+              <a:schemeClr val="bg1">
+                <a:lumMod val="50000"/>
+              </a:schemeClr>
+            </a:solidFill>
+            <a:tailEnd type="triangle"/>
+          </a:ln>
+        </p:spPr>
+        <p:style>
+          <a:lnRef idx="1">
+            <a:schemeClr val="accent1"/>
+          </a:lnRef>
+          <a:fillRef idx="0">
+            <a:schemeClr val="accent1"/>
+          </a:fillRef>
+          <a:effectRef idx="0">
+            <a:schemeClr val="accent1"/>
+          </a:effectRef>
+          <a:fontRef idx="minor">
+            <a:schemeClr val="tx1"/>
+          </a:fontRef>
+        </p:style>
+      </p:cxnSp>
+      <p:cxnSp>
+        <p:nvCxnSpPr>
+          <p:cNvPr id="122" name="Straight Arrow Connector 19">
+            <a:extLst>
+              <a:ext uri="{FF2B5EF4-FFF2-40B4-BE49-F238E27FC236}">
+                <a16:creationId xmlns:a16="http://schemas.microsoft.com/office/drawing/2014/main" id="{F08200EA-4DE7-6656-B14E-DA68E3405F3F}"/>
+              </a:ext>
+            </a:extLst>
+          </p:cNvPr>
+          <p:cNvCxnSpPr>
+            <a:cxnSpLocks/>
+          </p:cNvCxnSpPr>
+          <p:nvPr/>
+        </p:nvCxnSpPr>
+        <p:spPr>
+          <a:xfrm>
+            <a:off x="6538586" y="5389180"/>
+            <a:ext cx="532707" cy="0"/>
+          </a:xfrm>
+          <a:prstGeom prst="straightConnector1">
+            <a:avLst/>
+          </a:prstGeom>
+          <a:ln>
+            <a:solidFill>
+              <a:schemeClr val="bg1">
+                <a:lumMod val="50000"/>
+              </a:schemeClr>
+            </a:solidFill>
+            <a:tailEnd type="triangle"/>
+          </a:ln>
+        </p:spPr>
+        <p:style>
+          <a:lnRef idx="1">
+            <a:schemeClr val="accent1"/>
+          </a:lnRef>
+          <a:fillRef idx="0">
+            <a:schemeClr val="accent1"/>
+          </a:fillRef>
+          <a:effectRef idx="0">
+            <a:schemeClr val="accent1"/>
+          </a:effectRef>
+          <a:fontRef idx="minor">
+            <a:schemeClr val="tx1"/>
+          </a:fontRef>
+        </p:style>
+      </p:cxnSp>
+      <p:sp>
+        <p:nvSpPr>
+          <p:cNvPr id="123" name="Rectangle 122">
+            <a:extLst>
+              <a:ext uri="{FF2B5EF4-FFF2-40B4-BE49-F238E27FC236}">
+                <a16:creationId xmlns:a16="http://schemas.microsoft.com/office/drawing/2014/main" id="{16E01178-4948-2623-358C-F09C2031AABD}"/>
+              </a:ext>
+            </a:extLst>
+          </p:cNvPr>
+          <p:cNvSpPr/>
+          <p:nvPr/>
+        </p:nvSpPr>
+        <p:spPr>
+          <a:xfrm>
+            <a:off x="3729866" y="5461380"/>
+            <a:ext cx="1014258" cy="199280"/>
+          </a:xfrm>
+          <a:prstGeom prst="rect">
+            <a:avLst/>
+          </a:prstGeom>
+          <a:solidFill>
+            <a:schemeClr val="accent2">
+              <a:lumMod val="40000"/>
+              <a:lumOff val="60000"/>
+            </a:schemeClr>
+          </a:solidFill>
+          <a:ln>
+            <a:solidFill>
+              <a:schemeClr val="bg1">
+                <a:lumMod val="75000"/>
+              </a:schemeClr>
+            </a:solidFill>
+          </a:ln>
+        </p:spPr>
+        <p:style>
+          <a:lnRef idx="2">
+            <a:schemeClr val="accent2"/>
+          </a:lnRef>
+          <a:fillRef idx="1">
+            <a:schemeClr val="lt1"/>
+          </a:fillRef>
+          <a:effectRef idx="0">
+            <a:schemeClr val="accent2"/>
+          </a:effectRef>
+          <a:fontRef idx="minor">
+            <a:schemeClr val="dk1"/>
+          </a:fontRef>
+        </p:style>
+        <p:txBody>
+          <a:bodyPr rtlCol="0" anchor="ctr"/>
+          <a:lstStyle/>
+          <a:p>
+            <a:pPr algn="ctr"/>
+            <a:r>
+              <a:rPr lang="en-US" sz="1100" dirty="0"/>
+              <a:t>Output</a:t>
+            </a:r>
+          </a:p>
+        </p:txBody>
+      </p:sp>
+      <p:cxnSp>
+        <p:nvCxnSpPr>
+          <p:cNvPr id="124" name="Straight Arrow Connector 19">
+            <a:extLst>
+              <a:ext uri="{FF2B5EF4-FFF2-40B4-BE49-F238E27FC236}">
+                <a16:creationId xmlns:a16="http://schemas.microsoft.com/office/drawing/2014/main" id="{8E643D3F-0BD8-248D-8F13-C6B97917BDA1}"/>
+              </a:ext>
+            </a:extLst>
+          </p:cNvPr>
+          <p:cNvCxnSpPr>
+            <a:cxnSpLocks/>
+          </p:cNvCxnSpPr>
+          <p:nvPr/>
+        </p:nvCxnSpPr>
+        <p:spPr>
+          <a:xfrm flipH="1">
+            <a:off x="4744126" y="5562075"/>
+            <a:ext cx="1113232" cy="0"/>
+          </a:xfrm>
+          <a:prstGeom prst="straightConnector1">
+            <a:avLst/>
+          </a:prstGeom>
+          <a:ln>
+            <a:solidFill>
+              <a:schemeClr val="bg1">
+                <a:lumMod val="50000"/>
+              </a:schemeClr>
+            </a:solidFill>
+            <a:tailEnd type="triangle"/>
+          </a:ln>
+        </p:spPr>
+        <p:style>
+          <a:lnRef idx="1">
+            <a:schemeClr val="accent1"/>
+          </a:lnRef>
+          <a:fillRef idx="0">
+            <a:schemeClr val="accent1"/>
+          </a:fillRef>
+          <a:effectRef idx="0">
+            <a:schemeClr val="accent1"/>
+          </a:effectRef>
+          <a:fontRef idx="minor">
+            <a:schemeClr val="tx1"/>
+          </a:fontRef>
+        </p:style>
+      </p:cxnSp>
+    </p:spTree>
+    <p:extLst>
+      <p:ext uri="{BB962C8B-B14F-4D97-AF65-F5344CB8AC3E}">
+        <p14:creationId xmlns:p14="http://schemas.microsoft.com/office/powerpoint/2010/main" val="3560019213"/>
+      </p:ext>
+    </p:extLst>
+  </p:cSld>
+  <p:clrMapOvr>
+    <a:masterClrMapping/>
+  </p:clrMapOvr>
+</p:sld>
+</file>
+
+<file path=ppt/slides/slide3.xml><?xml version="1.0" encoding="utf-8"?>
+<p:sld xmlns:a="http://schemas.openxmlformats.org/drawingml/2006/main" xmlns:r="http://schemas.openxmlformats.org/officeDocument/2006/relationships" xmlns:p="http://schemas.openxmlformats.org/presentationml/2006/main">
+  <p:cSld>
+    <p:spTree>
+      <p:nvGrpSpPr>
+        <p:cNvPr id="1" name=""/>
+        <p:cNvGrpSpPr/>
+        <p:nvPr/>
+      </p:nvGrpSpPr>
+      <p:grpSpPr>
+        <a:xfrm>
+          <a:off x="0" y="0"/>
+          <a:ext cx="0" cy="0"/>
+          <a:chOff x="0" y="0"/>
+          <a:chExt cx="0" cy="0"/>
+        </a:xfrm>
+      </p:grpSpPr>
+      <p:sp>
+        <p:nvSpPr>
+          <p:cNvPr id="2" name="Title 1">
+            <a:extLst>
+              <a:ext uri="{FF2B5EF4-FFF2-40B4-BE49-F238E27FC236}">
+                <a16:creationId xmlns:a16="http://schemas.microsoft.com/office/drawing/2014/main" id="{BDF9204D-9F72-E00B-8796-595CE443C073}"/>
+              </a:ext>
+            </a:extLst>
+          </p:cNvPr>
+          <p:cNvSpPr>
+            <a:spLocks noGrp="1"/>
+          </p:cNvSpPr>
+          <p:nvPr>
+            <p:ph type="title"/>
+          </p:nvPr>
+        </p:nvSpPr>
+        <p:spPr>
+          <a:xfrm>
+            <a:off x="838200" y="2531855"/>
+            <a:ext cx="10515600" cy="1325563"/>
+          </a:xfrm>
+        </p:spPr>
+        <p:txBody>
+          <a:bodyPr/>
+          <a:lstStyle/>
+          <a:p>
+            <a:r>
+              <a:rPr lang="en-US" dirty="0"/>
+              <a:t>Old Design // Archive</a:t>
+            </a:r>
+          </a:p>
+        </p:txBody>
+      </p:sp>
+    </p:spTree>
+    <p:extLst>
+      <p:ext uri="{BB962C8B-B14F-4D97-AF65-F5344CB8AC3E}">
+        <p14:creationId xmlns:p14="http://schemas.microsoft.com/office/powerpoint/2010/main" val="5067180"/>
+      </p:ext>
+    </p:extLst>
+  </p:cSld>
+  <p:clrMapOvr>
+    <a:masterClrMapping/>
+  </p:clrMapOvr>
+</p:sld>
+</file>
+
+<file path=ppt/slides/slide4.xml><?xml version="1.0" encoding="utf-8"?>
 <p:sld xmlns:a="http://schemas.openxmlformats.org/drawingml/2006/main" xmlns:r="http://schemas.openxmlformats.org/officeDocument/2006/relationships" xmlns:p="http://schemas.openxmlformats.org/presentationml/2006/main">
   <p:cSld>
     <p:spTree>
@@ -6529,7 +10921,7 @@
 </p:sld>
 </file>
 
-<file path=ppt/slides/slide2.xml><?xml version="1.0" encoding="utf-8"?>
+<file path=ppt/slides/slide5.xml><?xml version="1.0" encoding="utf-8"?>
 <p:sld xmlns:a="http://schemas.openxmlformats.org/drawingml/2006/main" xmlns:r="http://schemas.openxmlformats.org/officeDocument/2006/relationships" xmlns:p="http://schemas.openxmlformats.org/presentationml/2006/main">
   <p:cSld>
     <p:spTree>
@@ -6893,7 +11285,7 @@
 </p:sld>
 </file>
 
-<file path=ppt/slides/slide3.xml><?xml version="1.0" encoding="utf-8"?>
+<file path=ppt/slides/slide6.xml><?xml version="1.0" encoding="utf-8"?>
 <p:sld xmlns:a="http://schemas.openxmlformats.org/drawingml/2006/main" xmlns:r="http://schemas.openxmlformats.org/officeDocument/2006/relationships" xmlns:p="http://schemas.openxmlformats.org/presentationml/2006/main">
   <p:cSld>
     <p:spTree>

</xml_diff>